<commit_message>
Updating workflow documentation to better reflect the current usage.
</commit_message>
<xml_diff>
--- a/Documentation/Workflow_diagram.pptx
+++ b/Documentation/Workflow_diagram.pptx
@@ -104,6 +104,22 @@
       </a:defRPr>
     </a:lvl9pPr>
   </p:defaultTextStyle>
+  <p:extLst>
+    <p:ext uri="{EFAFB233-063F-42B5-8137-9DF3F51BA10A}">
+      <p15:sldGuideLst xmlns:p15="http://schemas.microsoft.com/office/powerpoint/2012/main">
+        <p15:guide id="1" orient="horz" pos="4032">
+          <p15:clr>
+            <a:srgbClr val="A4A3A4"/>
+          </p15:clr>
+        </p15:guide>
+        <p15:guide id="2" pos="3024">
+          <p15:clr>
+            <a:srgbClr val="A4A3A4"/>
+          </p15:clr>
+        </p15:guide>
+      </p15:sldGuideLst>
+    </p:ext>
+  </p:extLst>
 </p:presentation>
 </file>
 
@@ -288,7 +304,7 @@
           <a:p>
             <a:fld id="{8D11A79C-6258-4161-B717-EE8AC917D205}" type="datetimeFigureOut">
               <a:rPr lang="en-GB" smtClean="0"/>
-              <a:t>03/08/2017</a:t>
+              <a:t>18/03/2019</a:t>
             </a:fld>
             <a:endParaRPr lang="en-GB"/>
           </a:p>
@@ -458,7 +474,7 @@
           <a:p>
             <a:fld id="{8D11A79C-6258-4161-B717-EE8AC917D205}" type="datetimeFigureOut">
               <a:rPr lang="en-GB" smtClean="0"/>
-              <a:t>03/08/2017</a:t>
+              <a:t>18/03/2019</a:t>
             </a:fld>
             <a:endParaRPr lang="en-GB"/>
           </a:p>
@@ -638,7 +654,7 @@
           <a:p>
             <a:fld id="{8D11A79C-6258-4161-B717-EE8AC917D205}" type="datetimeFigureOut">
               <a:rPr lang="en-GB" smtClean="0"/>
-              <a:t>03/08/2017</a:t>
+              <a:t>18/03/2019</a:t>
             </a:fld>
             <a:endParaRPr lang="en-GB"/>
           </a:p>
@@ -808,7 +824,7 @@
           <a:p>
             <a:fld id="{8D11A79C-6258-4161-B717-EE8AC917D205}" type="datetimeFigureOut">
               <a:rPr lang="en-GB" smtClean="0"/>
-              <a:t>03/08/2017</a:t>
+              <a:t>18/03/2019</a:t>
             </a:fld>
             <a:endParaRPr lang="en-GB"/>
           </a:p>
@@ -1054,7 +1070,7 @@
           <a:p>
             <a:fld id="{8D11A79C-6258-4161-B717-EE8AC917D205}" type="datetimeFigureOut">
               <a:rPr lang="en-GB" smtClean="0"/>
-              <a:t>03/08/2017</a:t>
+              <a:t>18/03/2019</a:t>
             </a:fld>
             <a:endParaRPr lang="en-GB"/>
           </a:p>
@@ -1342,7 +1358,7 @@
           <a:p>
             <a:fld id="{8D11A79C-6258-4161-B717-EE8AC917D205}" type="datetimeFigureOut">
               <a:rPr lang="en-GB" smtClean="0"/>
-              <a:t>03/08/2017</a:t>
+              <a:t>18/03/2019</a:t>
             </a:fld>
             <a:endParaRPr lang="en-GB"/>
           </a:p>
@@ -1764,7 +1780,7 @@
           <a:p>
             <a:fld id="{8D11A79C-6258-4161-B717-EE8AC917D205}" type="datetimeFigureOut">
               <a:rPr lang="en-GB" smtClean="0"/>
-              <a:t>03/08/2017</a:t>
+              <a:t>18/03/2019</a:t>
             </a:fld>
             <a:endParaRPr lang="en-GB"/>
           </a:p>
@@ -1882,7 +1898,7 @@
           <a:p>
             <a:fld id="{8D11A79C-6258-4161-B717-EE8AC917D205}" type="datetimeFigureOut">
               <a:rPr lang="en-GB" smtClean="0"/>
-              <a:t>03/08/2017</a:t>
+              <a:t>18/03/2019</a:t>
             </a:fld>
             <a:endParaRPr lang="en-GB"/>
           </a:p>
@@ -1977,7 +1993,7 @@
           <a:p>
             <a:fld id="{8D11A79C-6258-4161-B717-EE8AC917D205}" type="datetimeFigureOut">
               <a:rPr lang="en-GB" smtClean="0"/>
-              <a:t>03/08/2017</a:t>
+              <a:t>18/03/2019</a:t>
             </a:fld>
             <a:endParaRPr lang="en-GB"/>
           </a:p>
@@ -2254,7 +2270,7 @@
           <a:p>
             <a:fld id="{8D11A79C-6258-4161-B717-EE8AC917D205}" type="datetimeFigureOut">
               <a:rPr lang="en-GB" smtClean="0"/>
-              <a:t>03/08/2017</a:t>
+              <a:t>18/03/2019</a:t>
             </a:fld>
             <a:endParaRPr lang="en-GB"/>
           </a:p>
@@ -2507,7 +2523,7 @@
           <a:p>
             <a:fld id="{8D11A79C-6258-4161-B717-EE8AC917D205}" type="datetimeFigureOut">
               <a:rPr lang="en-GB" smtClean="0"/>
-              <a:t>03/08/2017</a:t>
+              <a:t>18/03/2019</a:t>
             </a:fld>
             <a:endParaRPr lang="en-GB"/>
           </a:p>
@@ -2720,7 +2736,7 @@
           <a:p>
             <a:fld id="{8D11A79C-6258-4161-B717-EE8AC917D205}" type="datetimeFigureOut">
               <a:rPr lang="en-GB" smtClean="0"/>
-              <a:t>03/08/2017</a:t>
+              <a:t>18/03/2019</a:t>
             </a:fld>
             <a:endParaRPr lang="en-GB"/>
           </a:p>
@@ -3225,15 +3241,7 @@
                   <a:schemeClr val="tx1"/>
                 </a:solidFill>
               </a:rPr>
-              <a:t>Write geometry description using GdfidL </a:t>
-            </a:r>
-            <a:r>
-              <a:rPr lang="en-GB" sz="1600" dirty="0" smtClean="0">
-                <a:solidFill>
-                  <a:schemeClr val="tx1"/>
-                </a:solidFill>
-              </a:rPr>
-              <a:t>primitives</a:t>
+              <a:t>Write geometry description using GdfidL primitives</a:t>
             </a:r>
           </a:p>
           <a:p>
@@ -3249,11 +3257,6 @@
               </a:rPr>
               <a:t>Specify the material mapping</a:t>
             </a:r>
-            <a:endParaRPr lang="en-GB" sz="1600" dirty="0" smtClean="0">
-              <a:solidFill>
-                <a:schemeClr val="tx1"/>
-              </a:solidFill>
-            </a:endParaRPr>
           </a:p>
           <a:p>
             <a:pPr marL="285750" indent="-285750">
@@ -3832,186 +3835,13 @@
       </p:sp>
       <p:sp>
         <p:nvSpPr>
-          <p:cNvPr id="18" name="Rounded Rectangle 17"/>
-          <p:cNvSpPr/>
-          <p:nvPr/>
-        </p:nvSpPr>
-        <p:spPr>
-          <a:xfrm>
-            <a:off x="4850104" y="4744616"/>
-            <a:ext cx="2829100" cy="809558"/>
-          </a:xfrm>
-          <a:prstGeom prst="roundRect">
-            <a:avLst/>
-          </a:prstGeom>
-          <a:noFill/>
-          <a:ln>
-            <a:solidFill>
-              <a:schemeClr val="tx1"/>
-            </a:solidFill>
-          </a:ln>
-        </p:spPr>
-        <p:style>
-          <a:lnRef idx="2">
-            <a:schemeClr val="accent1">
-              <a:shade val="50000"/>
-            </a:schemeClr>
-          </a:lnRef>
-          <a:fillRef idx="1">
-            <a:schemeClr val="accent1"/>
-          </a:fillRef>
-          <a:effectRef idx="0">
-            <a:schemeClr val="accent1"/>
-          </a:effectRef>
-          <a:fontRef idx="minor">
-            <a:schemeClr val="lt1"/>
-          </a:fontRef>
-        </p:style>
-        <p:txBody>
-          <a:bodyPr lIns="128016" tIns="64008" rIns="128016" bIns="64008" spcCol="0" rtlCol="0" anchor="ctr"/>
-          <a:lstStyle/>
-          <a:p>
-            <a:pPr algn="ctr"/>
-            <a:r>
-              <a:rPr lang="en-GB" sz="1600" dirty="0" smtClean="0">
-                <a:solidFill>
-                  <a:schemeClr val="tx1"/>
-                </a:solidFill>
-              </a:rPr>
-              <a:t>Generate </a:t>
-            </a:r>
-          </a:p>
-          <a:p>
-            <a:pPr algn="ctr"/>
-            <a:r>
-              <a:rPr lang="en-GB" sz="1600" dirty="0" smtClean="0">
-                <a:solidFill>
-                  <a:srgbClr val="FF0000"/>
-                </a:solidFill>
-              </a:rPr>
-              <a:t>&lt;model name&gt;_</a:t>
-            </a:r>
-            <a:r>
-              <a:rPr lang="en-GB" sz="1600" dirty="0" err="1" smtClean="0">
-                <a:solidFill>
-                  <a:srgbClr val="FF0000"/>
-                </a:solidFill>
-              </a:rPr>
-              <a:t>model_data</a:t>
-            </a:r>
-            <a:endParaRPr lang="en-GB" sz="1600" dirty="0" smtClean="0">
-              <a:solidFill>
-                <a:srgbClr val="FF0000"/>
-              </a:solidFill>
-            </a:endParaRPr>
-          </a:p>
-          <a:p>
-            <a:pPr algn="ctr"/>
-            <a:r>
-              <a:rPr lang="en-GB" sz="1600" dirty="0" smtClean="0">
-                <a:solidFill>
-                  <a:schemeClr val="tx1"/>
-                </a:solidFill>
-              </a:rPr>
-              <a:t>For each model</a:t>
-            </a:r>
-            <a:endParaRPr lang="en-GB" sz="1600" dirty="0">
-              <a:solidFill>
-                <a:schemeClr val="tx1"/>
-              </a:solidFill>
-            </a:endParaRPr>
-          </a:p>
-        </p:txBody>
-      </p:sp>
-      <p:sp>
-        <p:nvSpPr>
-          <p:cNvPr id="19" name="Rounded Rectangle 18"/>
-          <p:cNvSpPr/>
-          <p:nvPr/>
-        </p:nvSpPr>
-        <p:spPr>
-          <a:xfrm>
-            <a:off x="7377457" y="3718000"/>
-            <a:ext cx="2016224" cy="909352"/>
-          </a:xfrm>
-          <a:prstGeom prst="roundRect">
-            <a:avLst/>
-          </a:prstGeom>
-          <a:noFill/>
-          <a:ln>
-            <a:solidFill>
-              <a:schemeClr val="tx1"/>
-            </a:solidFill>
-          </a:ln>
-        </p:spPr>
-        <p:style>
-          <a:lnRef idx="2">
-            <a:schemeClr val="accent1">
-              <a:shade val="50000"/>
-            </a:schemeClr>
-          </a:lnRef>
-          <a:fillRef idx="1">
-            <a:schemeClr val="accent1"/>
-          </a:fillRef>
-          <a:effectRef idx="0">
-            <a:schemeClr val="accent1"/>
-          </a:effectRef>
-          <a:fontRef idx="minor">
-            <a:schemeClr val="lt1"/>
-          </a:fontRef>
-        </p:style>
-        <p:txBody>
-          <a:bodyPr lIns="128016" tIns="64008" rIns="128016" bIns="64008" spcCol="0" rtlCol="0" anchor="ctr"/>
-          <a:lstStyle/>
-          <a:p>
-            <a:pPr algn="ctr"/>
-            <a:endParaRPr lang="en-GB" dirty="0" smtClean="0">
-              <a:solidFill>
-                <a:schemeClr val="tx1"/>
-              </a:solidFill>
-            </a:endParaRPr>
-          </a:p>
-          <a:p>
-            <a:pPr algn="ctr"/>
-            <a:r>
-              <a:rPr lang="en-GB" sz="1600" dirty="0" smtClean="0">
-                <a:solidFill>
-                  <a:schemeClr val="tx1"/>
-                </a:solidFill>
-              </a:rPr>
-              <a:t>Specify the port definitions</a:t>
-            </a:r>
-          </a:p>
-          <a:p>
-            <a:pPr algn="ctr"/>
-            <a:r>
-              <a:rPr lang="en-GB" sz="1700" dirty="0">
-                <a:solidFill>
-                  <a:srgbClr val="00B0F0"/>
-                </a:solidFill>
-              </a:rPr>
-              <a:t>Port-definition.txt</a:t>
-            </a:r>
-          </a:p>
-          <a:p>
-            <a:pPr algn="ctr"/>
-            <a:endParaRPr lang="en-GB" dirty="0">
-              <a:solidFill>
-                <a:schemeClr val="tx1"/>
-              </a:solidFill>
-            </a:endParaRPr>
-          </a:p>
-        </p:txBody>
-      </p:sp>
-      <p:sp>
-        <p:nvSpPr>
           <p:cNvPr id="20" name="Rounded Rectangle 19"/>
           <p:cNvSpPr/>
           <p:nvPr/>
         </p:nvSpPr>
         <p:spPr>
           <a:xfrm>
-            <a:off x="3094027" y="2533217"/>
+            <a:off x="3706028" y="2646653"/>
             <a:ext cx="2952328" cy="945835"/>
           </a:xfrm>
           <a:prstGeom prst="roundRect">
@@ -4059,23 +3889,7 @@
                   <a:schemeClr val="tx1"/>
                 </a:solidFill>
               </a:rPr>
-              <a:t>Define the material </a:t>
-            </a:r>
-            <a:r>
-              <a:rPr lang="en-GB" sz="1600" dirty="0" smtClean="0">
-                <a:solidFill>
-                  <a:schemeClr val="tx1"/>
-                </a:solidFill>
-              </a:rPr>
-              <a:t>mapping of </a:t>
-            </a:r>
-            <a:r>
-              <a:rPr lang="en-GB" sz="1600" dirty="0" smtClean="0">
-                <a:solidFill>
-                  <a:schemeClr val="tx1"/>
-                </a:solidFill>
-              </a:rPr>
-              <a:t>each STL part</a:t>
+              <a:t>Define the material mapping of each STL part</a:t>
             </a:r>
           </a:p>
           <a:p>
@@ -4107,7 +3921,7 @@
         </p:nvSpPr>
         <p:spPr>
           <a:xfrm>
-            <a:off x="6891622" y="2547750"/>
+            <a:off x="6959945" y="2671131"/>
             <a:ext cx="2502059" cy="921357"/>
           </a:xfrm>
           <a:prstGeom prst="roundRect">
@@ -4284,29 +4098,8 @@
                   <a:schemeClr val="tx1"/>
                 </a:solidFill>
               </a:rPr>
-              <a:t>Specify </a:t>
-            </a:r>
-            <a:r>
-              <a:rPr lang="en-GB" sz="1600" dirty="0" smtClean="0">
-                <a:solidFill>
-                  <a:schemeClr val="tx1"/>
-                </a:solidFill>
-              </a:rPr>
-              <a:t>geometric parameter </a:t>
-            </a:r>
-            <a:r>
-              <a:rPr lang="en-GB" sz="1600" dirty="0" smtClean="0">
-                <a:solidFill>
-                  <a:schemeClr val="tx1"/>
-                </a:solidFill>
-              </a:rPr>
-              <a:t>sweeps</a:t>
-            </a:r>
-            <a:endParaRPr lang="en-GB" sz="1600" dirty="0" smtClean="0">
-              <a:solidFill>
-                <a:schemeClr val="tx1"/>
-              </a:solidFill>
-            </a:endParaRPr>
+              <a:t>Specify geometric parameter sweeps</a:t>
+            </a:r>
           </a:p>
           <a:p>
             <a:pPr marL="285750" indent="-285750">
@@ -4492,8 +4285,8 @@
         </p:nvSpPr>
         <p:spPr>
           <a:xfrm rot="6298412">
-            <a:off x="5951268" y="6904283"/>
-            <a:ext cx="897029" cy="685620"/>
+            <a:off x="5666904" y="6533871"/>
+            <a:ext cx="1663891" cy="685620"/>
           </a:xfrm>
           <a:prstGeom prst="rightArrow">
             <a:avLst>
@@ -4535,8 +4328,8 @@
         </p:nvSpPr>
         <p:spPr>
           <a:xfrm>
-            <a:off x="5996217" y="5657311"/>
-            <a:ext cx="3604983" cy="1067923"/>
+            <a:off x="4656584" y="3952528"/>
+            <a:ext cx="4800601" cy="1925571"/>
           </a:xfrm>
           <a:prstGeom prst="roundRect">
             <a:avLst/>
@@ -4595,6 +4388,39 @@
               <a:buChar char="•"/>
             </a:pPr>
             <a:r>
+              <a:rPr lang="en-GB" sz="1600" dirty="0">
+                <a:solidFill>
+                  <a:schemeClr val="tx1"/>
+                </a:solidFill>
+              </a:rPr>
+              <a:t>Specify the port definitions</a:t>
+            </a:r>
+          </a:p>
+          <a:p>
+            <a:pPr marL="285750" indent="-285750">
+              <a:buFont typeface="Arial" panose="020B0604020202020204" pitchFamily="34" charset="0"/>
+              <a:buChar char="•"/>
+            </a:pPr>
+            <a:r>
+              <a:rPr lang="en-GB" sz="1600" dirty="0" smtClean="0">
+                <a:solidFill>
+                  <a:schemeClr val="tx1"/>
+                </a:solidFill>
+              </a:rPr>
+              <a:t>Specify the geometry fractions to run (1, ½, ¼).</a:t>
+            </a:r>
+            <a:endParaRPr lang="en-GB" sz="1600" dirty="0" smtClean="0">
+              <a:solidFill>
+                <a:schemeClr val="tx1"/>
+              </a:solidFill>
+            </a:endParaRPr>
+          </a:p>
+          <a:p>
+            <a:pPr marL="285750" indent="-285750">
+              <a:buFont typeface="Arial" panose="020B0604020202020204" pitchFamily="34" charset="0"/>
+              <a:buChar char="•"/>
+            </a:pPr>
+            <a:r>
               <a:rPr lang="en-GB" sz="1600" dirty="0" smtClean="0">
                 <a:solidFill>
                   <a:schemeClr val="tx1"/>
@@ -4698,23 +4524,25 @@
       </p:sp>
       <p:cxnSp>
         <p:nvCxnSpPr>
-          <p:cNvPr id="3" name="Straight Arrow Connector 2"/>
-          <p:cNvCxnSpPr>
-            <a:stCxn id="20" idx="2"/>
-            <a:endCxn id="18" idx="0"/>
-          </p:cNvCxnSpPr>
+          <p:cNvPr id="29" name="Straight Connector 28"/>
+          <p:cNvCxnSpPr/>
           <p:nvPr/>
         </p:nvCxnSpPr>
         <p:spPr>
           <a:xfrm>
-            <a:off x="4570191" y="3479052"/>
-            <a:ext cx="1694463" cy="1265564"/>
+            <a:off x="2496344" y="2512368"/>
+            <a:ext cx="7272808" cy="0"/>
           </a:xfrm>
-          <a:prstGeom prst="straightConnector1">
+          <a:prstGeom prst="line">
             <a:avLst/>
           </a:prstGeom>
-          <a:ln>
-            <a:tailEnd type="arrow"/>
+          <a:ln w="25400">
+            <a:solidFill>
+              <a:schemeClr val="bg1">
+                <a:lumMod val="95000"/>
+              </a:schemeClr>
+            </a:solidFill>
+            <a:prstDash val="dash"/>
           </a:ln>
         </p:spPr>
         <p:style>
@@ -4734,86 +4562,14 @@
       </p:cxnSp>
       <p:cxnSp>
         <p:nvCxnSpPr>
-          <p:cNvPr id="14" name="Straight Arrow Connector 13"/>
-          <p:cNvCxnSpPr>
-            <a:stCxn id="21" idx="1"/>
-            <a:endCxn id="18" idx="0"/>
-          </p:cNvCxnSpPr>
-          <p:nvPr/>
-        </p:nvCxnSpPr>
-        <p:spPr>
-          <a:xfrm flipH="1">
-            <a:off x="6264654" y="3008429"/>
-            <a:ext cx="626968" cy="1736187"/>
-          </a:xfrm>
-          <a:prstGeom prst="straightConnector1">
-            <a:avLst/>
-          </a:prstGeom>
-          <a:ln>
-            <a:tailEnd type="arrow"/>
-          </a:ln>
-        </p:spPr>
-        <p:style>
-          <a:lnRef idx="1">
-            <a:schemeClr val="accent1"/>
-          </a:lnRef>
-          <a:fillRef idx="0">
-            <a:schemeClr val="accent1"/>
-          </a:fillRef>
-          <a:effectRef idx="0">
-            <a:schemeClr val="accent1"/>
-          </a:effectRef>
-          <a:fontRef idx="minor">
-            <a:schemeClr val="tx1"/>
-          </a:fontRef>
-        </p:style>
-      </p:cxnSp>
-      <p:cxnSp>
-        <p:nvCxnSpPr>
-          <p:cNvPr id="16" name="Straight Arrow Connector 15"/>
-          <p:cNvCxnSpPr>
-            <a:stCxn id="19" idx="1"/>
-            <a:endCxn id="18" idx="0"/>
-          </p:cNvCxnSpPr>
-          <p:nvPr/>
-        </p:nvCxnSpPr>
-        <p:spPr>
-          <a:xfrm flipH="1">
-            <a:off x="6264654" y="4172676"/>
-            <a:ext cx="1112803" cy="571940"/>
-          </a:xfrm>
-          <a:prstGeom prst="straightConnector1">
-            <a:avLst/>
-          </a:prstGeom>
-          <a:ln>
-            <a:tailEnd type="arrow"/>
-          </a:ln>
-        </p:spPr>
-        <p:style>
-          <a:lnRef idx="1">
-            <a:schemeClr val="accent1"/>
-          </a:lnRef>
-          <a:fillRef idx="0">
-            <a:schemeClr val="accent1"/>
-          </a:fillRef>
-          <a:effectRef idx="0">
-            <a:schemeClr val="accent1"/>
-          </a:effectRef>
-          <a:fontRef idx="minor">
-            <a:schemeClr val="tx1"/>
-          </a:fontRef>
-        </p:style>
-      </p:cxnSp>
-      <p:cxnSp>
-        <p:nvCxnSpPr>
-          <p:cNvPr id="29" name="Straight Connector 28"/>
+          <p:cNvPr id="27" name="Straight Connector 26"/>
           <p:cNvCxnSpPr/>
           <p:nvPr/>
         </p:nvCxnSpPr>
         <p:spPr>
           <a:xfrm>
-            <a:off x="2496344" y="2440360"/>
-            <a:ext cx="7272808" cy="0"/>
+            <a:off x="3288432" y="3736504"/>
+            <a:ext cx="6633120" cy="0"/>
           </a:xfrm>
           <a:prstGeom prst="line">
             <a:avLst/>

</xml_diff>

<commit_message>
Modified framework to specify the STL to part mapping in the Matlab file rather than a separate text file.
</commit_message>
<xml_diff>
--- a/Documentation/Workflow_diagram.pptx
+++ b/Documentation/Workflow_diagram.pptx
@@ -3835,93 +3835,13 @@
       </p:sp>
       <p:sp>
         <p:nvSpPr>
-          <p:cNvPr id="20" name="Rounded Rectangle 19"/>
-          <p:cNvSpPr/>
-          <p:nvPr/>
-        </p:nvSpPr>
-        <p:spPr>
-          <a:xfrm>
-            <a:off x="3706028" y="2646653"/>
-            <a:ext cx="2952328" cy="945835"/>
-          </a:xfrm>
-          <a:prstGeom prst="roundRect">
-            <a:avLst/>
-          </a:prstGeom>
-          <a:noFill/>
-          <a:ln>
-            <a:solidFill>
-              <a:schemeClr val="tx1"/>
-            </a:solidFill>
-          </a:ln>
-        </p:spPr>
-        <p:style>
-          <a:lnRef idx="2">
-            <a:schemeClr val="accent1">
-              <a:shade val="50000"/>
-            </a:schemeClr>
-          </a:lnRef>
-          <a:fillRef idx="1">
-            <a:schemeClr val="accent1"/>
-          </a:fillRef>
-          <a:effectRef idx="0">
-            <a:schemeClr val="accent1"/>
-          </a:effectRef>
-          <a:fontRef idx="minor">
-            <a:schemeClr val="lt1"/>
-          </a:fontRef>
-        </p:style>
-        <p:txBody>
-          <a:bodyPr lIns="128016" tIns="64008" rIns="128016" bIns="64008" spcCol="0" rtlCol="0" anchor="ctr"/>
-          <a:lstStyle/>
-          <a:p>
-            <a:pPr algn="ctr"/>
-            <a:endParaRPr lang="en-GB" dirty="0" smtClean="0">
-              <a:solidFill>
-                <a:schemeClr val="tx1"/>
-              </a:solidFill>
-            </a:endParaRPr>
-          </a:p>
-          <a:p>
-            <a:pPr algn="ctr"/>
-            <a:r>
-              <a:rPr lang="en-GB" sz="1600" dirty="0" smtClean="0">
-                <a:solidFill>
-                  <a:schemeClr val="tx1"/>
-                </a:solidFill>
-              </a:rPr>
-              <a:t>Define the material mapping of each STL part</a:t>
-            </a:r>
-          </a:p>
-          <a:p>
-            <a:pPr algn="ctr"/>
-            <a:r>
-              <a:rPr lang="en-GB" sz="1700" dirty="0">
-                <a:solidFill>
-                  <a:srgbClr val="00B0F0"/>
-                </a:solidFill>
-              </a:rPr>
-              <a:t>Geometry-material_map.txt</a:t>
-            </a:r>
-          </a:p>
-          <a:p>
-            <a:pPr algn="ctr"/>
-            <a:endParaRPr lang="en-GB" dirty="0">
-              <a:solidFill>
-                <a:schemeClr val="tx1"/>
-              </a:solidFill>
-            </a:endParaRPr>
-          </a:p>
-        </p:txBody>
-      </p:sp>
-      <p:sp>
-        <p:nvSpPr>
           <p:cNvPr id="21" name="Rounded Rectangle 20"/>
           <p:cNvSpPr/>
           <p:nvPr/>
         </p:nvSpPr>
         <p:spPr>
           <a:xfrm>
-            <a:off x="6959945" y="2671131"/>
+            <a:off x="5581424" y="2684680"/>
             <a:ext cx="2502059" cy="921357"/>
           </a:xfrm>
           <a:prstGeom prst="roundRect">
@@ -4379,35 +4299,15 @@
                   <a:schemeClr val="tx1"/>
                 </a:solidFill>
               </a:rPr>
-              <a:t>Define the material of parts</a:t>
-            </a:r>
-          </a:p>
-          <a:p>
-            <a:pPr marL="285750" indent="-285750">
-              <a:buFont typeface="Arial" panose="020B0604020202020204" pitchFamily="34" charset="0"/>
-              <a:buChar char="•"/>
-            </a:pPr>
-            <a:r>
-              <a:rPr lang="en-GB" sz="1600" dirty="0">
+              <a:t>Define the material mapping of each STL </a:t>
+            </a:r>
+            <a:r>
+              <a:rPr lang="en-GB" sz="1600" dirty="0" smtClean="0">
                 <a:solidFill>
                   <a:schemeClr val="tx1"/>
                 </a:solidFill>
               </a:rPr>
-              <a:t>Specify the port definitions</a:t>
-            </a:r>
-          </a:p>
-          <a:p>
-            <a:pPr marL="285750" indent="-285750">
-              <a:buFont typeface="Arial" panose="020B0604020202020204" pitchFamily="34" charset="0"/>
-              <a:buChar char="•"/>
-            </a:pPr>
-            <a:r>
-              <a:rPr lang="en-GB" sz="1600" dirty="0" smtClean="0">
-                <a:solidFill>
-                  <a:schemeClr val="tx1"/>
-                </a:solidFill>
-              </a:rPr>
-              <a:t>Specify the geometry fractions to run (1, ½, ¼).</a:t>
+              <a:t>part</a:t>
             </a:r>
             <a:endParaRPr lang="en-GB" sz="1600" dirty="0" smtClean="0">
               <a:solidFill>
@@ -4426,15 +4326,57 @@
                   <a:schemeClr val="tx1"/>
                 </a:solidFill>
               </a:rPr>
-              <a:t>Specify </a:t>
-            </a:r>
+              <a:t>Define </a:t>
+            </a:r>
+            <a:r>
+              <a:rPr lang="en-GB" sz="1600" dirty="0">
+                <a:solidFill>
+                  <a:schemeClr val="tx1"/>
+                </a:solidFill>
+              </a:rPr>
+              <a:t>the material of parts</a:t>
+            </a:r>
+          </a:p>
+          <a:p>
+            <a:pPr marL="285750" indent="-285750">
+              <a:buFont typeface="Arial" panose="020B0604020202020204" pitchFamily="34" charset="0"/>
+              <a:buChar char="•"/>
+            </a:pPr>
+            <a:r>
+              <a:rPr lang="en-GB" sz="1600" dirty="0">
+                <a:solidFill>
+                  <a:schemeClr val="tx1"/>
+                </a:solidFill>
+              </a:rPr>
+              <a:t>Specify the port definitions</a:t>
+            </a:r>
+          </a:p>
+          <a:p>
+            <a:pPr marL="285750" indent="-285750">
+              <a:buFont typeface="Arial" panose="020B0604020202020204" pitchFamily="34" charset="0"/>
+              <a:buChar char="•"/>
+            </a:pPr>
             <a:r>
               <a:rPr lang="en-GB" sz="1600" dirty="0" smtClean="0">
                 <a:solidFill>
                   <a:schemeClr val="tx1"/>
                 </a:solidFill>
               </a:rPr>
-              <a:t>material </a:t>
+              <a:t>Specify the geometry fractions to run (1, ½, ¼).</a:t>
+            </a:r>
+          </a:p>
+          <a:p>
+            <a:pPr marL="285750" indent="-285750">
+              <a:buFont typeface="Arial" panose="020B0604020202020204" pitchFamily="34" charset="0"/>
+              <a:buChar char="•"/>
+            </a:pPr>
+            <a:r>
+              <a:rPr lang="en-GB" sz="1600" dirty="0" smtClean="0">
+                <a:solidFill>
+                  <a:schemeClr val="tx1"/>
+                </a:solidFill>
+              </a:rPr>
+              <a:t>Specify material </a:t>
             </a:r>
             <a:r>
               <a:rPr lang="en-GB" sz="1600" dirty="0">

</xml_diff>

<commit_message>
Update Workflow_diagram.pptx Updated to reflect current usage.
</commit_message>
<xml_diff>
--- a/Documentation/Workflow_diagram.pptx
+++ b/Documentation/Workflow_diagram.pptx
@@ -161,7 +161,7 @@
           <a:lstStyle/>
           <a:p>
             <a:r>
-              <a:rPr lang="en-US" smtClean="0"/>
+              <a:rPr lang="en-US"/>
               <a:t>Click to edit Master title style</a:t>
             </a:r>
             <a:endParaRPr lang="en-GB"/>
@@ -280,7 +280,7 @@
           </a:lstStyle>
           <a:p>
             <a:r>
-              <a:rPr lang="en-US" smtClean="0"/>
+              <a:rPr lang="en-US"/>
               <a:t>Click to edit Master subtitle style</a:t>
             </a:r>
             <a:endParaRPr lang="en-GB"/>
@@ -304,7 +304,7 @@
           <a:p>
             <a:fld id="{8D11A79C-6258-4161-B717-EE8AC917D205}" type="datetimeFigureOut">
               <a:rPr lang="en-GB" smtClean="0"/>
-              <a:t>18/03/2019</a:t>
+              <a:t>12/06/2019</a:t>
             </a:fld>
             <a:endParaRPr lang="en-GB"/>
           </a:p>
@@ -398,7 +398,7 @@
           <a:lstStyle/>
           <a:p>
             <a:r>
-              <a:rPr lang="en-US" smtClean="0"/>
+              <a:rPr lang="en-US"/>
               <a:t>Click to edit Master title style</a:t>
             </a:r>
             <a:endParaRPr lang="en-GB"/>
@@ -422,35 +422,35 @@
           <a:p>
             <a:pPr lvl="0"/>
             <a:r>
-              <a:rPr lang="en-US" smtClean="0"/>
+              <a:rPr lang="en-US"/>
               <a:t>Click to edit Master text styles</a:t>
             </a:r>
           </a:p>
           <a:p>
             <a:pPr lvl="1"/>
             <a:r>
-              <a:rPr lang="en-US" smtClean="0"/>
+              <a:rPr lang="en-US"/>
               <a:t>Second level</a:t>
             </a:r>
           </a:p>
           <a:p>
             <a:pPr lvl="2"/>
             <a:r>
-              <a:rPr lang="en-US" smtClean="0"/>
+              <a:rPr lang="en-US"/>
               <a:t>Third level</a:t>
             </a:r>
           </a:p>
           <a:p>
             <a:pPr lvl="3"/>
             <a:r>
-              <a:rPr lang="en-US" smtClean="0"/>
+              <a:rPr lang="en-US"/>
               <a:t>Fourth level</a:t>
             </a:r>
           </a:p>
           <a:p>
             <a:pPr lvl="4"/>
             <a:r>
-              <a:rPr lang="en-US" smtClean="0"/>
+              <a:rPr lang="en-US"/>
               <a:t>Fifth level</a:t>
             </a:r>
             <a:endParaRPr lang="en-GB"/>
@@ -474,7 +474,7 @@
           <a:p>
             <a:fld id="{8D11A79C-6258-4161-B717-EE8AC917D205}" type="datetimeFigureOut">
               <a:rPr lang="en-GB" smtClean="0"/>
-              <a:t>18/03/2019</a:t>
+              <a:t>12/06/2019</a:t>
             </a:fld>
             <a:endParaRPr lang="en-GB"/>
           </a:p>
@@ -573,7 +573,7 @@
           <a:lstStyle/>
           <a:p>
             <a:r>
-              <a:rPr lang="en-US" smtClean="0"/>
+              <a:rPr lang="en-US"/>
               <a:t>Click to edit Master title style</a:t>
             </a:r>
             <a:endParaRPr lang="en-GB"/>
@@ -602,35 +602,35 @@
           <a:p>
             <a:pPr lvl="0"/>
             <a:r>
-              <a:rPr lang="en-US" smtClean="0"/>
+              <a:rPr lang="en-US"/>
               <a:t>Click to edit Master text styles</a:t>
             </a:r>
           </a:p>
           <a:p>
             <a:pPr lvl="1"/>
             <a:r>
-              <a:rPr lang="en-US" smtClean="0"/>
+              <a:rPr lang="en-US"/>
               <a:t>Second level</a:t>
             </a:r>
           </a:p>
           <a:p>
             <a:pPr lvl="2"/>
             <a:r>
-              <a:rPr lang="en-US" smtClean="0"/>
+              <a:rPr lang="en-US"/>
               <a:t>Third level</a:t>
             </a:r>
           </a:p>
           <a:p>
             <a:pPr lvl="3"/>
             <a:r>
-              <a:rPr lang="en-US" smtClean="0"/>
+              <a:rPr lang="en-US"/>
               <a:t>Fourth level</a:t>
             </a:r>
           </a:p>
           <a:p>
             <a:pPr lvl="4"/>
             <a:r>
-              <a:rPr lang="en-US" smtClean="0"/>
+              <a:rPr lang="en-US"/>
               <a:t>Fifth level</a:t>
             </a:r>
             <a:endParaRPr lang="en-GB"/>
@@ -654,7 +654,7 @@
           <a:p>
             <a:fld id="{8D11A79C-6258-4161-B717-EE8AC917D205}" type="datetimeFigureOut">
               <a:rPr lang="en-GB" smtClean="0"/>
-              <a:t>18/03/2019</a:t>
+              <a:t>12/06/2019</a:t>
             </a:fld>
             <a:endParaRPr lang="en-GB"/>
           </a:p>
@@ -748,7 +748,7 @@
           <a:lstStyle/>
           <a:p>
             <a:r>
-              <a:rPr lang="en-US" smtClean="0"/>
+              <a:rPr lang="en-US"/>
               <a:t>Click to edit Master title style</a:t>
             </a:r>
             <a:endParaRPr lang="en-GB"/>
@@ -772,35 +772,35 @@
           <a:p>
             <a:pPr lvl="0"/>
             <a:r>
-              <a:rPr lang="en-US" smtClean="0"/>
+              <a:rPr lang="en-US"/>
               <a:t>Click to edit Master text styles</a:t>
             </a:r>
           </a:p>
           <a:p>
             <a:pPr lvl="1"/>
             <a:r>
-              <a:rPr lang="en-US" smtClean="0"/>
+              <a:rPr lang="en-US"/>
               <a:t>Second level</a:t>
             </a:r>
           </a:p>
           <a:p>
             <a:pPr lvl="2"/>
             <a:r>
-              <a:rPr lang="en-US" smtClean="0"/>
+              <a:rPr lang="en-US"/>
               <a:t>Third level</a:t>
             </a:r>
           </a:p>
           <a:p>
             <a:pPr lvl="3"/>
             <a:r>
-              <a:rPr lang="en-US" smtClean="0"/>
+              <a:rPr lang="en-US"/>
               <a:t>Fourth level</a:t>
             </a:r>
           </a:p>
           <a:p>
             <a:pPr lvl="4"/>
             <a:r>
-              <a:rPr lang="en-US" smtClean="0"/>
+              <a:rPr lang="en-US"/>
               <a:t>Fifth level</a:t>
             </a:r>
             <a:endParaRPr lang="en-GB"/>
@@ -824,7 +824,7 @@
           <a:p>
             <a:fld id="{8D11A79C-6258-4161-B717-EE8AC917D205}" type="datetimeFigureOut">
               <a:rPr lang="en-GB" smtClean="0"/>
-              <a:t>18/03/2019</a:t>
+              <a:t>12/06/2019</a:t>
             </a:fld>
             <a:endParaRPr lang="en-GB"/>
           </a:p>
@@ -927,7 +927,7 @@
           </a:lstStyle>
           <a:p>
             <a:r>
-              <a:rPr lang="en-US" smtClean="0"/>
+              <a:rPr lang="en-US"/>
               <a:t>Click to edit Master title style</a:t>
             </a:r>
             <a:endParaRPr lang="en-GB"/>
@@ -1047,7 +1047,7 @@
           <a:p>
             <a:pPr lvl="0"/>
             <a:r>
-              <a:rPr lang="en-US" smtClean="0"/>
+              <a:rPr lang="en-US"/>
               <a:t>Click to edit Master text styles</a:t>
             </a:r>
           </a:p>
@@ -1070,7 +1070,7 @@
           <a:p>
             <a:fld id="{8D11A79C-6258-4161-B717-EE8AC917D205}" type="datetimeFigureOut">
               <a:rPr lang="en-GB" smtClean="0"/>
-              <a:t>18/03/2019</a:t>
+              <a:t>12/06/2019</a:t>
             </a:fld>
             <a:endParaRPr lang="en-GB"/>
           </a:p>
@@ -1164,7 +1164,7 @@
           <a:lstStyle/>
           <a:p>
             <a:r>
-              <a:rPr lang="en-US" smtClean="0"/>
+              <a:rPr lang="en-US"/>
               <a:t>Click to edit Master title style</a:t>
             </a:r>
             <a:endParaRPr lang="en-GB"/>
@@ -1221,35 +1221,35 @@
           <a:p>
             <a:pPr lvl="0"/>
             <a:r>
-              <a:rPr lang="en-US" smtClean="0"/>
+              <a:rPr lang="en-US"/>
               <a:t>Click to edit Master text styles</a:t>
             </a:r>
           </a:p>
           <a:p>
             <a:pPr lvl="1"/>
             <a:r>
-              <a:rPr lang="en-US" smtClean="0"/>
+              <a:rPr lang="en-US"/>
               <a:t>Second level</a:t>
             </a:r>
           </a:p>
           <a:p>
             <a:pPr lvl="2"/>
             <a:r>
-              <a:rPr lang="en-US" smtClean="0"/>
+              <a:rPr lang="en-US"/>
               <a:t>Third level</a:t>
             </a:r>
           </a:p>
           <a:p>
             <a:pPr lvl="3"/>
             <a:r>
-              <a:rPr lang="en-US" smtClean="0"/>
+              <a:rPr lang="en-US"/>
               <a:t>Fourth level</a:t>
             </a:r>
           </a:p>
           <a:p>
             <a:pPr lvl="4"/>
             <a:r>
-              <a:rPr lang="en-US" smtClean="0"/>
+              <a:rPr lang="en-US"/>
               <a:t>Fifth level</a:t>
             </a:r>
             <a:endParaRPr lang="en-GB"/>
@@ -1306,35 +1306,35 @@
           <a:p>
             <a:pPr lvl="0"/>
             <a:r>
-              <a:rPr lang="en-US" smtClean="0"/>
+              <a:rPr lang="en-US"/>
               <a:t>Click to edit Master text styles</a:t>
             </a:r>
           </a:p>
           <a:p>
             <a:pPr lvl="1"/>
             <a:r>
-              <a:rPr lang="en-US" smtClean="0"/>
+              <a:rPr lang="en-US"/>
               <a:t>Second level</a:t>
             </a:r>
           </a:p>
           <a:p>
             <a:pPr lvl="2"/>
             <a:r>
-              <a:rPr lang="en-US" smtClean="0"/>
+              <a:rPr lang="en-US"/>
               <a:t>Third level</a:t>
             </a:r>
           </a:p>
           <a:p>
             <a:pPr lvl="3"/>
             <a:r>
-              <a:rPr lang="en-US" smtClean="0"/>
+              <a:rPr lang="en-US"/>
               <a:t>Fourth level</a:t>
             </a:r>
           </a:p>
           <a:p>
             <a:pPr lvl="4"/>
             <a:r>
-              <a:rPr lang="en-US" smtClean="0"/>
+              <a:rPr lang="en-US"/>
               <a:t>Fifth level</a:t>
             </a:r>
             <a:endParaRPr lang="en-GB"/>
@@ -1358,7 +1358,7 @@
           <a:p>
             <a:fld id="{8D11A79C-6258-4161-B717-EE8AC917D205}" type="datetimeFigureOut">
               <a:rPr lang="en-GB" smtClean="0"/>
-              <a:t>18/03/2019</a:t>
+              <a:t>12/06/2019</a:t>
             </a:fld>
             <a:endParaRPr lang="en-GB"/>
           </a:p>
@@ -1456,7 +1456,7 @@
           </a:lstStyle>
           <a:p>
             <a:r>
-              <a:rPr lang="en-US" smtClean="0"/>
+              <a:rPr lang="en-US"/>
               <a:t>Click to edit Master title style</a:t>
             </a:r>
             <a:endParaRPr lang="en-GB"/>
@@ -1522,7 +1522,7 @@
           <a:p>
             <a:pPr lvl="0"/>
             <a:r>
-              <a:rPr lang="en-US" smtClean="0"/>
+              <a:rPr lang="en-US"/>
               <a:t>Click to edit Master text styles</a:t>
             </a:r>
           </a:p>
@@ -1578,35 +1578,35 @@
           <a:p>
             <a:pPr lvl="0"/>
             <a:r>
-              <a:rPr lang="en-US" smtClean="0"/>
+              <a:rPr lang="en-US"/>
               <a:t>Click to edit Master text styles</a:t>
             </a:r>
           </a:p>
           <a:p>
             <a:pPr lvl="1"/>
             <a:r>
-              <a:rPr lang="en-US" smtClean="0"/>
+              <a:rPr lang="en-US"/>
               <a:t>Second level</a:t>
             </a:r>
           </a:p>
           <a:p>
             <a:pPr lvl="2"/>
             <a:r>
-              <a:rPr lang="en-US" smtClean="0"/>
+              <a:rPr lang="en-US"/>
               <a:t>Third level</a:t>
             </a:r>
           </a:p>
           <a:p>
             <a:pPr lvl="3"/>
             <a:r>
-              <a:rPr lang="en-US" smtClean="0"/>
+              <a:rPr lang="en-US"/>
               <a:t>Fourth level</a:t>
             </a:r>
           </a:p>
           <a:p>
             <a:pPr lvl="4"/>
             <a:r>
-              <a:rPr lang="en-US" smtClean="0"/>
+              <a:rPr lang="en-US"/>
               <a:t>Fifth level</a:t>
             </a:r>
             <a:endParaRPr lang="en-GB"/>
@@ -1672,7 +1672,7 @@
           <a:p>
             <a:pPr lvl="0"/>
             <a:r>
-              <a:rPr lang="en-US" smtClean="0"/>
+              <a:rPr lang="en-US"/>
               <a:t>Click to edit Master text styles</a:t>
             </a:r>
           </a:p>
@@ -1728,35 +1728,35 @@
           <a:p>
             <a:pPr lvl="0"/>
             <a:r>
-              <a:rPr lang="en-US" smtClean="0"/>
+              <a:rPr lang="en-US"/>
               <a:t>Click to edit Master text styles</a:t>
             </a:r>
           </a:p>
           <a:p>
             <a:pPr lvl="1"/>
             <a:r>
-              <a:rPr lang="en-US" smtClean="0"/>
+              <a:rPr lang="en-US"/>
               <a:t>Second level</a:t>
             </a:r>
           </a:p>
           <a:p>
             <a:pPr lvl="2"/>
             <a:r>
-              <a:rPr lang="en-US" smtClean="0"/>
+              <a:rPr lang="en-US"/>
               <a:t>Third level</a:t>
             </a:r>
           </a:p>
           <a:p>
             <a:pPr lvl="3"/>
             <a:r>
-              <a:rPr lang="en-US" smtClean="0"/>
+              <a:rPr lang="en-US"/>
               <a:t>Fourth level</a:t>
             </a:r>
           </a:p>
           <a:p>
             <a:pPr lvl="4"/>
             <a:r>
-              <a:rPr lang="en-US" smtClean="0"/>
+              <a:rPr lang="en-US"/>
               <a:t>Fifth level</a:t>
             </a:r>
             <a:endParaRPr lang="en-GB"/>
@@ -1780,7 +1780,7 @@
           <a:p>
             <a:fld id="{8D11A79C-6258-4161-B717-EE8AC917D205}" type="datetimeFigureOut">
               <a:rPr lang="en-GB" smtClean="0"/>
-              <a:t>18/03/2019</a:t>
+              <a:t>12/06/2019</a:t>
             </a:fld>
             <a:endParaRPr lang="en-GB"/>
           </a:p>
@@ -1874,7 +1874,7 @@
           <a:lstStyle/>
           <a:p>
             <a:r>
-              <a:rPr lang="en-US" smtClean="0"/>
+              <a:rPr lang="en-US"/>
               <a:t>Click to edit Master title style</a:t>
             </a:r>
             <a:endParaRPr lang="en-GB"/>
@@ -1898,7 +1898,7 @@
           <a:p>
             <a:fld id="{8D11A79C-6258-4161-B717-EE8AC917D205}" type="datetimeFigureOut">
               <a:rPr lang="en-GB" smtClean="0"/>
-              <a:t>18/03/2019</a:t>
+              <a:t>12/06/2019</a:t>
             </a:fld>
             <a:endParaRPr lang="en-GB"/>
           </a:p>
@@ -1993,7 +1993,7 @@
           <a:p>
             <a:fld id="{8D11A79C-6258-4161-B717-EE8AC917D205}" type="datetimeFigureOut">
               <a:rPr lang="en-GB" smtClean="0"/>
-              <a:t>18/03/2019</a:t>
+              <a:t>12/06/2019</a:t>
             </a:fld>
             <a:endParaRPr lang="en-GB"/>
           </a:p>
@@ -2096,7 +2096,7 @@
           </a:lstStyle>
           <a:p>
             <a:r>
-              <a:rPr lang="en-US" smtClean="0"/>
+              <a:rPr lang="en-US"/>
               <a:t>Click to edit Master title style</a:t>
             </a:r>
             <a:endParaRPr lang="en-GB"/>
@@ -2153,35 +2153,35 @@
           <a:p>
             <a:pPr lvl="0"/>
             <a:r>
-              <a:rPr lang="en-US" smtClean="0"/>
+              <a:rPr lang="en-US"/>
               <a:t>Click to edit Master text styles</a:t>
             </a:r>
           </a:p>
           <a:p>
             <a:pPr lvl="1"/>
             <a:r>
-              <a:rPr lang="en-US" smtClean="0"/>
+              <a:rPr lang="en-US"/>
               <a:t>Second level</a:t>
             </a:r>
           </a:p>
           <a:p>
             <a:pPr lvl="2"/>
             <a:r>
-              <a:rPr lang="en-US" smtClean="0"/>
+              <a:rPr lang="en-US"/>
               <a:t>Third level</a:t>
             </a:r>
           </a:p>
           <a:p>
             <a:pPr lvl="3"/>
             <a:r>
-              <a:rPr lang="en-US" smtClean="0"/>
+              <a:rPr lang="en-US"/>
               <a:t>Fourth level</a:t>
             </a:r>
           </a:p>
           <a:p>
             <a:pPr lvl="4"/>
             <a:r>
-              <a:rPr lang="en-US" smtClean="0"/>
+              <a:rPr lang="en-US"/>
               <a:t>Fifth level</a:t>
             </a:r>
             <a:endParaRPr lang="en-GB"/>
@@ -2247,7 +2247,7 @@
           <a:p>
             <a:pPr lvl="0"/>
             <a:r>
-              <a:rPr lang="en-US" smtClean="0"/>
+              <a:rPr lang="en-US"/>
               <a:t>Click to edit Master text styles</a:t>
             </a:r>
           </a:p>
@@ -2270,7 +2270,7 @@
           <a:p>
             <a:fld id="{8D11A79C-6258-4161-B717-EE8AC917D205}" type="datetimeFigureOut">
               <a:rPr lang="en-GB" smtClean="0"/>
-              <a:t>18/03/2019</a:t>
+              <a:t>12/06/2019</a:t>
             </a:fld>
             <a:endParaRPr lang="en-GB"/>
           </a:p>
@@ -2373,7 +2373,7 @@
           </a:lstStyle>
           <a:p>
             <a:r>
-              <a:rPr lang="en-US" smtClean="0"/>
+              <a:rPr lang="en-US"/>
               <a:t>Click to edit Master title style</a:t>
             </a:r>
             <a:endParaRPr lang="en-GB"/>
@@ -2500,7 +2500,7 @@
           <a:p>
             <a:pPr lvl="0"/>
             <a:r>
-              <a:rPr lang="en-US" smtClean="0"/>
+              <a:rPr lang="en-US"/>
               <a:t>Click to edit Master text styles</a:t>
             </a:r>
           </a:p>
@@ -2523,7 +2523,7 @@
           <a:p>
             <a:fld id="{8D11A79C-6258-4161-B717-EE8AC917D205}" type="datetimeFigureOut">
               <a:rPr lang="en-GB" smtClean="0"/>
-              <a:t>18/03/2019</a:t>
+              <a:t>12/06/2019</a:t>
             </a:fld>
             <a:endParaRPr lang="en-GB"/>
           </a:p>
@@ -2632,7 +2632,7 @@
           <a:lstStyle/>
           <a:p>
             <a:r>
-              <a:rPr lang="en-US" smtClean="0"/>
+              <a:rPr lang="en-US"/>
               <a:t>Click to edit Master title style</a:t>
             </a:r>
             <a:endParaRPr lang="en-GB"/>
@@ -2666,35 +2666,35 @@
           <a:p>
             <a:pPr lvl="0"/>
             <a:r>
-              <a:rPr lang="en-US" smtClean="0"/>
+              <a:rPr lang="en-US"/>
               <a:t>Click to edit Master text styles</a:t>
             </a:r>
           </a:p>
           <a:p>
             <a:pPr lvl="1"/>
             <a:r>
-              <a:rPr lang="en-US" smtClean="0"/>
+              <a:rPr lang="en-US"/>
               <a:t>Second level</a:t>
             </a:r>
           </a:p>
           <a:p>
             <a:pPr lvl="2"/>
             <a:r>
-              <a:rPr lang="en-US" smtClean="0"/>
+              <a:rPr lang="en-US"/>
               <a:t>Third level</a:t>
             </a:r>
           </a:p>
           <a:p>
             <a:pPr lvl="3"/>
             <a:r>
-              <a:rPr lang="en-US" smtClean="0"/>
+              <a:rPr lang="en-US"/>
               <a:t>Fourth level</a:t>
             </a:r>
           </a:p>
           <a:p>
             <a:pPr lvl="4"/>
             <a:r>
-              <a:rPr lang="en-US" smtClean="0"/>
+              <a:rPr lang="en-US"/>
               <a:t>Fifth level</a:t>
             </a:r>
             <a:endParaRPr lang="en-GB"/>
@@ -2736,7 +2736,7 @@
           <a:p>
             <a:fld id="{8D11A79C-6258-4161-B717-EE8AC917D205}" type="datetimeFigureOut">
               <a:rPr lang="en-GB" smtClean="0"/>
-              <a:t>18/03/2019</a:t>
+              <a:t>12/06/2019</a:t>
             </a:fld>
             <a:endParaRPr lang="en-GB"/>
           </a:p>
@@ -3113,68 +3113,24 @@
       </p:grpSpPr>
       <p:sp>
         <p:nvSpPr>
-          <p:cNvPr id="23" name="Rounded Rectangle 22"/>
-          <p:cNvSpPr/>
-          <p:nvPr/>
-        </p:nvSpPr>
-        <p:spPr>
-          <a:xfrm>
-            <a:off x="5016624" y="8705056"/>
-            <a:ext cx="3285117" cy="2664296"/>
-          </a:xfrm>
-          <a:prstGeom prst="roundRect">
-            <a:avLst/>
-          </a:prstGeom>
-          <a:solidFill>
-            <a:schemeClr val="accent6">
-              <a:lumMod val="60000"/>
-              <a:lumOff val="40000"/>
-            </a:schemeClr>
-          </a:solidFill>
-          <a:ln>
-            <a:noFill/>
-          </a:ln>
-        </p:spPr>
-        <p:style>
-          <a:lnRef idx="2">
-            <a:schemeClr val="accent1">
-              <a:shade val="50000"/>
-            </a:schemeClr>
-          </a:lnRef>
-          <a:fillRef idx="1">
-            <a:schemeClr val="accent1"/>
-          </a:fillRef>
-          <a:effectRef idx="0">
-            <a:schemeClr val="accent1"/>
-          </a:effectRef>
-          <a:fontRef idx="minor">
-            <a:schemeClr val="lt1"/>
-          </a:fontRef>
-        </p:style>
-        <p:txBody>
-          <a:bodyPr rtlCol="0" anchor="ctr"/>
-          <a:lstStyle/>
-          <a:p>
-            <a:pPr algn="ctr"/>
-            <a:endParaRPr lang="en-GB"/>
-          </a:p>
-        </p:txBody>
-      </p:sp>
-      <p:sp>
-        <p:nvSpPr>
           <p:cNvPr id="4" name="TextBox 3"/>
           <p:cNvSpPr txBox="1"/>
           <p:nvPr/>
         </p:nvSpPr>
         <p:spPr>
           <a:xfrm>
-            <a:off x="43492" y="111227"/>
+            <a:off x="0" y="-5309"/>
             <a:ext cx="3376001" cy="517065"/>
           </a:xfrm>
           <a:prstGeom prst="rect">
             <a:avLst/>
           </a:prstGeom>
-          <a:noFill/>
+          <a:solidFill>
+            <a:schemeClr val="tx2">
+              <a:lumMod val="60000"/>
+              <a:lumOff val="40000"/>
+            </a:schemeClr>
+          </a:solidFill>
         </p:spPr>
         <p:txBody>
           <a:bodyPr wrap="none" lIns="128016" tIns="64008" rIns="128016" bIns="64008" rtlCol="0">
@@ -3183,10 +3139,9 @@
           <a:lstStyle/>
           <a:p>
             <a:r>
-              <a:rPr lang="en-GB" dirty="0" smtClean="0"/>
+              <a:rPr lang="en-GB" dirty="0"/>
               <a:t>EM modelling workflow</a:t>
             </a:r>
-            <a:endParaRPr lang="en-GB" dirty="0"/>
           </a:p>
         </p:txBody>
       </p:sp>
@@ -3236,7 +3191,7 @@
               <a:buChar char="•"/>
             </a:pPr>
             <a:r>
-              <a:rPr lang="en-GB" sz="1600" dirty="0" smtClean="0">
+              <a:rPr lang="en-GB" sz="1600" dirty="0">
                 <a:solidFill>
                   <a:schemeClr val="tx1"/>
                 </a:solidFill>
@@ -3250,7 +3205,7 @@
               <a:buChar char="•"/>
             </a:pPr>
             <a:r>
-              <a:rPr lang="en-GB" sz="1600" dirty="0" smtClean="0">
+              <a:rPr lang="en-GB" sz="1600" dirty="0">
                 <a:solidFill>
                   <a:schemeClr val="tx1"/>
                 </a:solidFill>
@@ -3269,21 +3224,8 @@
                   <a:schemeClr val="tx1"/>
                 </a:solidFill>
               </a:rPr>
-              <a:t>Specify the port </a:t>
-            </a:r>
-            <a:r>
-              <a:rPr lang="en-GB" sz="1600" dirty="0" smtClean="0">
-                <a:solidFill>
-                  <a:schemeClr val="tx1"/>
-                </a:solidFill>
-              </a:rPr>
-              <a:t>definitions</a:t>
-            </a:r>
-            <a:endParaRPr lang="en-GB" sz="1600" dirty="0">
-              <a:solidFill>
-                <a:schemeClr val="tx1"/>
-              </a:solidFill>
-            </a:endParaRPr>
+              <a:t>Specify the port definitions</a:t>
+            </a:r>
           </a:p>
           <a:p>
             <a:pPr marL="285750" indent="-285750">
@@ -3296,15 +3238,7 @@
                   <a:schemeClr val="tx1"/>
                 </a:solidFill>
               </a:rPr>
-              <a:t>Specify the mesh </a:t>
-            </a:r>
-            <a:r>
-              <a:rPr lang="en-GB" sz="1600" dirty="0" smtClean="0">
-                <a:solidFill>
-                  <a:schemeClr val="tx1"/>
-                </a:solidFill>
-              </a:rPr>
-              <a:t> definitions</a:t>
+              <a:t>Specify the mesh  definitions</a:t>
             </a:r>
           </a:p>
           <a:p>
@@ -3375,7 +3309,7 @@
           <a:p>
             <a:pPr algn="ctr"/>
             <a:r>
-              <a:rPr lang="en-GB" sz="1600" dirty="0" smtClean="0">
+              <a:rPr lang="en-GB" sz="1600" dirty="0">
                 <a:solidFill>
                   <a:schemeClr val="tx1"/>
                 </a:solidFill>
@@ -3398,14 +3332,14 @@
       </p:sp>
       <p:sp>
         <p:nvSpPr>
-          <p:cNvPr id="7" name="Rounded Rectangle 6"/>
+          <p:cNvPr id="8" name="Rounded Rectangle 7"/>
           <p:cNvSpPr/>
           <p:nvPr/>
         </p:nvSpPr>
         <p:spPr>
           <a:xfrm>
-            <a:off x="5277100" y="10570061"/>
-            <a:ext cx="2762712" cy="583267"/>
+            <a:off x="3936504" y="11657384"/>
+            <a:ext cx="2736304" cy="1008112"/>
           </a:xfrm>
           <a:prstGeom prst="roundRect">
             <a:avLst/>
@@ -3439,31 +3373,326 @@
           <a:p>
             <a:pPr algn="ctr"/>
             <a:r>
-              <a:rPr lang="en-GB" sz="1600" dirty="0" smtClean="0">
+              <a:rPr lang="en-GB" sz="1600" dirty="0">
                 <a:solidFill>
                   <a:schemeClr val="tx1"/>
                 </a:solidFill>
               </a:rPr>
-              <a:t>Generate reports</a:t>
+              <a:t>Generate overview reports for each parameter sweep</a:t>
+            </a:r>
+          </a:p>
+          <a:p>
+            <a:pPr algn="ctr"/>
+            <a:r>
+              <a:rPr lang="en-GB" sz="1600" dirty="0" err="1">
+                <a:solidFill>
+                  <a:srgbClr val="FF0000"/>
+                </a:solidFill>
+              </a:rPr>
+              <a:t>Blend_reports.m</a:t>
             </a:r>
             <a:endParaRPr lang="en-GB" sz="1600" dirty="0">
+              <a:solidFill>
+                <a:srgbClr val="FF0000"/>
+              </a:solidFill>
+            </a:endParaRPr>
+          </a:p>
+        </p:txBody>
+      </p:sp>
+      <p:grpSp>
+        <p:nvGrpSpPr>
+          <p:cNvPr id="15" name="Group 14">
+            <a:extLst>
+              <a:ext uri="{FF2B5EF4-FFF2-40B4-BE49-F238E27FC236}">
+                <a16:creationId xmlns:a16="http://schemas.microsoft.com/office/drawing/2014/main" id="{E450539A-8A26-4920-A419-A026F78C7021}"/>
+              </a:ext>
+            </a:extLst>
+          </p:cNvPr>
+          <p:cNvGrpSpPr/>
+          <p:nvPr/>
+        </p:nvGrpSpPr>
+        <p:grpSpPr>
+          <a:xfrm>
+            <a:off x="5189542" y="7839556"/>
+            <a:ext cx="2995434" cy="1873612"/>
+            <a:chOff x="5160640" y="8110775"/>
+            <a:chExt cx="2995434" cy="1873612"/>
+          </a:xfrm>
+        </p:grpSpPr>
+        <p:sp>
+          <p:nvSpPr>
+            <p:cNvPr id="23" name="Rounded Rectangle 22"/>
+            <p:cNvSpPr/>
+            <p:nvPr/>
+          </p:nvSpPr>
+          <p:spPr>
+            <a:xfrm>
+              <a:off x="5160640" y="8110775"/>
+              <a:ext cx="2995434" cy="1873612"/>
+            </a:xfrm>
+            <a:prstGeom prst="roundRect">
+              <a:avLst/>
+            </a:prstGeom>
+            <a:solidFill>
+              <a:schemeClr val="accent6">
+                <a:lumMod val="60000"/>
+                <a:lumOff val="40000"/>
+              </a:schemeClr>
+            </a:solidFill>
+            <a:ln>
+              <a:noFill/>
+            </a:ln>
+          </p:spPr>
+          <p:style>
+            <a:lnRef idx="2">
+              <a:schemeClr val="accent1">
+                <a:shade val="50000"/>
+              </a:schemeClr>
+            </a:lnRef>
+            <a:fillRef idx="1">
+              <a:schemeClr val="accent1"/>
+            </a:fillRef>
+            <a:effectRef idx="0">
+              <a:schemeClr val="accent1"/>
+            </a:effectRef>
+            <a:fontRef idx="minor">
+              <a:schemeClr val="lt1"/>
+            </a:fontRef>
+          </p:style>
+          <p:txBody>
+            <a:bodyPr rtlCol="0" anchor="ctr"/>
+            <a:lstStyle/>
+            <a:p>
+              <a:pPr algn="ctr"/>
+              <a:endParaRPr lang="en-GB" sz="1600" dirty="0">
+                <a:solidFill>
+                  <a:srgbClr val="FF0000"/>
+                </a:solidFill>
+              </a:endParaRPr>
+            </a:p>
+            <a:p>
+              <a:pPr algn="ctr"/>
+              <a:endParaRPr lang="en-GB" sz="1600" dirty="0">
+                <a:solidFill>
+                  <a:srgbClr val="FF0000"/>
+                </a:solidFill>
+              </a:endParaRPr>
+            </a:p>
+            <a:p>
+              <a:pPr algn="ctr"/>
+              <a:endParaRPr lang="en-GB" sz="1600" dirty="0">
+                <a:solidFill>
+                  <a:srgbClr val="FF0000"/>
+                </a:solidFill>
+              </a:endParaRPr>
+            </a:p>
+            <a:p>
+              <a:pPr algn="ctr"/>
+              <a:endParaRPr lang="en-GB" sz="1600" dirty="0">
+                <a:solidFill>
+                  <a:srgbClr val="FF0000"/>
+                </a:solidFill>
+              </a:endParaRPr>
+            </a:p>
+            <a:p>
+              <a:pPr algn="ctr"/>
+              <a:endParaRPr lang="en-GB" sz="1600" dirty="0">
+                <a:solidFill>
+                  <a:srgbClr val="FF0000"/>
+                </a:solidFill>
+              </a:endParaRPr>
+            </a:p>
+            <a:p>
+              <a:pPr algn="ctr"/>
+              <a:endParaRPr lang="en-GB" sz="1600" dirty="0">
+                <a:solidFill>
+                  <a:srgbClr val="FF0000"/>
+                </a:solidFill>
+              </a:endParaRPr>
+            </a:p>
+            <a:p>
+              <a:pPr algn="ctr"/>
+              <a:endParaRPr lang="en-GB" sz="1600" dirty="0">
+                <a:solidFill>
+                  <a:srgbClr val="FF0000"/>
+                </a:solidFill>
+              </a:endParaRPr>
+            </a:p>
+            <a:p>
+              <a:pPr algn="ctr"/>
+              <a:endParaRPr lang="en-GB" sz="1600" dirty="0">
+                <a:solidFill>
+                  <a:srgbClr val="FF0000"/>
+                </a:solidFill>
+              </a:endParaRPr>
+            </a:p>
+            <a:p>
+              <a:pPr algn="ctr"/>
+              <a:r>
+                <a:rPr lang="en-GB" sz="1600" dirty="0" err="1">
+                  <a:solidFill>
+                    <a:srgbClr val="FF0000"/>
+                  </a:solidFill>
+                </a:rPr>
+                <a:t>run_models.m</a:t>
+              </a:r>
+              <a:endParaRPr lang="en-GB" sz="1600" dirty="0">
+                <a:solidFill>
+                  <a:srgbClr val="FF0000"/>
+                </a:solidFill>
+              </a:endParaRPr>
+            </a:p>
+            <a:p>
+              <a:pPr algn="ctr"/>
+              <a:endParaRPr lang="en-GB" dirty="0"/>
+            </a:p>
+          </p:txBody>
+        </p:sp>
+        <p:sp>
+          <p:nvSpPr>
+            <p:cNvPr id="9" name="Rounded Rectangle 8"/>
+            <p:cNvSpPr/>
+            <p:nvPr/>
+          </p:nvSpPr>
+          <p:spPr>
+            <a:xfrm>
+              <a:off x="5347762" y="8871261"/>
+              <a:ext cx="2495077" cy="769899"/>
+            </a:xfrm>
+            <a:prstGeom prst="roundRect">
+              <a:avLst/>
+            </a:prstGeom>
+            <a:noFill/>
+            <a:ln>
               <a:solidFill>
                 <a:schemeClr val="tx1"/>
               </a:solidFill>
-            </a:endParaRPr>
-          </a:p>
-        </p:txBody>
-      </p:sp>
-      <p:sp>
-        <p:nvSpPr>
-          <p:cNvPr id="8" name="Rounded Rectangle 7"/>
+            </a:ln>
+          </p:spPr>
+          <p:style>
+            <a:lnRef idx="2">
+              <a:schemeClr val="accent1">
+                <a:shade val="50000"/>
+              </a:schemeClr>
+            </a:lnRef>
+            <a:fillRef idx="1">
+              <a:schemeClr val="accent1"/>
+            </a:fillRef>
+            <a:effectRef idx="0">
+              <a:schemeClr val="accent1"/>
+            </a:effectRef>
+            <a:fontRef idx="minor">
+              <a:schemeClr val="lt1"/>
+            </a:fontRef>
+          </p:style>
+          <p:txBody>
+            <a:bodyPr lIns="128016" tIns="64008" rIns="128016" bIns="64008" spcCol="0" rtlCol="0" anchor="ctr"/>
+            <a:lstStyle/>
+            <a:p>
+              <a:pPr algn="ctr"/>
+              <a:r>
+                <a:rPr lang="en-GB" sz="1600" dirty="0">
+                  <a:solidFill>
+                    <a:schemeClr val="tx1"/>
+                  </a:solidFill>
+                </a:rPr>
+                <a:t>Post process models</a:t>
+              </a:r>
+            </a:p>
+            <a:p>
+              <a:pPr algn="ctr"/>
+              <a:r>
+                <a:rPr lang="en-GB" sz="1400" dirty="0">
+                  <a:solidFill>
+                    <a:schemeClr val="tx2">
+                      <a:lumMod val="60000"/>
+                      <a:lumOff val="40000"/>
+                    </a:schemeClr>
+                  </a:solidFill>
+                </a:rPr>
+                <a:t>Results put into the report folder</a:t>
+              </a:r>
+            </a:p>
+          </p:txBody>
+        </p:sp>
+        <p:sp>
+          <p:nvSpPr>
+            <p:cNvPr id="11" name="Rounded Rectangle 10"/>
+            <p:cNvSpPr/>
+            <p:nvPr/>
+          </p:nvSpPr>
+          <p:spPr>
+            <a:xfrm>
+              <a:off x="5304656" y="8227989"/>
+              <a:ext cx="2601239" cy="554610"/>
+            </a:xfrm>
+            <a:prstGeom prst="roundRect">
+              <a:avLst/>
+            </a:prstGeom>
+            <a:noFill/>
+            <a:ln>
+              <a:solidFill>
+                <a:schemeClr val="tx1"/>
+              </a:solidFill>
+            </a:ln>
+          </p:spPr>
+          <p:style>
+            <a:lnRef idx="2">
+              <a:schemeClr val="accent1">
+                <a:shade val="50000"/>
+              </a:schemeClr>
+            </a:lnRef>
+            <a:fillRef idx="1">
+              <a:schemeClr val="accent1"/>
+            </a:fillRef>
+            <a:effectRef idx="0">
+              <a:schemeClr val="accent1"/>
+            </a:effectRef>
+            <a:fontRef idx="minor">
+              <a:schemeClr val="lt1"/>
+            </a:fontRef>
+          </p:style>
+          <p:txBody>
+            <a:bodyPr lIns="128016" tIns="64008" rIns="128016" bIns="64008" spcCol="0" rtlCol="0" anchor="ctr"/>
+            <a:lstStyle/>
+            <a:p>
+              <a:pPr algn="ctr"/>
+              <a:r>
+                <a:rPr lang="en-GB" sz="1600" dirty="0">
+                  <a:solidFill>
+                    <a:schemeClr val="tx1"/>
+                  </a:solidFill>
+                </a:rPr>
+                <a:t>Run models</a:t>
+              </a:r>
+            </a:p>
+            <a:p>
+              <a:pPr algn="ctr"/>
+              <a:r>
+                <a:rPr lang="en-GB" sz="1400" dirty="0">
+                  <a:solidFill>
+                    <a:schemeClr val="tx2">
+                      <a:lumMod val="60000"/>
+                      <a:lumOff val="40000"/>
+                    </a:schemeClr>
+                  </a:solidFill>
+                </a:rPr>
+                <a:t>Results put into the data folder</a:t>
+              </a:r>
+            </a:p>
+          </p:txBody>
+        </p:sp>
+      </p:grpSp>
+      <p:sp>
+        <p:nvSpPr>
+          <p:cNvPr id="12" name="Rounded Rectangle 11"/>
           <p:cNvSpPr/>
           <p:nvPr/>
         </p:nvSpPr>
         <p:spPr>
           <a:xfrm>
-            <a:off x="5160640" y="11657384"/>
-            <a:ext cx="2995434" cy="1008112"/>
+            <a:off x="5304656" y="7265802"/>
+            <a:ext cx="2655197" cy="485092"/>
           </a:xfrm>
           <a:prstGeom prst="roundRect">
             <a:avLst/>
@@ -3497,192 +3726,13 @@
           <a:p>
             <a:pPr algn="ctr"/>
             <a:r>
-              <a:rPr lang="en-GB" sz="1600" dirty="0" smtClean="0">
-                <a:solidFill>
-                  <a:schemeClr val="tx1"/>
-                </a:solidFill>
-              </a:rPr>
-              <a:t>Generate overview reports for each parameter sweep</a:t>
-            </a:r>
-            <a:endParaRPr lang="en-GB" sz="1600" dirty="0">
-              <a:solidFill>
-                <a:schemeClr val="tx1"/>
-              </a:solidFill>
-            </a:endParaRPr>
-          </a:p>
-        </p:txBody>
-      </p:sp>
-      <p:sp>
-        <p:nvSpPr>
-          <p:cNvPr id="9" name="Rounded Rectangle 8"/>
-          <p:cNvSpPr/>
-          <p:nvPr/>
-        </p:nvSpPr>
-        <p:spPr>
-          <a:xfrm>
-            <a:off x="5410818" y="9641160"/>
-            <a:ext cx="2495077" cy="769899"/>
-          </a:xfrm>
-          <a:prstGeom prst="roundRect">
-            <a:avLst/>
-          </a:prstGeom>
-          <a:noFill/>
-          <a:ln>
-            <a:solidFill>
-              <a:schemeClr val="tx1"/>
-            </a:solidFill>
-          </a:ln>
-        </p:spPr>
-        <p:style>
-          <a:lnRef idx="2">
-            <a:schemeClr val="accent1">
-              <a:shade val="50000"/>
-            </a:schemeClr>
-          </a:lnRef>
-          <a:fillRef idx="1">
-            <a:schemeClr val="accent1"/>
-          </a:fillRef>
-          <a:effectRef idx="0">
-            <a:schemeClr val="accent1"/>
-          </a:effectRef>
-          <a:fontRef idx="minor">
-            <a:schemeClr val="lt1"/>
-          </a:fontRef>
-        </p:style>
-        <p:txBody>
-          <a:bodyPr lIns="128016" tIns="64008" rIns="128016" bIns="64008" spcCol="0" rtlCol="0" anchor="ctr"/>
-          <a:lstStyle/>
-          <a:p>
-            <a:pPr algn="ctr"/>
-            <a:r>
-              <a:rPr lang="en-GB" sz="1600" dirty="0" smtClean="0">
-                <a:solidFill>
-                  <a:schemeClr val="tx1"/>
-                </a:solidFill>
-              </a:rPr>
-              <a:t>Post process models</a:t>
-            </a:r>
-            <a:endParaRPr lang="en-GB" sz="1600" dirty="0">
-              <a:solidFill>
-                <a:schemeClr val="tx1"/>
-              </a:solidFill>
-            </a:endParaRPr>
-          </a:p>
-        </p:txBody>
-      </p:sp>
-      <p:sp>
-        <p:nvSpPr>
-          <p:cNvPr id="11" name="Rounded Rectangle 10"/>
-          <p:cNvSpPr/>
-          <p:nvPr/>
-        </p:nvSpPr>
-        <p:spPr>
-          <a:xfrm>
-            <a:off x="5562035" y="8997888"/>
-            <a:ext cx="2192644" cy="470453"/>
-          </a:xfrm>
-          <a:prstGeom prst="roundRect">
-            <a:avLst/>
-          </a:prstGeom>
-          <a:noFill/>
-          <a:ln>
-            <a:solidFill>
-              <a:schemeClr val="tx1"/>
-            </a:solidFill>
-          </a:ln>
-        </p:spPr>
-        <p:style>
-          <a:lnRef idx="2">
-            <a:schemeClr val="accent1">
-              <a:shade val="50000"/>
-            </a:schemeClr>
-          </a:lnRef>
-          <a:fillRef idx="1">
-            <a:schemeClr val="accent1"/>
-          </a:fillRef>
-          <a:effectRef idx="0">
-            <a:schemeClr val="accent1"/>
-          </a:effectRef>
-          <a:fontRef idx="minor">
-            <a:schemeClr val="lt1"/>
-          </a:fontRef>
-        </p:style>
-        <p:txBody>
-          <a:bodyPr lIns="128016" tIns="64008" rIns="128016" bIns="64008" spcCol="0" rtlCol="0" anchor="ctr"/>
-          <a:lstStyle/>
-          <a:p>
-            <a:pPr algn="ctr"/>
-            <a:r>
-              <a:rPr lang="en-GB" sz="1600" dirty="0" smtClean="0">
-                <a:solidFill>
-                  <a:schemeClr val="tx1"/>
-                </a:solidFill>
-              </a:rPr>
-              <a:t>Run models</a:t>
-            </a:r>
-            <a:endParaRPr lang="en-GB" sz="1600" dirty="0">
-              <a:solidFill>
-                <a:schemeClr val="tx1"/>
-              </a:solidFill>
-            </a:endParaRPr>
-          </a:p>
-        </p:txBody>
-      </p:sp>
-      <p:sp>
-        <p:nvSpPr>
-          <p:cNvPr id="12" name="Rounded Rectangle 11"/>
-          <p:cNvSpPr/>
-          <p:nvPr/>
-        </p:nvSpPr>
-        <p:spPr>
-          <a:xfrm>
-            <a:off x="5386219" y="7666296"/>
-            <a:ext cx="2655197" cy="932292"/>
-          </a:xfrm>
-          <a:prstGeom prst="roundRect">
-            <a:avLst/>
-          </a:prstGeom>
-          <a:noFill/>
-          <a:ln>
-            <a:solidFill>
-              <a:schemeClr val="tx1"/>
-            </a:solidFill>
-          </a:ln>
-        </p:spPr>
-        <p:style>
-          <a:lnRef idx="2">
-            <a:schemeClr val="accent1">
-              <a:shade val="50000"/>
-            </a:schemeClr>
-          </a:lnRef>
-          <a:fillRef idx="1">
-            <a:schemeClr val="accent1"/>
-          </a:fillRef>
-          <a:effectRef idx="0">
-            <a:schemeClr val="accent1"/>
-          </a:effectRef>
-          <a:fontRef idx="minor">
-            <a:schemeClr val="lt1"/>
-          </a:fontRef>
-        </p:style>
-        <p:txBody>
-          <a:bodyPr lIns="128016" tIns="64008" rIns="128016" bIns="64008" spcCol="0" rtlCol="0" anchor="ctr"/>
-          <a:lstStyle/>
-          <a:p>
-            <a:pPr algn="ctr"/>
-            <a:r>
-              <a:rPr lang="en-GB" sz="1600" dirty="0" smtClean="0">
+              <a:rPr lang="en-GB" sz="1600" dirty="0">
                 <a:solidFill>
                   <a:schemeClr val="tx1"/>
                 </a:solidFill>
               </a:rPr>
               <a:t>Make GdfidL input files</a:t>
             </a:r>
-            <a:endParaRPr lang="en-GB" sz="1600" dirty="0">
-              <a:solidFill>
-                <a:schemeClr val="tx1"/>
-              </a:solidFill>
-            </a:endParaRPr>
           </a:p>
         </p:txBody>
       </p:sp>
@@ -3732,7 +3782,7 @@
               <a:buChar char="•"/>
             </a:pPr>
             <a:r>
-              <a:rPr lang="en-GB" sz="1600" dirty="0" smtClean="0">
+              <a:rPr lang="en-GB" sz="1600" dirty="0">
                 <a:solidFill>
                   <a:schemeClr val="tx1"/>
                 </a:solidFill>
@@ -3740,7 +3790,7 @@
               <a:t>Write geometry description using </a:t>
             </a:r>
             <a:r>
-              <a:rPr lang="en-GB" sz="1600" dirty="0" err="1" smtClean="0">
+              <a:rPr lang="en-GB" sz="1600" dirty="0" err="1">
                 <a:solidFill>
                   <a:schemeClr val="tx1"/>
                 </a:solidFill>
@@ -3748,7 +3798,7 @@
               <a:t>FreeCAD</a:t>
             </a:r>
             <a:r>
-              <a:rPr lang="en-GB" sz="1600" dirty="0" smtClean="0">
+              <a:rPr lang="en-GB" sz="1600" dirty="0">
                 <a:solidFill>
                   <a:schemeClr val="tx1"/>
                 </a:solidFill>
@@ -3756,14 +3806,14 @@
               <a:t> </a:t>
             </a:r>
             <a:r>
-              <a:rPr lang="en-GB" sz="1600" dirty="0" err="1" smtClean="0">
+              <a:rPr lang="en-GB" sz="1600" dirty="0" err="1">
                 <a:solidFill>
                   <a:schemeClr val="tx1"/>
                 </a:solidFill>
               </a:rPr>
               <a:t>primatives</a:t>
             </a:r>
-            <a:endParaRPr lang="en-GB" sz="1600" dirty="0" smtClean="0">
+            <a:endParaRPr lang="en-GB" sz="1600" dirty="0">
               <a:solidFill>
                 <a:schemeClr val="tx1"/>
               </a:solidFill>
@@ -3780,15 +3830,7 @@
                   <a:schemeClr val="tx1"/>
                 </a:solidFill>
               </a:rPr>
-              <a:t>Specify geometric parameter </a:t>
-            </a:r>
-            <a:r>
-              <a:rPr lang="en-GB" sz="1600" dirty="0" smtClean="0">
-                <a:solidFill>
-                  <a:schemeClr val="tx1"/>
-                </a:solidFill>
-              </a:rPr>
-              <a:t>sweeps</a:t>
+              <a:t>Specify geometric parameter sweeps</a:t>
             </a:r>
           </a:p>
           <a:p>
@@ -3875,7 +3917,7 @@
           <a:lstStyle/>
           <a:p>
             <a:pPr algn="ctr"/>
-            <a:endParaRPr lang="en-GB" dirty="0" smtClean="0">
+            <a:endParaRPr lang="en-GB" dirty="0">
               <a:solidFill>
                 <a:schemeClr val="tx1"/>
               </a:solidFill>
@@ -3884,7 +3926,7 @@
           <a:p>
             <a:pPr algn="ctr"/>
             <a:r>
-              <a:rPr lang="en-GB" sz="1600" dirty="0" smtClean="0">
+              <a:rPr lang="en-GB" sz="1600" dirty="0">
                 <a:solidFill>
                   <a:schemeClr val="tx1"/>
                 </a:solidFill>
@@ -3916,13 +3958,15 @@
       <p:cxnSp>
         <p:nvCxnSpPr>
           <p:cNvPr id="25" name="Straight Connector 24"/>
-          <p:cNvCxnSpPr/>
+          <p:cNvCxnSpPr>
+            <a:cxnSpLocks/>
+          </p:cNvCxnSpPr>
           <p:nvPr/>
         </p:nvCxnSpPr>
         <p:spPr>
           <a:xfrm>
-            <a:off x="1272208" y="856184"/>
-            <a:ext cx="4464496" cy="6637801"/>
+            <a:off x="2612963" y="2390132"/>
+            <a:ext cx="2187637" cy="4010668"/>
           </a:xfrm>
           <a:prstGeom prst="line">
             <a:avLst/>
@@ -3987,144 +4031,91 @@
           <a:bodyPr lIns="128016" tIns="64008" rIns="128016" bIns="64008" spcCol="0" rtlCol="0" anchor="ctr"/>
           <a:lstStyle/>
           <a:p>
-            <a:endParaRPr lang="en-GB" dirty="0" smtClean="0">
-              <a:solidFill>
-                <a:schemeClr val="tx1"/>
-              </a:solidFill>
-            </a:endParaRPr>
-          </a:p>
-          <a:p>
-            <a:pPr marL="285750" indent="-285750">
-              <a:buFont typeface="Arial" panose="020B0604020202020204" pitchFamily="34" charset="0"/>
-              <a:buChar char="•"/>
-            </a:pPr>
-            <a:r>
-              <a:rPr lang="en-GB" sz="1600" dirty="0">
-                <a:solidFill>
-                  <a:schemeClr val="tx1"/>
-                </a:solidFill>
-              </a:rPr>
-              <a:t>Define the material of parts</a:t>
-            </a:r>
-          </a:p>
-          <a:p>
-            <a:pPr marL="285750" indent="-285750">
-              <a:buFont typeface="Arial" panose="020B0604020202020204" pitchFamily="34" charset="0"/>
-              <a:buChar char="•"/>
-            </a:pPr>
-            <a:r>
-              <a:rPr lang="en-GB" sz="1600" dirty="0" smtClean="0">
-                <a:solidFill>
-                  <a:schemeClr val="tx1"/>
-                </a:solidFill>
-              </a:rPr>
-              <a:t>Specify geometric parameter sweeps</a:t>
-            </a:r>
-          </a:p>
-          <a:p>
-            <a:pPr marL="285750" indent="-285750">
-              <a:buFont typeface="Arial" panose="020B0604020202020204" pitchFamily="34" charset="0"/>
-              <a:buChar char="•"/>
-            </a:pPr>
-            <a:r>
-              <a:rPr lang="en-GB" sz="1600" dirty="0">
-                <a:solidFill>
-                  <a:schemeClr val="tx1"/>
-                </a:solidFill>
-              </a:rPr>
-              <a:t>Specify </a:t>
-            </a:r>
-            <a:r>
-              <a:rPr lang="en-GB" sz="1600" dirty="0" smtClean="0">
-                <a:solidFill>
-                  <a:schemeClr val="tx1"/>
-                </a:solidFill>
-              </a:rPr>
-              <a:t>material </a:t>
-            </a:r>
-            <a:r>
-              <a:rPr lang="en-GB" sz="1600" dirty="0">
-                <a:solidFill>
-                  <a:schemeClr val="tx1"/>
-                </a:solidFill>
-              </a:rPr>
-              <a:t>parameter </a:t>
-            </a:r>
-            <a:r>
-              <a:rPr lang="en-GB" sz="1600" dirty="0" smtClean="0">
-                <a:solidFill>
-                  <a:schemeClr val="tx1"/>
-                </a:solidFill>
-              </a:rPr>
-              <a:t>sweeps</a:t>
-            </a:r>
-          </a:p>
-          <a:p>
-            <a:pPr marL="285750" indent="-285750">
-              <a:buFont typeface="Arial" panose="020B0604020202020204" pitchFamily="34" charset="0"/>
-              <a:buChar char="•"/>
-            </a:pPr>
-            <a:r>
-              <a:rPr lang="en-GB" sz="1600" dirty="0">
-                <a:solidFill>
-                  <a:schemeClr val="tx1"/>
-                </a:solidFill>
-              </a:rPr>
-              <a:t>Specify </a:t>
-            </a:r>
-            <a:r>
-              <a:rPr lang="en-GB" sz="1600" dirty="0" smtClean="0">
-                <a:solidFill>
-                  <a:schemeClr val="tx1"/>
-                </a:solidFill>
-              </a:rPr>
-              <a:t>meshing </a:t>
-            </a:r>
-            <a:r>
-              <a:rPr lang="en-GB" sz="1600" dirty="0">
-                <a:solidFill>
-                  <a:schemeClr val="tx1"/>
-                </a:solidFill>
-              </a:rPr>
-              <a:t>parameter sweeps</a:t>
-            </a:r>
-            <a:endParaRPr lang="en-GB" sz="1600" dirty="0" smtClean="0">
-              <a:solidFill>
-                <a:schemeClr val="tx1"/>
-              </a:solidFill>
-            </a:endParaRPr>
-          </a:p>
-          <a:p>
-            <a:pPr algn="ctr"/>
-            <a:r>
-              <a:rPr lang="en-GB" sz="1700" dirty="0">
-                <a:solidFill>
-                  <a:srgbClr val="FF0000"/>
-                </a:solidFill>
-              </a:rPr>
-              <a:t>&lt;model name</a:t>
-            </a:r>
-            <a:r>
-              <a:rPr lang="en-GB" sz="1700" dirty="0" smtClean="0">
-                <a:solidFill>
-                  <a:srgbClr val="FF0000"/>
-                </a:solidFill>
-              </a:rPr>
-              <a:t>&gt;.m</a:t>
-            </a:r>
-            <a:endParaRPr lang="en-GB" sz="1700" dirty="0" smtClean="0">
-              <a:solidFill>
-                <a:srgbClr val="00B0F0"/>
-              </a:solidFill>
-            </a:endParaRPr>
-          </a:p>
-          <a:p>
             <a:endParaRPr lang="en-GB" dirty="0">
               <a:solidFill>
                 <a:schemeClr val="tx1"/>
               </a:solidFill>
             </a:endParaRPr>
           </a:p>
+          <a:p>
+            <a:pPr marL="285750" indent="-285750">
+              <a:buFont typeface="Arial" panose="020B0604020202020204" pitchFamily="34" charset="0"/>
+              <a:buChar char="•"/>
+            </a:pPr>
+            <a:r>
+              <a:rPr lang="en-GB" sz="1600" dirty="0">
+                <a:solidFill>
+                  <a:schemeClr val="tx1"/>
+                </a:solidFill>
+              </a:rPr>
+              <a:t>Define the material of parts</a:t>
+            </a:r>
+          </a:p>
+          <a:p>
+            <a:pPr marL="285750" indent="-285750">
+              <a:buFont typeface="Arial" panose="020B0604020202020204" pitchFamily="34" charset="0"/>
+              <a:buChar char="•"/>
+            </a:pPr>
+            <a:r>
+              <a:rPr lang="en-GB" sz="1600" dirty="0">
+                <a:solidFill>
+                  <a:schemeClr val="tx1"/>
+                </a:solidFill>
+              </a:rPr>
+              <a:t>Specify geometric parameter sweeps</a:t>
+            </a:r>
+          </a:p>
+          <a:p>
+            <a:pPr marL="285750" indent="-285750">
+              <a:buFont typeface="Arial" panose="020B0604020202020204" pitchFamily="34" charset="0"/>
+              <a:buChar char="•"/>
+            </a:pPr>
+            <a:r>
+              <a:rPr lang="en-GB" sz="1600" dirty="0">
+                <a:solidFill>
+                  <a:schemeClr val="tx1"/>
+                </a:solidFill>
+              </a:rPr>
+              <a:t>Specify material parameter sweeps</a:t>
+            </a:r>
+          </a:p>
+          <a:p>
+            <a:pPr marL="285750" indent="-285750">
+              <a:buFont typeface="Arial" panose="020B0604020202020204" pitchFamily="34" charset="0"/>
+              <a:buChar char="•"/>
+            </a:pPr>
+            <a:r>
+              <a:rPr lang="en-GB" sz="1600" dirty="0">
+                <a:solidFill>
+                  <a:schemeClr val="tx1"/>
+                </a:solidFill>
+              </a:rPr>
+              <a:t>Specify meshing parameter sweeps</a:t>
+            </a:r>
+          </a:p>
+          <a:p>
+            <a:pPr algn="ctr"/>
+            <a:r>
+              <a:rPr lang="en-GB" sz="1700" dirty="0">
+                <a:solidFill>
+                  <a:srgbClr val="FF0000"/>
+                </a:solidFill>
+              </a:rPr>
+              <a:t>&lt;model name&gt;.m</a:t>
+            </a:r>
+            <a:endParaRPr lang="en-GB" sz="1700" dirty="0">
+              <a:solidFill>
+                <a:srgbClr val="00B0F0"/>
+              </a:solidFill>
+            </a:endParaRPr>
+          </a:p>
+          <a:p>
+            <a:endParaRPr lang="en-GB" dirty="0">
+              <a:solidFill>
+                <a:schemeClr val="tx1"/>
+              </a:solidFill>
+            </a:endParaRPr>
+          </a:p>
         </p:txBody>
       </p:sp>
       <p:sp>
@@ -4135,8 +4126,8 @@
         </p:nvSpPr>
         <p:spPr>
           <a:xfrm rot="16200000">
-            <a:off x="3582546" y="9806096"/>
-            <a:ext cx="2535118" cy="477054"/>
+            <a:off x="7828209" y="8308386"/>
+            <a:ext cx="1508592" cy="861774"/>
           </a:xfrm>
           <a:prstGeom prst="rect">
             <a:avLst/>
@@ -4144,16 +4135,15 @@
           <a:noFill/>
         </p:spPr>
         <p:txBody>
-          <a:bodyPr wrap="none" rtlCol="0">
+          <a:bodyPr wrap="square" rtlCol="0">
             <a:spAutoFit/>
           </a:bodyPr>
           <a:lstStyle/>
           <a:p>
             <a:r>
-              <a:rPr lang="en-GB" dirty="0" smtClean="0"/>
+              <a:rPr lang="en-GB" dirty="0"/>
               <a:t>For each input file</a:t>
             </a:r>
-            <a:endParaRPr lang="en-GB" dirty="0"/>
           </a:p>
         </p:txBody>
       </p:sp>
@@ -4164,13 +4154,40 @@
           <p:nvPr/>
         </p:nvSpPr>
         <p:spPr>
-          <a:xfrm rot="1923220">
-            <a:off x="3914365" y="7025044"/>
-            <a:ext cx="1463962" cy="685620"/>
+          <a:xfrm rot="1745682">
+            <a:off x="3900521" y="6348601"/>
+            <a:ext cx="1147916" cy="685620"/>
           </a:xfrm>
           <a:prstGeom prst="rightArrow">
             <a:avLst/>
           </a:prstGeom>
+          <a:gradFill flip="none" rotWithShape="1">
+            <a:gsLst>
+              <a:gs pos="0">
+                <a:schemeClr val="accent1">
+                  <a:tint val="66000"/>
+                  <a:satMod val="160000"/>
+                </a:schemeClr>
+              </a:gs>
+              <a:gs pos="50000">
+                <a:schemeClr val="accent1">
+                  <a:tint val="44500"/>
+                  <a:satMod val="160000"/>
+                </a:schemeClr>
+              </a:gs>
+              <a:gs pos="100000">
+                <a:schemeClr val="accent1">
+                  <a:tint val="23500"/>
+                  <a:satMod val="160000"/>
+                </a:schemeClr>
+              </a:gs>
+            </a:gsLst>
+            <a:lin ang="13500000" scaled="1"/>
+            <a:tileRect/>
+          </a:gradFill>
+          <a:ln>
+            <a:noFill/>
+          </a:ln>
         </p:spPr>
         <p:style>
           <a:lnRef idx="2">
@@ -4205,8 +4222,8 @@
         </p:nvSpPr>
         <p:spPr>
           <a:xfrm rot="6298412">
-            <a:off x="5666904" y="6533871"/>
-            <a:ext cx="1663891" cy="685620"/>
+            <a:off x="6366654" y="6358437"/>
+            <a:ext cx="810411" cy="685620"/>
           </a:xfrm>
           <a:prstGeom prst="rightArrow">
             <a:avLst>
@@ -4248,8 +4265,8 @@
         </p:nvSpPr>
         <p:spPr>
           <a:xfrm>
-            <a:off x="4656584" y="3952528"/>
-            <a:ext cx="4800601" cy="1925571"/>
+            <a:off x="4656584" y="3853720"/>
+            <a:ext cx="4800601" cy="2330121"/>
           </a:xfrm>
           <a:prstGeom prst="roundRect">
             <a:avLst/>
@@ -4282,7 +4299,7 @@
           <a:lstStyle/>
           <a:p>
             <a:pPr algn="ctr"/>
-            <a:endParaRPr lang="en-GB" dirty="0" smtClean="0">
+            <a:endParaRPr lang="en-GB" dirty="0">
               <a:solidFill>
                 <a:schemeClr val="tx1"/>
               </a:solidFill>
@@ -4299,21 +4316,8 @@
                   <a:schemeClr val="tx1"/>
                 </a:solidFill>
               </a:rPr>
-              <a:t>Define the material mapping of each STL </a:t>
-            </a:r>
-            <a:r>
-              <a:rPr lang="en-GB" sz="1600" dirty="0" smtClean="0">
-                <a:solidFill>
-                  <a:schemeClr val="tx1"/>
-                </a:solidFill>
-              </a:rPr>
-              <a:t>part</a:t>
-            </a:r>
-            <a:endParaRPr lang="en-GB" sz="1600" dirty="0" smtClean="0">
-              <a:solidFill>
-                <a:schemeClr val="tx1"/>
-              </a:solidFill>
-            </a:endParaRPr>
+              <a:t>Define the material mapping of each STL part</a:t>
+            </a:r>
           </a:p>
           <a:p>
             <a:pPr marL="285750" indent="-285750">
@@ -4321,20 +4325,12 @@
               <a:buChar char="•"/>
             </a:pPr>
             <a:r>
-              <a:rPr lang="en-GB" sz="1600" dirty="0" smtClean="0">
+              <a:rPr lang="en-GB" sz="1600" dirty="0">
                 <a:solidFill>
                   <a:schemeClr val="tx1"/>
                 </a:solidFill>
               </a:rPr>
-              <a:t>Define </a:t>
-            </a:r>
-            <a:r>
-              <a:rPr lang="en-GB" sz="1600" dirty="0">
-                <a:solidFill>
-                  <a:schemeClr val="tx1"/>
-                </a:solidFill>
-              </a:rPr>
-              <a:t>the material of parts</a:t>
+              <a:t>Define the order that the STL are loaded.</a:t>
             </a:r>
           </a:p>
           <a:p>
@@ -4348,7 +4344,7 @@
                   <a:schemeClr val="tx1"/>
                 </a:solidFill>
               </a:rPr>
-              <a:t>Specify the port definitions</a:t>
+              <a:t>Define the material of parts</a:t>
             </a:r>
           </a:p>
           <a:p>
@@ -4357,12 +4353,12 @@
               <a:buChar char="•"/>
             </a:pPr>
             <a:r>
-              <a:rPr lang="en-GB" sz="1600" dirty="0" smtClean="0">
+              <a:rPr lang="en-GB" sz="1600" dirty="0">
                 <a:solidFill>
                   <a:schemeClr val="tx1"/>
                 </a:solidFill>
               </a:rPr>
-              <a:t>Specify the geometry fractions to run (1, ½, ¼).</a:t>
+              <a:t>Specify the port definitions</a:t>
             </a:r>
           </a:p>
           <a:p>
@@ -4371,28 +4367,12 @@
               <a:buChar char="•"/>
             </a:pPr>
             <a:r>
-              <a:rPr lang="en-GB" sz="1600" dirty="0" smtClean="0">
+              <a:rPr lang="en-GB" sz="1600" dirty="0">
                 <a:solidFill>
                   <a:schemeClr val="tx1"/>
                 </a:solidFill>
               </a:rPr>
-              <a:t>Specify material </a:t>
-            </a:r>
-            <a:r>
-              <a:rPr lang="en-GB" sz="1600" dirty="0">
-                <a:solidFill>
-                  <a:schemeClr val="tx1"/>
-                </a:solidFill>
-              </a:rPr>
-              <a:t>parameter </a:t>
-            </a:r>
-            <a:r>
-              <a:rPr lang="en-GB" sz="1600" dirty="0" smtClean="0">
-                <a:solidFill>
-                  <a:schemeClr val="tx1"/>
-                </a:solidFill>
-              </a:rPr>
-              <a:t>sweeps</a:t>
+              <a:t>Specify the geometry fractions to run (1, ½, ¼).</a:t>
             </a:r>
           </a:p>
           <a:p>
@@ -4406,49 +4386,34 @@
                   <a:schemeClr val="tx1"/>
                 </a:solidFill>
               </a:rPr>
-              <a:t>Specify </a:t>
-            </a:r>
-            <a:r>
-              <a:rPr lang="en-GB" sz="1600" dirty="0" smtClean="0">
+              <a:t>Specify material parameter sweeps</a:t>
+            </a:r>
+          </a:p>
+          <a:p>
+            <a:pPr marL="285750" indent="-285750">
+              <a:buFont typeface="Arial" panose="020B0604020202020204" pitchFamily="34" charset="0"/>
+              <a:buChar char="•"/>
+            </a:pPr>
+            <a:r>
+              <a:rPr lang="en-GB" sz="1600" dirty="0">
                 <a:solidFill>
                   <a:schemeClr val="tx1"/>
                 </a:solidFill>
               </a:rPr>
-              <a:t>meshing </a:t>
-            </a:r>
-            <a:r>
-              <a:rPr lang="en-GB" sz="1600" dirty="0">
-                <a:solidFill>
-                  <a:schemeClr val="tx1"/>
+              <a:t>Specify meshing parameter sweeps</a:t>
+            </a:r>
+          </a:p>
+          <a:p>
+            <a:pPr algn="ctr"/>
+            <a:r>
+              <a:rPr lang="en-GB" sz="1700" dirty="0">
+                <a:solidFill>
+                  <a:srgbClr val="FF0000"/>
                 </a:solidFill>
               </a:rPr>
-              <a:t>parameter sweeps</a:t>
-            </a:r>
-            <a:endParaRPr lang="en-GB" sz="1600" dirty="0" smtClean="0">
-              <a:solidFill>
-                <a:schemeClr val="tx1"/>
-              </a:solidFill>
-            </a:endParaRPr>
-          </a:p>
-          <a:p>
-            <a:pPr algn="ctr"/>
-            <a:r>
-              <a:rPr lang="en-GB" sz="1700" dirty="0">
-                <a:solidFill>
-                  <a:srgbClr val="FF0000"/>
-                </a:solidFill>
-              </a:rPr>
-              <a:t>&lt;model name</a:t>
-            </a:r>
-            <a:r>
-              <a:rPr lang="en-GB" sz="1700" dirty="0" smtClean="0">
-                <a:solidFill>
-                  <a:srgbClr val="FF0000"/>
-                </a:solidFill>
-              </a:rPr>
-              <a:t>&gt;.m</a:t>
-            </a:r>
-            <a:endParaRPr lang="en-GB" sz="1700" dirty="0" smtClean="0">
+              <a:t>&lt;model name&gt;.m</a:t>
+            </a:r>
+            <a:endParaRPr lang="en-GB" sz="1700" dirty="0">
               <a:solidFill>
                 <a:srgbClr val="00B0F0"/>
               </a:solidFill>
@@ -4467,13 +4432,15 @@
       <p:cxnSp>
         <p:nvCxnSpPr>
           <p:cNvPr id="29" name="Straight Connector 28"/>
-          <p:cNvCxnSpPr/>
+          <p:cNvCxnSpPr>
+            <a:cxnSpLocks/>
+          </p:cNvCxnSpPr>
           <p:nvPr/>
         </p:nvCxnSpPr>
         <p:spPr>
           <a:xfrm>
-            <a:off x="2496344" y="2512368"/>
-            <a:ext cx="7272808" cy="0"/>
+            <a:off x="2784376" y="2512368"/>
+            <a:ext cx="6984776" cy="0"/>
           </a:xfrm>
           <a:prstGeom prst="line">
             <a:avLst/>
@@ -4505,13 +4472,15 @@
       <p:cxnSp>
         <p:nvCxnSpPr>
           <p:cNvPr id="27" name="Straight Connector 26"/>
-          <p:cNvCxnSpPr/>
+          <p:cNvCxnSpPr>
+            <a:cxnSpLocks/>
+          </p:cNvCxnSpPr>
           <p:nvPr/>
         </p:nvCxnSpPr>
         <p:spPr>
           <a:xfrm>
-            <a:off x="3288432" y="3736504"/>
-            <a:ext cx="6633120" cy="0"/>
+            <a:off x="3419493" y="3736504"/>
+            <a:ext cx="6502059" cy="0"/>
           </a:xfrm>
           <a:prstGeom prst="line">
             <a:avLst/>
@@ -4540,6 +4509,1029 @@
           </a:fontRef>
         </p:style>
       </p:cxnSp>
+      <p:grpSp>
+        <p:nvGrpSpPr>
+          <p:cNvPr id="14" name="Group 13">
+            <a:extLst>
+              <a:ext uri="{FF2B5EF4-FFF2-40B4-BE49-F238E27FC236}">
+                <a16:creationId xmlns:a16="http://schemas.microsoft.com/office/drawing/2014/main" id="{C8C345A4-6CF6-4824-B3EA-EE2C15013D76}"/>
+              </a:ext>
+            </a:extLst>
+          </p:cNvPr>
+          <p:cNvGrpSpPr/>
+          <p:nvPr/>
+        </p:nvGrpSpPr>
+        <p:grpSpPr>
+          <a:xfrm>
+            <a:off x="5043875" y="9800657"/>
+            <a:ext cx="3285117" cy="1784719"/>
+            <a:chOff x="5015797" y="9736785"/>
+            <a:chExt cx="3285117" cy="1784719"/>
+          </a:xfrm>
+        </p:grpSpPr>
+        <p:sp>
+          <p:nvSpPr>
+            <p:cNvPr id="30" name="Rounded Rectangle 22">
+              <a:extLst>
+                <a:ext uri="{FF2B5EF4-FFF2-40B4-BE49-F238E27FC236}">
+                  <a16:creationId xmlns:a16="http://schemas.microsoft.com/office/drawing/2014/main" id="{92328487-F7E1-4B5E-881F-D20950C6AADF}"/>
+                </a:ext>
+              </a:extLst>
+            </p:cNvPr>
+            <p:cNvSpPr/>
+            <p:nvPr/>
+          </p:nvSpPr>
+          <p:spPr>
+            <a:xfrm>
+              <a:off x="5015797" y="9736785"/>
+              <a:ext cx="3285117" cy="1784719"/>
+            </a:xfrm>
+            <a:prstGeom prst="roundRect">
+              <a:avLst/>
+            </a:prstGeom>
+            <a:solidFill>
+              <a:schemeClr val="accent6">
+                <a:lumMod val="60000"/>
+                <a:lumOff val="40000"/>
+              </a:schemeClr>
+            </a:solidFill>
+            <a:ln>
+              <a:noFill/>
+            </a:ln>
+          </p:spPr>
+          <p:style>
+            <a:lnRef idx="2">
+              <a:schemeClr val="accent1">
+                <a:shade val="50000"/>
+              </a:schemeClr>
+            </a:lnRef>
+            <a:fillRef idx="1">
+              <a:schemeClr val="accent1"/>
+            </a:fillRef>
+            <a:effectRef idx="0">
+              <a:schemeClr val="accent1"/>
+            </a:effectRef>
+            <a:fontRef idx="minor">
+              <a:schemeClr val="lt1"/>
+            </a:fontRef>
+          </p:style>
+          <p:txBody>
+            <a:bodyPr rtlCol="0" anchor="ctr"/>
+            <a:lstStyle/>
+            <a:p>
+              <a:pPr algn="ctr"/>
+              <a:r>
+                <a:rPr lang="en-GB" sz="1400" dirty="0">
+                  <a:solidFill>
+                    <a:schemeClr val="tx2">
+                      <a:lumMod val="60000"/>
+                      <a:lumOff val="40000"/>
+                    </a:schemeClr>
+                  </a:solidFill>
+                </a:rPr>
+                <a:t>Run on report folder data</a:t>
+              </a:r>
+            </a:p>
+            <a:p>
+              <a:pPr algn="ctr"/>
+              <a:endParaRPr lang="en-GB" sz="1400" dirty="0">
+                <a:solidFill>
+                  <a:schemeClr val="tx2">
+                    <a:lumMod val="60000"/>
+                    <a:lumOff val="40000"/>
+                  </a:schemeClr>
+                </a:solidFill>
+              </a:endParaRPr>
+            </a:p>
+            <a:p>
+              <a:pPr algn="ctr"/>
+              <a:endParaRPr lang="en-GB" sz="1400" dirty="0">
+                <a:solidFill>
+                  <a:schemeClr val="tx2">
+                    <a:lumMod val="60000"/>
+                    <a:lumOff val="40000"/>
+                  </a:schemeClr>
+                </a:solidFill>
+              </a:endParaRPr>
+            </a:p>
+            <a:p>
+              <a:pPr algn="ctr"/>
+              <a:endParaRPr lang="en-GB" sz="1400" dirty="0">
+                <a:solidFill>
+                  <a:schemeClr val="tx2">
+                    <a:lumMod val="60000"/>
+                    <a:lumOff val="40000"/>
+                  </a:schemeClr>
+                </a:solidFill>
+              </a:endParaRPr>
+            </a:p>
+            <a:p>
+              <a:pPr algn="ctr"/>
+              <a:endParaRPr lang="en-GB" sz="1400" dirty="0">
+                <a:solidFill>
+                  <a:schemeClr val="tx2">
+                    <a:lumMod val="60000"/>
+                    <a:lumOff val="40000"/>
+                  </a:schemeClr>
+                </a:solidFill>
+              </a:endParaRPr>
+            </a:p>
+            <a:p>
+              <a:pPr algn="ctr"/>
+              <a:endParaRPr lang="en-GB" sz="1400" dirty="0">
+                <a:solidFill>
+                  <a:schemeClr val="tx2">
+                    <a:lumMod val="60000"/>
+                    <a:lumOff val="40000"/>
+                  </a:schemeClr>
+                </a:solidFill>
+              </a:endParaRPr>
+            </a:p>
+            <a:p>
+              <a:pPr algn="ctr"/>
+              <a:endParaRPr lang="en-GB" sz="1400" dirty="0">
+                <a:solidFill>
+                  <a:schemeClr val="tx2">
+                    <a:lumMod val="60000"/>
+                    <a:lumOff val="40000"/>
+                  </a:schemeClr>
+                </a:solidFill>
+              </a:endParaRPr>
+            </a:p>
+            <a:p>
+              <a:pPr algn="ctr"/>
+              <a:endParaRPr lang="en-GB" sz="1400" dirty="0">
+                <a:solidFill>
+                  <a:schemeClr val="tx2">
+                    <a:lumMod val="60000"/>
+                    <a:lumOff val="40000"/>
+                  </a:schemeClr>
+                </a:solidFill>
+              </a:endParaRPr>
+            </a:p>
+          </p:txBody>
+        </p:sp>
+        <p:sp>
+          <p:nvSpPr>
+            <p:cNvPr id="7" name="Rounded Rectangle 6"/>
+            <p:cNvSpPr/>
+            <p:nvPr/>
+          </p:nvSpPr>
+          <p:spPr>
+            <a:xfrm>
+              <a:off x="5277100" y="10786085"/>
+              <a:ext cx="2762712" cy="583267"/>
+            </a:xfrm>
+            <a:prstGeom prst="roundRect">
+              <a:avLst/>
+            </a:prstGeom>
+            <a:noFill/>
+            <a:ln>
+              <a:solidFill>
+                <a:schemeClr val="tx1"/>
+              </a:solidFill>
+            </a:ln>
+          </p:spPr>
+          <p:style>
+            <a:lnRef idx="2">
+              <a:schemeClr val="accent1">
+                <a:shade val="50000"/>
+              </a:schemeClr>
+            </a:lnRef>
+            <a:fillRef idx="1">
+              <a:schemeClr val="accent1"/>
+            </a:fillRef>
+            <a:effectRef idx="0">
+              <a:schemeClr val="accent1"/>
+            </a:effectRef>
+            <a:fontRef idx="minor">
+              <a:schemeClr val="lt1"/>
+            </a:fontRef>
+          </p:style>
+          <p:txBody>
+            <a:bodyPr lIns="128016" tIns="64008" rIns="128016" bIns="64008" spcCol="0" rtlCol="0" anchor="ctr"/>
+            <a:lstStyle/>
+            <a:p>
+              <a:pPr algn="ctr"/>
+              <a:r>
+                <a:rPr lang="en-GB" sz="1600" dirty="0">
+                  <a:solidFill>
+                    <a:schemeClr val="tx1"/>
+                  </a:solidFill>
+                </a:rPr>
+                <a:t>Generate reports</a:t>
+              </a:r>
+            </a:p>
+            <a:p>
+              <a:pPr algn="ctr"/>
+              <a:r>
+                <a:rPr lang="en-GB" sz="1600" dirty="0" err="1">
+                  <a:solidFill>
+                    <a:srgbClr val="FF0000"/>
+                  </a:solidFill>
+                </a:rPr>
+                <a:t>generate_report.m</a:t>
+              </a:r>
+              <a:endParaRPr lang="en-GB" sz="1600" dirty="0">
+                <a:solidFill>
+                  <a:srgbClr val="FF0000"/>
+                </a:solidFill>
+              </a:endParaRPr>
+            </a:p>
+          </p:txBody>
+        </p:sp>
+        <p:sp>
+          <p:nvSpPr>
+            <p:cNvPr id="28" name="Rounded Rectangle 6">
+              <a:extLst>
+                <a:ext uri="{FF2B5EF4-FFF2-40B4-BE49-F238E27FC236}">
+                  <a16:creationId xmlns:a16="http://schemas.microsoft.com/office/drawing/2014/main" id="{706EBA29-97C6-4F34-A22B-8D211DCABCCA}"/>
+                </a:ext>
+              </a:extLst>
+            </p:cNvPr>
+            <p:cNvSpPr/>
+            <p:nvPr/>
+          </p:nvSpPr>
+          <p:spPr>
+            <a:xfrm>
+              <a:off x="5278248" y="10073208"/>
+              <a:ext cx="2762712" cy="583267"/>
+            </a:xfrm>
+            <a:prstGeom prst="roundRect">
+              <a:avLst/>
+            </a:prstGeom>
+            <a:noFill/>
+            <a:ln>
+              <a:solidFill>
+                <a:schemeClr val="tx1"/>
+              </a:solidFill>
+            </a:ln>
+          </p:spPr>
+          <p:style>
+            <a:lnRef idx="2">
+              <a:schemeClr val="accent1">
+                <a:shade val="50000"/>
+              </a:schemeClr>
+            </a:lnRef>
+            <a:fillRef idx="1">
+              <a:schemeClr val="accent1"/>
+            </a:fillRef>
+            <a:effectRef idx="0">
+              <a:schemeClr val="accent1"/>
+            </a:effectRef>
+            <a:fontRef idx="minor">
+              <a:schemeClr val="lt1"/>
+            </a:fontRef>
+          </p:style>
+          <p:txBody>
+            <a:bodyPr lIns="128016" tIns="64008" rIns="128016" bIns="64008" spcCol="0" rtlCol="0" anchor="ctr"/>
+            <a:lstStyle/>
+            <a:p>
+              <a:pPr algn="ctr"/>
+              <a:r>
+                <a:rPr lang="en-GB" sz="1600" dirty="0">
+                  <a:solidFill>
+                    <a:schemeClr val="tx1"/>
+                  </a:solidFill>
+                </a:rPr>
+                <a:t>Analyse results</a:t>
+              </a:r>
+            </a:p>
+            <a:p>
+              <a:pPr algn="ctr"/>
+              <a:r>
+                <a:rPr lang="en-GB" sz="1600" dirty="0" err="1">
+                  <a:solidFill>
+                    <a:srgbClr val="FF0000"/>
+                  </a:solidFill>
+                </a:rPr>
+                <a:t>analyse_pp_data.m</a:t>
+              </a:r>
+              <a:endParaRPr lang="en-GB" sz="1600" dirty="0">
+                <a:solidFill>
+                  <a:srgbClr val="FF0000"/>
+                </a:solidFill>
+              </a:endParaRPr>
+            </a:p>
+          </p:txBody>
+        </p:sp>
+      </p:grpSp>
+      <p:sp>
+        <p:nvSpPr>
+          <p:cNvPr id="16" name="TextBox 15">
+            <a:extLst>
+              <a:ext uri="{FF2B5EF4-FFF2-40B4-BE49-F238E27FC236}">
+                <a16:creationId xmlns:a16="http://schemas.microsoft.com/office/drawing/2014/main" id="{3D080C80-1B36-4D4A-9982-4A3182378F6D}"/>
+              </a:ext>
+            </a:extLst>
+          </p:cNvPr>
+          <p:cNvSpPr txBox="1"/>
+          <p:nvPr/>
+        </p:nvSpPr>
+        <p:spPr>
+          <a:xfrm>
+            <a:off x="4039166" y="8463215"/>
+            <a:ext cx="1292158" cy="830997"/>
+          </a:xfrm>
+          <a:prstGeom prst="rect">
+            <a:avLst/>
+          </a:prstGeom>
+          <a:noFill/>
+        </p:spPr>
+        <p:txBody>
+          <a:bodyPr wrap="square" rtlCol="0">
+            <a:spAutoFit/>
+          </a:bodyPr>
+          <a:lstStyle/>
+          <a:p>
+            <a:r>
+              <a:rPr lang="en-GB" sz="1600" dirty="0"/>
+              <a:t>On the modelling machine</a:t>
+            </a:r>
+          </a:p>
+        </p:txBody>
+      </p:sp>
+      <p:sp>
+        <p:nvSpPr>
+          <p:cNvPr id="31" name="TextBox 30">
+            <a:extLst>
+              <a:ext uri="{FF2B5EF4-FFF2-40B4-BE49-F238E27FC236}">
+                <a16:creationId xmlns:a16="http://schemas.microsoft.com/office/drawing/2014/main" id="{FCE9BB80-F41F-4801-8FA3-823E552F86D6}"/>
+              </a:ext>
+            </a:extLst>
+          </p:cNvPr>
+          <p:cNvSpPr txBox="1"/>
+          <p:nvPr/>
+        </p:nvSpPr>
+        <p:spPr>
+          <a:xfrm>
+            <a:off x="4039166" y="10544800"/>
+            <a:ext cx="1292158" cy="338554"/>
+          </a:xfrm>
+          <a:prstGeom prst="rect">
+            <a:avLst/>
+          </a:prstGeom>
+          <a:noFill/>
+        </p:spPr>
+        <p:txBody>
+          <a:bodyPr wrap="square" rtlCol="0">
+            <a:spAutoFit/>
+          </a:bodyPr>
+          <a:lstStyle/>
+          <a:p>
+            <a:r>
+              <a:rPr lang="en-GB" sz="1600" dirty="0"/>
+              <a:t>Anywhere</a:t>
+            </a:r>
+          </a:p>
+        </p:txBody>
+      </p:sp>
+      <p:sp>
+        <p:nvSpPr>
+          <p:cNvPr id="33" name="TextBox 32">
+            <a:extLst>
+              <a:ext uri="{FF2B5EF4-FFF2-40B4-BE49-F238E27FC236}">
+                <a16:creationId xmlns:a16="http://schemas.microsoft.com/office/drawing/2014/main" id="{68B2A829-A507-4BC0-8DD1-A113950487A6}"/>
+              </a:ext>
+            </a:extLst>
+          </p:cNvPr>
+          <p:cNvSpPr txBox="1"/>
+          <p:nvPr/>
+        </p:nvSpPr>
+        <p:spPr>
+          <a:xfrm rot="16200000">
+            <a:off x="8005583" y="10232323"/>
+            <a:ext cx="1508592" cy="861774"/>
+          </a:xfrm>
+          <a:prstGeom prst="rect">
+            <a:avLst/>
+          </a:prstGeom>
+          <a:noFill/>
+        </p:spPr>
+        <p:txBody>
+          <a:bodyPr wrap="square" rtlCol="0">
+            <a:spAutoFit/>
+          </a:bodyPr>
+          <a:lstStyle/>
+          <a:p>
+            <a:pPr algn="ctr"/>
+            <a:r>
+              <a:rPr lang="en-GB" dirty="0"/>
+              <a:t>For each model</a:t>
+            </a:r>
+          </a:p>
+        </p:txBody>
+      </p:sp>
+      <p:cxnSp>
+        <p:nvCxnSpPr>
+          <p:cNvPr id="34" name="Straight Connector 33">
+            <a:extLst>
+              <a:ext uri="{FF2B5EF4-FFF2-40B4-BE49-F238E27FC236}">
+                <a16:creationId xmlns:a16="http://schemas.microsoft.com/office/drawing/2014/main" id="{8C2997EB-2E1F-45A6-9ADD-B15CC3FC17EC}"/>
+              </a:ext>
+            </a:extLst>
+          </p:cNvPr>
+          <p:cNvCxnSpPr>
+            <a:cxnSpLocks/>
+          </p:cNvCxnSpPr>
+          <p:nvPr/>
+        </p:nvCxnSpPr>
+        <p:spPr>
+          <a:xfrm flipV="1">
+            <a:off x="95325" y="7075624"/>
+            <a:ext cx="3553147" cy="137004"/>
+          </a:xfrm>
+          <a:prstGeom prst="line">
+            <a:avLst/>
+          </a:prstGeom>
+          <a:ln w="25400">
+            <a:prstDash val="dash"/>
+          </a:ln>
+        </p:spPr>
+        <p:style>
+          <a:lnRef idx="1">
+            <a:schemeClr val="accent1"/>
+          </a:lnRef>
+          <a:fillRef idx="0">
+            <a:schemeClr val="accent1"/>
+          </a:fillRef>
+          <a:effectRef idx="0">
+            <a:schemeClr val="accent1"/>
+          </a:effectRef>
+          <a:fontRef idx="minor">
+            <a:schemeClr val="tx1"/>
+          </a:fontRef>
+        </p:style>
+      </p:cxnSp>
+      <p:sp>
+        <p:nvSpPr>
+          <p:cNvPr id="20" name="TextBox 19">
+            <a:extLst>
+              <a:ext uri="{FF2B5EF4-FFF2-40B4-BE49-F238E27FC236}">
+                <a16:creationId xmlns:a16="http://schemas.microsoft.com/office/drawing/2014/main" id="{B04F7374-DB6C-4E89-B91A-B637BBC4A3DD}"/>
+              </a:ext>
+            </a:extLst>
+          </p:cNvPr>
+          <p:cNvSpPr txBox="1"/>
+          <p:nvPr/>
+        </p:nvSpPr>
+        <p:spPr>
+          <a:xfrm>
+            <a:off x="324123" y="7840960"/>
+            <a:ext cx="2709774" cy="1246495"/>
+          </a:xfrm>
+          <a:prstGeom prst="rect">
+            <a:avLst/>
+          </a:prstGeom>
+          <a:noFill/>
+        </p:spPr>
+        <p:txBody>
+          <a:bodyPr wrap="square" rtlCol="0">
+            <a:spAutoFit/>
+          </a:bodyPr>
+          <a:lstStyle/>
+          <a:p>
+            <a:r>
+              <a:rPr lang="en-GB" dirty="0"/>
+              <a:t>Running </a:t>
+            </a:r>
+            <a:r>
+              <a:rPr lang="en-GB" dirty="0">
+                <a:solidFill>
+                  <a:srgbClr val="FF0000"/>
+                </a:solidFill>
+              </a:rPr>
+              <a:t>&lt;</a:t>
+            </a:r>
+            <a:r>
+              <a:rPr lang="en-GB" dirty="0" err="1">
+                <a:solidFill>
+                  <a:srgbClr val="FF0000"/>
+                </a:solidFill>
+              </a:rPr>
+              <a:t>model_name</a:t>
+            </a:r>
+            <a:r>
+              <a:rPr lang="en-GB" dirty="0">
+                <a:solidFill>
+                  <a:srgbClr val="FF0000"/>
+                </a:solidFill>
+              </a:rPr>
+              <a:t>&gt;.m </a:t>
+            </a:r>
+            <a:r>
+              <a:rPr lang="en-GB" dirty="0"/>
+              <a:t>makes this happen. </a:t>
+            </a:r>
+          </a:p>
+        </p:txBody>
+      </p:sp>
+      <p:cxnSp>
+        <p:nvCxnSpPr>
+          <p:cNvPr id="39" name="Straight Connector 38">
+            <a:extLst>
+              <a:ext uri="{FF2B5EF4-FFF2-40B4-BE49-F238E27FC236}">
+                <a16:creationId xmlns:a16="http://schemas.microsoft.com/office/drawing/2014/main" id="{34A25220-F8CF-4BBC-A67F-C028A5C1FA8D}"/>
+              </a:ext>
+            </a:extLst>
+          </p:cNvPr>
+          <p:cNvCxnSpPr>
+            <a:cxnSpLocks/>
+          </p:cNvCxnSpPr>
+          <p:nvPr/>
+        </p:nvCxnSpPr>
+        <p:spPr>
+          <a:xfrm>
+            <a:off x="3936901" y="7264896"/>
+            <a:ext cx="1295747" cy="0"/>
+          </a:xfrm>
+          <a:prstGeom prst="line">
+            <a:avLst/>
+          </a:prstGeom>
+          <a:ln w="25400">
+            <a:solidFill>
+              <a:schemeClr val="bg1">
+                <a:lumMod val="95000"/>
+              </a:schemeClr>
+            </a:solidFill>
+            <a:prstDash val="dash"/>
+          </a:ln>
+        </p:spPr>
+        <p:style>
+          <a:lnRef idx="1">
+            <a:schemeClr val="accent1"/>
+          </a:lnRef>
+          <a:fillRef idx="0">
+            <a:schemeClr val="accent1"/>
+          </a:fillRef>
+          <a:effectRef idx="0">
+            <a:schemeClr val="accent1"/>
+          </a:effectRef>
+          <a:fontRef idx="minor">
+            <a:schemeClr val="tx1"/>
+          </a:fontRef>
+        </p:style>
+      </p:cxnSp>
+      <p:cxnSp>
+        <p:nvCxnSpPr>
+          <p:cNvPr id="40" name="Straight Connector 39">
+            <a:extLst>
+              <a:ext uri="{FF2B5EF4-FFF2-40B4-BE49-F238E27FC236}">
+                <a16:creationId xmlns:a16="http://schemas.microsoft.com/office/drawing/2014/main" id="{0CD8FB47-F861-485C-BBB4-9DFA18869A8E}"/>
+              </a:ext>
+            </a:extLst>
+          </p:cNvPr>
+          <p:cNvCxnSpPr>
+            <a:cxnSpLocks/>
+          </p:cNvCxnSpPr>
+          <p:nvPr/>
+        </p:nvCxnSpPr>
+        <p:spPr>
+          <a:xfrm>
+            <a:off x="283431" y="9713168"/>
+            <a:ext cx="4949217" cy="0"/>
+          </a:xfrm>
+          <a:prstGeom prst="line">
+            <a:avLst/>
+          </a:prstGeom>
+          <a:ln w="25400">
+            <a:solidFill>
+              <a:schemeClr val="bg1">
+                <a:lumMod val="95000"/>
+              </a:schemeClr>
+            </a:solidFill>
+            <a:prstDash val="dash"/>
+          </a:ln>
+        </p:spPr>
+        <p:style>
+          <a:lnRef idx="1">
+            <a:schemeClr val="accent1"/>
+          </a:lnRef>
+          <a:fillRef idx="0">
+            <a:schemeClr val="accent1"/>
+          </a:fillRef>
+          <a:effectRef idx="0">
+            <a:schemeClr val="accent1"/>
+          </a:effectRef>
+          <a:fontRef idx="minor">
+            <a:schemeClr val="tx1"/>
+          </a:fontRef>
+        </p:style>
+      </p:cxnSp>
+      <p:cxnSp>
+        <p:nvCxnSpPr>
+          <p:cNvPr id="42" name="Straight Connector 41">
+            <a:extLst>
+              <a:ext uri="{FF2B5EF4-FFF2-40B4-BE49-F238E27FC236}">
+                <a16:creationId xmlns:a16="http://schemas.microsoft.com/office/drawing/2014/main" id="{AECE477B-BD62-4C82-9E96-CA8C3F883793}"/>
+              </a:ext>
+            </a:extLst>
+          </p:cNvPr>
+          <p:cNvCxnSpPr>
+            <a:cxnSpLocks/>
+          </p:cNvCxnSpPr>
+          <p:nvPr/>
+        </p:nvCxnSpPr>
+        <p:spPr>
+          <a:xfrm>
+            <a:off x="283431" y="9857184"/>
+            <a:ext cx="4804804" cy="0"/>
+          </a:xfrm>
+          <a:prstGeom prst="line">
+            <a:avLst/>
+          </a:prstGeom>
+          <a:ln w="25400">
+            <a:solidFill>
+              <a:schemeClr val="bg1">
+                <a:lumMod val="95000"/>
+              </a:schemeClr>
+            </a:solidFill>
+            <a:prstDash val="dash"/>
+          </a:ln>
+        </p:spPr>
+        <p:style>
+          <a:lnRef idx="1">
+            <a:schemeClr val="accent1"/>
+          </a:lnRef>
+          <a:fillRef idx="0">
+            <a:schemeClr val="accent1"/>
+          </a:fillRef>
+          <a:effectRef idx="0">
+            <a:schemeClr val="accent1"/>
+          </a:effectRef>
+          <a:fontRef idx="minor">
+            <a:schemeClr val="tx1"/>
+          </a:fontRef>
+        </p:style>
+      </p:cxnSp>
+      <p:sp>
+        <p:nvSpPr>
+          <p:cNvPr id="44" name="TextBox 43">
+            <a:extLst>
+              <a:ext uri="{FF2B5EF4-FFF2-40B4-BE49-F238E27FC236}">
+                <a16:creationId xmlns:a16="http://schemas.microsoft.com/office/drawing/2014/main" id="{D6534005-9B6A-4ED2-913A-7BB86113F87E}"/>
+              </a:ext>
+            </a:extLst>
+          </p:cNvPr>
+          <p:cNvSpPr txBox="1"/>
+          <p:nvPr/>
+        </p:nvSpPr>
+        <p:spPr>
+          <a:xfrm>
+            <a:off x="283431" y="10038943"/>
+            <a:ext cx="2553776" cy="2554545"/>
+          </a:xfrm>
+          <a:prstGeom prst="rect">
+            <a:avLst/>
+          </a:prstGeom>
+          <a:noFill/>
+        </p:spPr>
+        <p:txBody>
+          <a:bodyPr wrap="square" rtlCol="0">
+            <a:spAutoFit/>
+          </a:bodyPr>
+          <a:lstStyle/>
+          <a:p>
+            <a:r>
+              <a:rPr lang="en-GB" sz="1600" dirty="0"/>
+              <a:t>These can be run on a separate machine. This has the advantage that you can look at results of earlier simulations before the full set has completed. </a:t>
+            </a:r>
+          </a:p>
+          <a:p>
+            <a:r>
+              <a:rPr lang="en-GB" sz="1600" dirty="0"/>
+              <a:t>Also the modelling machine is only doing the EM simulation thus gets through the models faster.</a:t>
+            </a:r>
+          </a:p>
+        </p:txBody>
+      </p:sp>
+      <p:sp>
+        <p:nvSpPr>
+          <p:cNvPr id="45" name="TextBox 44">
+            <a:extLst>
+              <a:ext uri="{FF2B5EF4-FFF2-40B4-BE49-F238E27FC236}">
+                <a16:creationId xmlns:a16="http://schemas.microsoft.com/office/drawing/2014/main" id="{4611F8FC-E13F-47B5-9848-18A9AA330941}"/>
+              </a:ext>
+            </a:extLst>
+          </p:cNvPr>
+          <p:cNvSpPr txBox="1"/>
+          <p:nvPr/>
+        </p:nvSpPr>
+        <p:spPr>
+          <a:xfrm>
+            <a:off x="146361" y="2949986"/>
+            <a:ext cx="2610843" cy="477054"/>
+          </a:xfrm>
+          <a:prstGeom prst="rect">
+            <a:avLst/>
+          </a:prstGeom>
+          <a:noFill/>
+        </p:spPr>
+        <p:txBody>
+          <a:bodyPr wrap="none" rtlCol="0">
+            <a:spAutoFit/>
+          </a:bodyPr>
+          <a:lstStyle/>
+          <a:p>
+            <a:r>
+              <a:rPr lang="en-GB" dirty="0"/>
+              <a:t>Not currently used</a:t>
+            </a:r>
+          </a:p>
+        </p:txBody>
+      </p:sp>
+      <p:sp>
+        <p:nvSpPr>
+          <p:cNvPr id="46" name="Left Brace 45">
+            <a:extLst>
+              <a:ext uri="{FF2B5EF4-FFF2-40B4-BE49-F238E27FC236}">
+                <a16:creationId xmlns:a16="http://schemas.microsoft.com/office/drawing/2014/main" id="{CEF9C7DB-E6DC-4651-8F62-3D27CF0D51B1}"/>
+              </a:ext>
+            </a:extLst>
+          </p:cNvPr>
+          <p:cNvSpPr/>
+          <p:nvPr/>
+        </p:nvSpPr>
+        <p:spPr>
+          <a:xfrm>
+            <a:off x="3452924" y="158710"/>
+            <a:ext cx="699604" cy="2224043"/>
+          </a:xfrm>
+          <a:prstGeom prst="leftBrace">
+            <a:avLst>
+              <a:gd name="adj1" fmla="val 47135"/>
+              <a:gd name="adj2" fmla="val 50000"/>
+            </a:avLst>
+          </a:prstGeom>
+        </p:spPr>
+        <p:style>
+          <a:lnRef idx="3">
+            <a:schemeClr val="dk1"/>
+          </a:lnRef>
+          <a:fillRef idx="0">
+            <a:schemeClr val="dk1"/>
+          </a:fillRef>
+          <a:effectRef idx="2">
+            <a:schemeClr val="dk1"/>
+          </a:effectRef>
+          <a:fontRef idx="minor">
+            <a:schemeClr val="tx1"/>
+          </a:fontRef>
+        </p:style>
+        <p:txBody>
+          <a:bodyPr rtlCol="0" anchor="ctr"/>
+          <a:lstStyle/>
+          <a:p>
+            <a:pPr algn="ctr"/>
+            <a:endParaRPr lang="en-GB" dirty="0"/>
+          </a:p>
+        </p:txBody>
+      </p:sp>
+      <p:sp>
+        <p:nvSpPr>
+          <p:cNvPr id="47" name="TextBox 46">
+            <a:extLst>
+              <a:ext uri="{FF2B5EF4-FFF2-40B4-BE49-F238E27FC236}">
+                <a16:creationId xmlns:a16="http://schemas.microsoft.com/office/drawing/2014/main" id="{16694101-F40E-494E-9516-0CC7014B8AA1}"/>
+              </a:ext>
+            </a:extLst>
+          </p:cNvPr>
+          <p:cNvSpPr txBox="1"/>
+          <p:nvPr/>
+        </p:nvSpPr>
+        <p:spPr>
+          <a:xfrm>
+            <a:off x="1290244" y="964236"/>
+            <a:ext cx="2553776" cy="584775"/>
+          </a:xfrm>
+          <a:prstGeom prst="rect">
+            <a:avLst/>
+          </a:prstGeom>
+          <a:noFill/>
+        </p:spPr>
+        <p:txBody>
+          <a:bodyPr wrap="square" rtlCol="0">
+            <a:spAutoFit/>
+          </a:bodyPr>
+          <a:lstStyle/>
+          <a:p>
+            <a:r>
+              <a:rPr lang="en-GB" sz="1600" dirty="0"/>
+              <a:t>This is now the EM CAD frontend project</a:t>
+            </a:r>
+          </a:p>
+        </p:txBody>
+      </p:sp>
+      <p:cxnSp>
+        <p:nvCxnSpPr>
+          <p:cNvPr id="49" name="Straight Connector 48">
+            <a:extLst>
+              <a:ext uri="{FF2B5EF4-FFF2-40B4-BE49-F238E27FC236}">
+                <a16:creationId xmlns:a16="http://schemas.microsoft.com/office/drawing/2014/main" id="{4589312D-67B9-4D89-978C-0820AF446336}"/>
+              </a:ext>
+            </a:extLst>
+          </p:cNvPr>
+          <p:cNvCxnSpPr>
+            <a:cxnSpLocks/>
+          </p:cNvCxnSpPr>
+          <p:nvPr/>
+        </p:nvCxnSpPr>
+        <p:spPr>
+          <a:xfrm>
+            <a:off x="43492" y="1971078"/>
+            <a:ext cx="2569471" cy="419054"/>
+          </a:xfrm>
+          <a:prstGeom prst="line">
+            <a:avLst/>
+          </a:prstGeom>
+          <a:ln w="25400">
+            <a:prstDash val="dash"/>
+          </a:ln>
+        </p:spPr>
+        <p:style>
+          <a:lnRef idx="1">
+            <a:schemeClr val="accent1"/>
+          </a:lnRef>
+          <a:fillRef idx="0">
+            <a:schemeClr val="accent1"/>
+          </a:fillRef>
+          <a:effectRef idx="0">
+            <a:schemeClr val="accent1"/>
+          </a:effectRef>
+          <a:fontRef idx="minor">
+            <a:schemeClr val="tx1"/>
+          </a:fontRef>
+        </p:style>
+      </p:cxnSp>
+      <p:sp>
+        <p:nvSpPr>
+          <p:cNvPr id="51" name="Rounded Rectangle 7">
+            <a:extLst>
+              <a:ext uri="{FF2B5EF4-FFF2-40B4-BE49-F238E27FC236}">
+                <a16:creationId xmlns:a16="http://schemas.microsoft.com/office/drawing/2014/main" id="{598435E3-D562-489A-8B24-97249A610A67}"/>
+              </a:ext>
+            </a:extLst>
+          </p:cNvPr>
+          <p:cNvSpPr/>
+          <p:nvPr/>
+        </p:nvSpPr>
+        <p:spPr>
+          <a:xfrm>
+            <a:off x="6744816" y="11657384"/>
+            <a:ext cx="2736304" cy="1008112"/>
+          </a:xfrm>
+          <a:prstGeom prst="roundRect">
+            <a:avLst/>
+          </a:prstGeom>
+          <a:noFill/>
+          <a:ln>
+            <a:solidFill>
+              <a:schemeClr val="tx1"/>
+            </a:solidFill>
+          </a:ln>
+        </p:spPr>
+        <p:style>
+          <a:lnRef idx="2">
+            <a:schemeClr val="accent1">
+              <a:shade val="50000"/>
+            </a:schemeClr>
+          </a:lnRef>
+          <a:fillRef idx="1">
+            <a:schemeClr val="accent1"/>
+          </a:fillRef>
+          <a:effectRef idx="0">
+            <a:schemeClr val="accent1"/>
+          </a:effectRef>
+          <a:fontRef idx="minor">
+            <a:schemeClr val="lt1"/>
+          </a:fontRef>
+        </p:style>
+        <p:txBody>
+          <a:bodyPr lIns="128016" tIns="64008" rIns="128016" bIns="64008" spcCol="0" rtlCol="0" anchor="ctr"/>
+          <a:lstStyle/>
+          <a:p>
+            <a:pPr algn="ctr"/>
+            <a:r>
+              <a:rPr lang="en-GB" sz="1600" dirty="0">
+                <a:solidFill>
+                  <a:schemeClr val="tx1"/>
+                </a:solidFill>
+              </a:rPr>
+              <a:t>Extract particular types of data for sets of models</a:t>
+            </a:r>
+          </a:p>
+          <a:p>
+            <a:pPr algn="ctr"/>
+            <a:r>
+              <a:rPr lang="en-GB" sz="1600" dirty="0" err="1">
+                <a:solidFill>
+                  <a:srgbClr val="FF0000"/>
+                </a:solidFill>
+              </a:rPr>
+              <a:t>extract_all_wlf.m</a:t>
+            </a:r>
+            <a:endParaRPr lang="en-GB" sz="1600" dirty="0">
+              <a:solidFill>
+                <a:srgbClr val="FF0000"/>
+              </a:solidFill>
+            </a:endParaRPr>
+          </a:p>
+        </p:txBody>
+      </p:sp>
+      <p:sp>
+        <p:nvSpPr>
+          <p:cNvPr id="22" name="Left Brace 21">
+            <a:extLst>
+              <a:ext uri="{FF2B5EF4-FFF2-40B4-BE49-F238E27FC236}">
+                <a16:creationId xmlns:a16="http://schemas.microsoft.com/office/drawing/2014/main" id="{110C3E01-5276-4977-80D6-6A67B53DDFDC}"/>
+              </a:ext>
+            </a:extLst>
+          </p:cNvPr>
+          <p:cNvSpPr/>
+          <p:nvPr/>
+        </p:nvSpPr>
+        <p:spPr>
+          <a:xfrm>
+            <a:off x="3144416" y="7264896"/>
+            <a:ext cx="699604" cy="2448270"/>
+          </a:xfrm>
+          <a:prstGeom prst="leftBrace">
+            <a:avLst>
+              <a:gd name="adj1" fmla="val 47135"/>
+              <a:gd name="adj2" fmla="val 50000"/>
+            </a:avLst>
+          </a:prstGeom>
+        </p:spPr>
+        <p:style>
+          <a:lnRef idx="3">
+            <a:schemeClr val="dk1"/>
+          </a:lnRef>
+          <a:fillRef idx="0">
+            <a:schemeClr val="dk1"/>
+          </a:fillRef>
+          <a:effectRef idx="2">
+            <a:schemeClr val="dk1"/>
+          </a:effectRef>
+          <a:fontRef idx="minor">
+            <a:schemeClr val="tx1"/>
+          </a:fontRef>
+        </p:style>
+        <p:txBody>
+          <a:bodyPr rtlCol="0" anchor="ctr"/>
+          <a:lstStyle/>
+          <a:p>
+            <a:pPr algn="ctr"/>
+            <a:endParaRPr lang="en-GB" dirty="0"/>
+          </a:p>
+        </p:txBody>
+      </p:sp>
+      <p:sp>
+        <p:nvSpPr>
+          <p:cNvPr id="41" name="Left Brace 40">
+            <a:extLst>
+              <a:ext uri="{FF2B5EF4-FFF2-40B4-BE49-F238E27FC236}">
+                <a16:creationId xmlns:a16="http://schemas.microsoft.com/office/drawing/2014/main" id="{24A801DD-70DB-4D7F-B32A-60ADD1629FDA}"/>
+              </a:ext>
+            </a:extLst>
+          </p:cNvPr>
+          <p:cNvSpPr/>
+          <p:nvPr/>
+        </p:nvSpPr>
+        <p:spPr>
+          <a:xfrm>
+            <a:off x="3164892" y="9857184"/>
+            <a:ext cx="699604" cy="2808309"/>
+          </a:xfrm>
+          <a:prstGeom prst="leftBrace">
+            <a:avLst>
+              <a:gd name="adj1" fmla="val 47135"/>
+              <a:gd name="adj2" fmla="val 50000"/>
+            </a:avLst>
+          </a:prstGeom>
+        </p:spPr>
+        <p:style>
+          <a:lnRef idx="3">
+            <a:schemeClr val="dk1"/>
+          </a:lnRef>
+          <a:fillRef idx="0">
+            <a:schemeClr val="dk1"/>
+          </a:fillRef>
+          <a:effectRef idx="2">
+            <a:schemeClr val="dk1"/>
+          </a:effectRef>
+          <a:fontRef idx="minor">
+            <a:schemeClr val="tx1"/>
+          </a:fontRef>
+        </p:style>
+        <p:txBody>
+          <a:bodyPr rtlCol="0" anchor="ctr"/>
+          <a:lstStyle/>
+          <a:p>
+            <a:pPr algn="ctr"/>
+            <a:endParaRPr lang="en-GB" dirty="0"/>
+          </a:p>
+        </p:txBody>
+      </p:sp>
     </p:spTree>
     <p:extLst>
       <p:ext uri="{BB962C8B-B14F-4D97-AF65-F5344CB8AC3E}">

</xml_diff>

<commit_message>
Updated workflow documentation to include parameter optimisation.
</commit_message>
<xml_diff>
--- a/Documentation/Workflow_diagram.pptx
+++ b/Documentation/Workflow_diagram.pptx
@@ -6,6 +6,7 @@
   </p:sldMasterIdLst>
   <p:sldIdLst>
     <p:sldId id="256" r:id="rId2"/>
+    <p:sldId id="257" r:id="rId3"/>
   </p:sldIdLst>
   <p:sldSz cx="9601200" cy="12801600" type="A3"/>
   <p:notesSz cx="6669088" cy="9926638"/>
@@ -304,7 +305,7 @@
           <a:p>
             <a:fld id="{8D11A79C-6258-4161-B717-EE8AC917D205}" type="datetimeFigureOut">
               <a:rPr lang="en-GB" smtClean="0"/>
-              <a:t>12/06/2019</a:t>
+              <a:t>17/09/2019</a:t>
             </a:fld>
             <a:endParaRPr lang="en-GB"/>
           </a:p>
@@ -474,7 +475,7 @@
           <a:p>
             <a:fld id="{8D11A79C-6258-4161-B717-EE8AC917D205}" type="datetimeFigureOut">
               <a:rPr lang="en-GB" smtClean="0"/>
-              <a:t>12/06/2019</a:t>
+              <a:t>17/09/2019</a:t>
             </a:fld>
             <a:endParaRPr lang="en-GB"/>
           </a:p>
@@ -654,7 +655,7 @@
           <a:p>
             <a:fld id="{8D11A79C-6258-4161-B717-EE8AC917D205}" type="datetimeFigureOut">
               <a:rPr lang="en-GB" smtClean="0"/>
-              <a:t>12/06/2019</a:t>
+              <a:t>17/09/2019</a:t>
             </a:fld>
             <a:endParaRPr lang="en-GB"/>
           </a:p>
@@ -824,7 +825,7 @@
           <a:p>
             <a:fld id="{8D11A79C-6258-4161-B717-EE8AC917D205}" type="datetimeFigureOut">
               <a:rPr lang="en-GB" smtClean="0"/>
-              <a:t>12/06/2019</a:t>
+              <a:t>17/09/2019</a:t>
             </a:fld>
             <a:endParaRPr lang="en-GB"/>
           </a:p>
@@ -1070,7 +1071,7 @@
           <a:p>
             <a:fld id="{8D11A79C-6258-4161-B717-EE8AC917D205}" type="datetimeFigureOut">
               <a:rPr lang="en-GB" smtClean="0"/>
-              <a:t>12/06/2019</a:t>
+              <a:t>17/09/2019</a:t>
             </a:fld>
             <a:endParaRPr lang="en-GB"/>
           </a:p>
@@ -1358,7 +1359,7 @@
           <a:p>
             <a:fld id="{8D11A79C-6258-4161-B717-EE8AC917D205}" type="datetimeFigureOut">
               <a:rPr lang="en-GB" smtClean="0"/>
-              <a:t>12/06/2019</a:t>
+              <a:t>17/09/2019</a:t>
             </a:fld>
             <a:endParaRPr lang="en-GB"/>
           </a:p>
@@ -1780,7 +1781,7 @@
           <a:p>
             <a:fld id="{8D11A79C-6258-4161-B717-EE8AC917D205}" type="datetimeFigureOut">
               <a:rPr lang="en-GB" smtClean="0"/>
-              <a:t>12/06/2019</a:t>
+              <a:t>17/09/2019</a:t>
             </a:fld>
             <a:endParaRPr lang="en-GB"/>
           </a:p>
@@ -1898,7 +1899,7 @@
           <a:p>
             <a:fld id="{8D11A79C-6258-4161-B717-EE8AC917D205}" type="datetimeFigureOut">
               <a:rPr lang="en-GB" smtClean="0"/>
-              <a:t>12/06/2019</a:t>
+              <a:t>17/09/2019</a:t>
             </a:fld>
             <a:endParaRPr lang="en-GB"/>
           </a:p>
@@ -1993,7 +1994,7 @@
           <a:p>
             <a:fld id="{8D11A79C-6258-4161-B717-EE8AC917D205}" type="datetimeFigureOut">
               <a:rPr lang="en-GB" smtClean="0"/>
-              <a:t>12/06/2019</a:t>
+              <a:t>17/09/2019</a:t>
             </a:fld>
             <a:endParaRPr lang="en-GB"/>
           </a:p>
@@ -2270,7 +2271,7 @@
           <a:p>
             <a:fld id="{8D11A79C-6258-4161-B717-EE8AC917D205}" type="datetimeFigureOut">
               <a:rPr lang="en-GB" smtClean="0"/>
-              <a:t>12/06/2019</a:t>
+              <a:t>17/09/2019</a:t>
             </a:fld>
             <a:endParaRPr lang="en-GB"/>
           </a:p>
@@ -2523,7 +2524,7 @@
           <a:p>
             <a:fld id="{8D11A79C-6258-4161-B717-EE8AC917D205}" type="datetimeFigureOut">
               <a:rPr lang="en-GB" smtClean="0"/>
-              <a:t>12/06/2019</a:t>
+              <a:t>17/09/2019</a:t>
             </a:fld>
             <a:endParaRPr lang="en-GB"/>
           </a:p>
@@ -2736,7 +2737,7 @@
           <a:p>
             <a:fld id="{8D11A79C-6258-4161-B717-EE8AC917D205}" type="datetimeFigureOut">
               <a:rPr lang="en-GB" smtClean="0"/>
-              <a:t>12/06/2019</a:t>
+              <a:t>17/09/2019</a:t>
             </a:fld>
             <a:endParaRPr lang="en-GB"/>
           </a:p>
@@ -5536,6 +5537,746 @@
     <p:extLst>
       <p:ext uri="{BB962C8B-B14F-4D97-AF65-F5344CB8AC3E}">
         <p14:creationId xmlns:p14="http://schemas.microsoft.com/office/powerpoint/2010/main" val="1066209059"/>
+      </p:ext>
+    </p:extLst>
+  </p:cSld>
+  <p:clrMapOvr>
+    <a:masterClrMapping/>
+  </p:clrMapOvr>
+</p:sld>
+</file>
+
+<file path=ppt/slides/slide2.xml><?xml version="1.0" encoding="utf-8"?>
+<p:sld xmlns:a="http://schemas.openxmlformats.org/drawingml/2006/main" xmlns:r="http://schemas.openxmlformats.org/officeDocument/2006/relationships" xmlns:p="http://schemas.openxmlformats.org/presentationml/2006/main">
+  <p:cSld>
+    <p:spTree>
+      <p:nvGrpSpPr>
+        <p:cNvPr id="1" name=""/>
+        <p:cNvGrpSpPr/>
+        <p:nvPr/>
+      </p:nvGrpSpPr>
+      <p:grpSpPr>
+        <a:xfrm>
+          <a:off x="0" y="0"/>
+          <a:ext cx="0" cy="0"/>
+          <a:chOff x="0" y="0"/>
+          <a:chExt cx="0" cy="0"/>
+        </a:xfrm>
+      </p:grpSpPr>
+      <p:sp>
+        <p:nvSpPr>
+          <p:cNvPr id="5" name="TextBox 4">
+            <a:extLst>
+              <a:ext uri="{FF2B5EF4-FFF2-40B4-BE49-F238E27FC236}">
+                <a16:creationId xmlns:a16="http://schemas.microsoft.com/office/drawing/2014/main" id="{9C6A685F-F656-456F-9B21-4F2163A26498}"/>
+              </a:ext>
+            </a:extLst>
+          </p:cNvPr>
+          <p:cNvSpPr txBox="1"/>
+          <p:nvPr/>
+        </p:nvSpPr>
+        <p:spPr>
+          <a:xfrm>
+            <a:off x="0" y="-5309"/>
+            <a:ext cx="6738320" cy="513987"/>
+          </a:xfrm>
+          <a:prstGeom prst="rect">
+            <a:avLst/>
+          </a:prstGeom>
+          <a:solidFill>
+            <a:schemeClr val="tx2">
+              <a:lumMod val="60000"/>
+              <a:lumOff val="40000"/>
+            </a:schemeClr>
+          </a:solidFill>
+        </p:spPr>
+        <p:txBody>
+          <a:bodyPr wrap="none" lIns="128016" tIns="64008" rIns="128016" bIns="64008" rtlCol="0">
+            <a:spAutoFit/>
+          </a:bodyPr>
+          <a:lstStyle/>
+          <a:p>
+            <a:r>
+              <a:rPr lang="en-GB" dirty="0"/>
+              <a:t>EM modelling workflow – parameter optimisation</a:t>
+            </a:r>
+          </a:p>
+        </p:txBody>
+      </p:sp>
+      <p:sp>
+        <p:nvSpPr>
+          <p:cNvPr id="6" name="Rounded Rectangle 5">
+            <a:extLst>
+              <a:ext uri="{FF2B5EF4-FFF2-40B4-BE49-F238E27FC236}">
+                <a16:creationId xmlns:a16="http://schemas.microsoft.com/office/drawing/2014/main" id="{7C945645-7B1B-455A-B43E-DECDB26D7DEA}"/>
+              </a:ext>
+            </a:extLst>
+          </p:cNvPr>
+          <p:cNvSpPr/>
+          <p:nvPr/>
+        </p:nvSpPr>
+        <p:spPr>
+          <a:xfrm>
+            <a:off x="2685168" y="882341"/>
+            <a:ext cx="4166425" cy="1238538"/>
+          </a:xfrm>
+          <a:prstGeom prst="roundRect">
+            <a:avLst/>
+          </a:prstGeom>
+          <a:noFill/>
+          <a:ln>
+            <a:solidFill>
+              <a:schemeClr val="tx1"/>
+            </a:solidFill>
+          </a:ln>
+        </p:spPr>
+        <p:style>
+          <a:lnRef idx="2">
+            <a:schemeClr val="accent1">
+              <a:shade val="50000"/>
+            </a:schemeClr>
+          </a:lnRef>
+          <a:fillRef idx="1">
+            <a:schemeClr val="accent1"/>
+          </a:fillRef>
+          <a:effectRef idx="0">
+            <a:schemeClr val="accent1"/>
+          </a:effectRef>
+          <a:fontRef idx="minor">
+            <a:schemeClr val="lt1"/>
+          </a:fontRef>
+        </p:style>
+        <p:txBody>
+          <a:bodyPr lIns="128016" tIns="64008" rIns="128016" bIns="64008" spcCol="0" rtlCol="0" anchor="ctr"/>
+          <a:lstStyle/>
+          <a:p>
+            <a:pPr algn="ctr"/>
+            <a:r>
+              <a:rPr lang="en-GB" sz="1600" dirty="0">
+                <a:solidFill>
+                  <a:schemeClr val="tx1"/>
+                </a:solidFill>
+              </a:rPr>
+              <a:t>Run a series of short wake PEC models with different mesh densities.</a:t>
+            </a:r>
+          </a:p>
+          <a:p>
+            <a:pPr algn="ctr"/>
+            <a:r>
+              <a:rPr lang="en-GB" sz="1200" dirty="0">
+                <a:solidFill>
+                  <a:srgbClr val="00B050"/>
+                </a:solidFill>
+              </a:rPr>
+              <a:t>This returns a series of geometric wake loss factors which identify the minimum mesh density required to have a stable wake loss factor.</a:t>
+            </a:r>
+          </a:p>
+        </p:txBody>
+      </p:sp>
+      <p:sp>
+        <p:nvSpPr>
+          <p:cNvPr id="8" name="Rounded Rectangle 5">
+            <a:extLst>
+              <a:ext uri="{FF2B5EF4-FFF2-40B4-BE49-F238E27FC236}">
+                <a16:creationId xmlns:a16="http://schemas.microsoft.com/office/drawing/2014/main" id="{79FDB3C7-49BB-4EE7-A5BC-ADD4EFF8C458}"/>
+              </a:ext>
+            </a:extLst>
+          </p:cNvPr>
+          <p:cNvSpPr/>
+          <p:nvPr/>
+        </p:nvSpPr>
+        <p:spPr>
+          <a:xfrm>
+            <a:off x="1705815" y="6636211"/>
+            <a:ext cx="4166425" cy="721285"/>
+          </a:xfrm>
+          <a:prstGeom prst="roundRect">
+            <a:avLst/>
+          </a:prstGeom>
+          <a:noFill/>
+          <a:ln>
+            <a:solidFill>
+              <a:schemeClr val="tx1"/>
+            </a:solidFill>
+          </a:ln>
+        </p:spPr>
+        <p:style>
+          <a:lnRef idx="2">
+            <a:schemeClr val="accent1">
+              <a:shade val="50000"/>
+            </a:schemeClr>
+          </a:lnRef>
+          <a:fillRef idx="1">
+            <a:schemeClr val="accent1"/>
+          </a:fillRef>
+          <a:effectRef idx="0">
+            <a:schemeClr val="accent1"/>
+          </a:effectRef>
+          <a:fontRef idx="minor">
+            <a:schemeClr val="lt1"/>
+          </a:fontRef>
+        </p:style>
+        <p:txBody>
+          <a:bodyPr lIns="128016" tIns="64008" rIns="128016" bIns="64008" spcCol="0" rtlCol="0" anchor="ctr"/>
+          <a:lstStyle/>
+          <a:p>
+            <a:pPr algn="ctr"/>
+            <a:r>
+              <a:rPr lang="en-GB" sz="1600" dirty="0">
+                <a:solidFill>
+                  <a:schemeClr val="tx1"/>
+                </a:solidFill>
+              </a:rPr>
+              <a:t>Using the determined simulation parameters, run geometry /material sweeps</a:t>
+            </a:r>
+          </a:p>
+          <a:p>
+            <a:pPr algn="ctr"/>
+            <a:r>
+              <a:rPr lang="en-GB" sz="1200" dirty="0">
+                <a:solidFill>
+                  <a:srgbClr val="00B050"/>
+                </a:solidFill>
+              </a:rPr>
+              <a:t>Take care if the geometry changes reduce gaps. </a:t>
+            </a:r>
+          </a:p>
+        </p:txBody>
+      </p:sp>
+      <p:sp>
+        <p:nvSpPr>
+          <p:cNvPr id="9" name="Rounded Rectangle 5">
+            <a:extLst>
+              <a:ext uri="{FF2B5EF4-FFF2-40B4-BE49-F238E27FC236}">
+                <a16:creationId xmlns:a16="http://schemas.microsoft.com/office/drawing/2014/main" id="{6176E8A8-02BB-4872-A9A4-5901CB4FEBA2}"/>
+              </a:ext>
+            </a:extLst>
+          </p:cNvPr>
+          <p:cNvSpPr/>
+          <p:nvPr/>
+        </p:nvSpPr>
+        <p:spPr>
+          <a:xfrm>
+            <a:off x="3341341" y="5329316"/>
+            <a:ext cx="2854078" cy="839965"/>
+          </a:xfrm>
+          <a:prstGeom prst="roundRect">
+            <a:avLst/>
+          </a:prstGeom>
+          <a:noFill/>
+          <a:ln>
+            <a:solidFill>
+              <a:schemeClr val="tx1"/>
+            </a:solidFill>
+          </a:ln>
+        </p:spPr>
+        <p:style>
+          <a:lnRef idx="2">
+            <a:schemeClr val="accent1">
+              <a:shade val="50000"/>
+            </a:schemeClr>
+          </a:lnRef>
+          <a:fillRef idx="1">
+            <a:schemeClr val="accent1"/>
+          </a:fillRef>
+          <a:effectRef idx="0">
+            <a:schemeClr val="accent1"/>
+          </a:effectRef>
+          <a:fontRef idx="minor">
+            <a:schemeClr val="lt1"/>
+          </a:fontRef>
+        </p:style>
+        <p:txBody>
+          <a:bodyPr lIns="128016" tIns="64008" rIns="128016" bIns="64008" spcCol="0" rtlCol="0" anchor="ctr"/>
+          <a:lstStyle/>
+          <a:p>
+            <a:pPr algn="ctr"/>
+            <a:r>
+              <a:rPr lang="en-GB" sz="1600" dirty="0">
+                <a:solidFill>
+                  <a:schemeClr val="tx1"/>
+                </a:solidFill>
+              </a:rPr>
+              <a:t>Run a lossy model</a:t>
+            </a:r>
+          </a:p>
+          <a:p>
+            <a:pPr algn="ctr"/>
+            <a:r>
+              <a:rPr lang="en-GB" sz="1200" dirty="0">
+                <a:solidFill>
+                  <a:srgbClr val="00B050"/>
+                </a:solidFill>
+              </a:rPr>
+              <a:t>Identifies geometric  + material losses</a:t>
+            </a:r>
+          </a:p>
+          <a:p>
+            <a:pPr algn="ctr"/>
+            <a:r>
+              <a:rPr lang="en-GB" sz="1200" dirty="0">
+                <a:solidFill>
+                  <a:srgbClr val="00B050"/>
+                </a:solidFill>
+              </a:rPr>
+              <a:t>Gives good resolution wake loss spectra</a:t>
+            </a:r>
+          </a:p>
+        </p:txBody>
+      </p:sp>
+      <p:sp>
+        <p:nvSpPr>
+          <p:cNvPr id="10" name="Rounded Rectangle 5">
+            <a:extLst>
+              <a:ext uri="{FF2B5EF4-FFF2-40B4-BE49-F238E27FC236}">
+                <a16:creationId xmlns:a16="http://schemas.microsoft.com/office/drawing/2014/main" id="{FE131F72-ED22-49AD-AC7D-B5DA3CDB20AD}"/>
+              </a:ext>
+            </a:extLst>
+          </p:cNvPr>
+          <p:cNvSpPr/>
+          <p:nvPr/>
+        </p:nvSpPr>
+        <p:spPr>
+          <a:xfrm>
+            <a:off x="3407671" y="3265736"/>
+            <a:ext cx="2854078" cy="929859"/>
+          </a:xfrm>
+          <a:prstGeom prst="roundRect">
+            <a:avLst/>
+          </a:prstGeom>
+          <a:noFill/>
+          <a:ln>
+            <a:solidFill>
+              <a:schemeClr val="tx1"/>
+            </a:solidFill>
+          </a:ln>
+        </p:spPr>
+        <p:style>
+          <a:lnRef idx="2">
+            <a:schemeClr val="accent1">
+              <a:shade val="50000"/>
+            </a:schemeClr>
+          </a:lnRef>
+          <a:fillRef idx="1">
+            <a:schemeClr val="accent1"/>
+          </a:fillRef>
+          <a:effectRef idx="0">
+            <a:schemeClr val="accent1"/>
+          </a:effectRef>
+          <a:fontRef idx="minor">
+            <a:schemeClr val="lt1"/>
+          </a:fontRef>
+        </p:style>
+        <p:txBody>
+          <a:bodyPr lIns="128016" tIns="64008" rIns="128016" bIns="64008" spcCol="0" rtlCol="0" anchor="ctr"/>
+          <a:lstStyle/>
+          <a:p>
+            <a:pPr algn="ctr"/>
+            <a:r>
+              <a:rPr lang="en-GB" sz="1600" dirty="0">
+                <a:solidFill>
+                  <a:schemeClr val="tx1"/>
+                </a:solidFill>
+              </a:rPr>
+              <a:t>Run a long wake PEC model</a:t>
+            </a:r>
+          </a:p>
+          <a:p>
+            <a:pPr algn="ctr"/>
+            <a:r>
+              <a:rPr lang="en-GB" sz="1200" dirty="0">
+                <a:solidFill>
+                  <a:srgbClr val="00B050"/>
+                </a:solidFill>
+              </a:rPr>
+              <a:t>Identifies geometric losses</a:t>
+            </a:r>
+          </a:p>
+          <a:p>
+            <a:pPr algn="ctr"/>
+            <a:r>
+              <a:rPr lang="en-GB" sz="1200" dirty="0">
+                <a:solidFill>
+                  <a:srgbClr val="00B050"/>
+                </a:solidFill>
+              </a:rPr>
+              <a:t>Gives good resolution wake loss spectra</a:t>
+            </a:r>
+          </a:p>
+        </p:txBody>
+      </p:sp>
+      <p:sp>
+        <p:nvSpPr>
+          <p:cNvPr id="23" name="Left Brace 22">
+            <a:extLst>
+              <a:ext uri="{FF2B5EF4-FFF2-40B4-BE49-F238E27FC236}">
+                <a16:creationId xmlns:a16="http://schemas.microsoft.com/office/drawing/2014/main" id="{BF20C47C-F653-4ADC-AA4A-94BA307422F5}"/>
+              </a:ext>
+            </a:extLst>
+          </p:cNvPr>
+          <p:cNvSpPr/>
+          <p:nvPr/>
+        </p:nvSpPr>
+        <p:spPr>
+          <a:xfrm>
+            <a:off x="1815431" y="882342"/>
+            <a:ext cx="699604" cy="5286940"/>
+          </a:xfrm>
+          <a:prstGeom prst="leftBrace">
+            <a:avLst>
+              <a:gd name="adj1" fmla="val 47135"/>
+              <a:gd name="adj2" fmla="val 50000"/>
+            </a:avLst>
+          </a:prstGeom>
+        </p:spPr>
+        <p:style>
+          <a:lnRef idx="3">
+            <a:schemeClr val="dk1"/>
+          </a:lnRef>
+          <a:fillRef idx="0">
+            <a:schemeClr val="dk1"/>
+          </a:fillRef>
+          <a:effectRef idx="2">
+            <a:schemeClr val="dk1"/>
+          </a:effectRef>
+          <a:fontRef idx="minor">
+            <a:schemeClr val="tx1"/>
+          </a:fontRef>
+        </p:style>
+        <p:txBody>
+          <a:bodyPr rtlCol="0" anchor="ctr"/>
+          <a:lstStyle/>
+          <a:p>
+            <a:pPr algn="ctr"/>
+            <a:endParaRPr lang="en-GB" dirty="0"/>
+          </a:p>
+        </p:txBody>
+      </p:sp>
+      <p:sp>
+        <p:nvSpPr>
+          <p:cNvPr id="24" name="TextBox 23">
+            <a:extLst>
+              <a:ext uri="{FF2B5EF4-FFF2-40B4-BE49-F238E27FC236}">
+                <a16:creationId xmlns:a16="http://schemas.microsoft.com/office/drawing/2014/main" id="{2C7002AE-F990-4D1B-9E31-EFC6EB25D1CA}"/>
+              </a:ext>
+            </a:extLst>
+          </p:cNvPr>
+          <p:cNvSpPr txBox="1"/>
+          <p:nvPr/>
+        </p:nvSpPr>
+        <p:spPr>
+          <a:xfrm>
+            <a:off x="120080" y="2902564"/>
+            <a:ext cx="1738090" cy="1246495"/>
+          </a:xfrm>
+          <a:prstGeom prst="rect">
+            <a:avLst/>
+          </a:prstGeom>
+          <a:noFill/>
+        </p:spPr>
+        <p:txBody>
+          <a:bodyPr wrap="square" rtlCol="0">
+            <a:spAutoFit/>
+          </a:bodyPr>
+          <a:lstStyle/>
+          <a:p>
+            <a:r>
+              <a:rPr lang="en-GB" dirty="0"/>
+              <a:t>Base model parameter setup</a:t>
+            </a:r>
+          </a:p>
+        </p:txBody>
+      </p:sp>
+      <p:sp>
+        <p:nvSpPr>
+          <p:cNvPr id="25" name="Rectangle: Rounded Corners 24">
+            <a:extLst>
+              <a:ext uri="{FF2B5EF4-FFF2-40B4-BE49-F238E27FC236}">
+                <a16:creationId xmlns:a16="http://schemas.microsoft.com/office/drawing/2014/main" id="{7FAAB370-FF28-4F5D-8820-EB335AA7CB10}"/>
+              </a:ext>
+            </a:extLst>
+          </p:cNvPr>
+          <p:cNvSpPr/>
+          <p:nvPr/>
+        </p:nvSpPr>
+        <p:spPr>
+          <a:xfrm>
+            <a:off x="3730793" y="2273325"/>
+            <a:ext cx="2075174" cy="839965"/>
+          </a:xfrm>
+          <a:prstGeom prst="roundRect">
+            <a:avLst/>
+          </a:prstGeom>
+          <a:noFill/>
+          <a:ln w="34925">
+            <a:solidFill>
+              <a:schemeClr val="tx1"/>
+            </a:solidFill>
+            <a:prstDash val="dash"/>
+          </a:ln>
+        </p:spPr>
+        <p:style>
+          <a:lnRef idx="2">
+            <a:schemeClr val="accent1">
+              <a:shade val="50000"/>
+            </a:schemeClr>
+          </a:lnRef>
+          <a:fillRef idx="1">
+            <a:schemeClr val="accent1"/>
+          </a:fillRef>
+          <a:effectRef idx="0">
+            <a:schemeClr val="accent1"/>
+          </a:effectRef>
+          <a:fontRef idx="minor">
+            <a:schemeClr val="lt1"/>
+          </a:fontRef>
+        </p:style>
+        <p:txBody>
+          <a:bodyPr rtlCol="0" anchor="ctr"/>
+          <a:lstStyle/>
+          <a:p>
+            <a:pPr algn="ctr"/>
+            <a:r>
+              <a:rPr lang="en-GB" sz="1200" dirty="0">
+                <a:solidFill>
+                  <a:schemeClr val="tx1"/>
+                </a:solidFill>
+              </a:rPr>
+              <a:t>Determine the appropriate mesh density</a:t>
+            </a:r>
+          </a:p>
+          <a:p>
+            <a:pPr algn="ctr"/>
+            <a:r>
+              <a:rPr lang="en-GB" sz="1200" dirty="0" err="1">
+                <a:solidFill>
+                  <a:srgbClr val="FF0000"/>
+                </a:solidFill>
+              </a:rPr>
+              <a:t>get_wlf_vs_mesh_density.m</a:t>
+            </a:r>
+            <a:endParaRPr lang="en-GB" sz="1200" dirty="0">
+              <a:solidFill>
+                <a:srgbClr val="FF0000"/>
+              </a:solidFill>
+            </a:endParaRPr>
+          </a:p>
+        </p:txBody>
+      </p:sp>
+      <p:sp>
+        <p:nvSpPr>
+          <p:cNvPr id="32" name="Rectangle: Rounded Corners 31">
+            <a:extLst>
+              <a:ext uri="{FF2B5EF4-FFF2-40B4-BE49-F238E27FC236}">
+                <a16:creationId xmlns:a16="http://schemas.microsoft.com/office/drawing/2014/main" id="{E6106053-055D-4E28-B2C8-9CB38FD2AC1F}"/>
+              </a:ext>
+            </a:extLst>
+          </p:cNvPr>
+          <p:cNvSpPr/>
+          <p:nvPr/>
+        </p:nvSpPr>
+        <p:spPr>
+          <a:xfrm>
+            <a:off x="3777294" y="4348041"/>
+            <a:ext cx="2114831" cy="839965"/>
+          </a:xfrm>
+          <a:prstGeom prst="roundRect">
+            <a:avLst/>
+          </a:prstGeom>
+          <a:noFill/>
+          <a:ln w="34925">
+            <a:solidFill>
+              <a:schemeClr val="tx1"/>
+            </a:solidFill>
+            <a:prstDash val="dash"/>
+          </a:ln>
+        </p:spPr>
+        <p:style>
+          <a:lnRef idx="2">
+            <a:schemeClr val="accent1">
+              <a:shade val="50000"/>
+            </a:schemeClr>
+          </a:lnRef>
+          <a:fillRef idx="1">
+            <a:schemeClr val="accent1"/>
+          </a:fillRef>
+          <a:effectRef idx="0">
+            <a:schemeClr val="accent1"/>
+          </a:effectRef>
+          <a:fontRef idx="minor">
+            <a:schemeClr val="lt1"/>
+          </a:fontRef>
+        </p:style>
+        <p:txBody>
+          <a:bodyPr rtlCol="0" anchor="ctr"/>
+          <a:lstStyle/>
+          <a:p>
+            <a:pPr algn="ctr"/>
+            <a:r>
+              <a:rPr lang="en-GB" sz="1200" dirty="0">
+                <a:solidFill>
+                  <a:schemeClr val="tx1"/>
+                </a:solidFill>
+              </a:rPr>
+              <a:t>Determine the appropriate wake length</a:t>
+            </a:r>
+          </a:p>
+          <a:p>
+            <a:pPr algn="ctr"/>
+            <a:r>
+              <a:rPr lang="en-GB" sz="1200" dirty="0">
+                <a:solidFill>
+                  <a:schemeClr val="tx1"/>
+                </a:solidFill>
+              </a:rPr>
+              <a:t>(wake length studies can be done in postprocessing)</a:t>
+            </a:r>
+          </a:p>
+        </p:txBody>
+      </p:sp>
+      <p:sp>
+        <p:nvSpPr>
+          <p:cNvPr id="34" name="Rectangle: Rounded Corners 33">
+            <a:extLst>
+              <a:ext uri="{FF2B5EF4-FFF2-40B4-BE49-F238E27FC236}">
+                <a16:creationId xmlns:a16="http://schemas.microsoft.com/office/drawing/2014/main" id="{329CA52F-952B-410F-AD91-32D8A927F346}"/>
+              </a:ext>
+            </a:extLst>
+          </p:cNvPr>
+          <p:cNvSpPr/>
+          <p:nvPr/>
+        </p:nvSpPr>
+        <p:spPr>
+          <a:xfrm>
+            <a:off x="7477507" y="3113290"/>
+            <a:ext cx="1944216" cy="2331299"/>
+          </a:xfrm>
+          <a:prstGeom prst="roundRect">
+            <a:avLst/>
+          </a:prstGeom>
+        </p:spPr>
+        <p:style>
+          <a:lnRef idx="2">
+            <a:schemeClr val="accent1">
+              <a:shade val="50000"/>
+            </a:schemeClr>
+          </a:lnRef>
+          <a:fillRef idx="1">
+            <a:schemeClr val="accent1"/>
+          </a:fillRef>
+          <a:effectRef idx="0">
+            <a:schemeClr val="accent1"/>
+          </a:effectRef>
+          <a:fontRef idx="minor">
+            <a:schemeClr val="lt1"/>
+          </a:fontRef>
+        </p:style>
+        <p:txBody>
+          <a:bodyPr rtlCol="0" anchor="ctr"/>
+          <a:lstStyle/>
+          <a:p>
+            <a:pPr algn="ctr"/>
+            <a:r>
+              <a:rPr lang="en-GB" dirty="0"/>
+              <a:t>Rename the results folder if you wish to keep the results.</a:t>
+            </a:r>
+          </a:p>
+        </p:txBody>
+      </p:sp>
+      <p:cxnSp>
+        <p:nvCxnSpPr>
+          <p:cNvPr id="38" name="Connector: Elbow 37">
+            <a:extLst>
+              <a:ext uri="{FF2B5EF4-FFF2-40B4-BE49-F238E27FC236}">
+                <a16:creationId xmlns:a16="http://schemas.microsoft.com/office/drawing/2014/main" id="{FDD914CA-CAAF-4A0E-901B-5F9BBDDC3ED7}"/>
+              </a:ext>
+            </a:extLst>
+          </p:cNvPr>
+          <p:cNvCxnSpPr>
+            <a:stCxn id="34" idx="1"/>
+          </p:cNvCxnSpPr>
+          <p:nvPr/>
+        </p:nvCxnSpPr>
+        <p:spPr>
+          <a:xfrm rot="10800000">
+            <a:off x="6024737" y="3113290"/>
+            <a:ext cx="1452771" cy="1165650"/>
+          </a:xfrm>
+          <a:prstGeom prst="bentConnector3">
+            <a:avLst/>
+          </a:prstGeom>
+          <a:ln w="41275">
+            <a:solidFill>
+              <a:schemeClr val="tx1"/>
+            </a:solidFill>
+            <a:prstDash val="sysDot"/>
+            <a:tailEnd type="triangle"/>
+          </a:ln>
+        </p:spPr>
+        <p:style>
+          <a:lnRef idx="1">
+            <a:schemeClr val="accent1"/>
+          </a:lnRef>
+          <a:fillRef idx="0">
+            <a:schemeClr val="accent1"/>
+          </a:fillRef>
+          <a:effectRef idx="0">
+            <a:schemeClr val="accent1"/>
+          </a:effectRef>
+          <a:fontRef idx="minor">
+            <a:schemeClr val="tx1"/>
+          </a:fontRef>
+        </p:style>
+      </p:cxnSp>
+      <p:cxnSp>
+        <p:nvCxnSpPr>
+          <p:cNvPr id="40" name="Connector: Elbow 39">
+            <a:extLst>
+              <a:ext uri="{FF2B5EF4-FFF2-40B4-BE49-F238E27FC236}">
+                <a16:creationId xmlns:a16="http://schemas.microsoft.com/office/drawing/2014/main" id="{9CA2E5A7-1896-461A-9661-23F424AAFA95}"/>
+              </a:ext>
+            </a:extLst>
+          </p:cNvPr>
+          <p:cNvCxnSpPr>
+            <a:stCxn id="34" idx="1"/>
+          </p:cNvCxnSpPr>
+          <p:nvPr/>
+        </p:nvCxnSpPr>
+        <p:spPr>
+          <a:xfrm rot="10800000" flipV="1">
+            <a:off x="6143243" y="4278940"/>
+            <a:ext cx="1334265" cy="909066"/>
+          </a:xfrm>
+          <a:prstGeom prst="bentConnector3">
+            <a:avLst/>
+          </a:prstGeom>
+          <a:ln w="41275">
+            <a:solidFill>
+              <a:schemeClr val="tx1"/>
+            </a:solidFill>
+            <a:prstDash val="sysDot"/>
+            <a:tailEnd type="triangle"/>
+          </a:ln>
+        </p:spPr>
+        <p:style>
+          <a:lnRef idx="1">
+            <a:schemeClr val="accent1"/>
+          </a:lnRef>
+          <a:fillRef idx="0">
+            <a:schemeClr val="accent1"/>
+          </a:fillRef>
+          <a:effectRef idx="0">
+            <a:schemeClr val="accent1"/>
+          </a:effectRef>
+          <a:fontRef idx="minor">
+            <a:schemeClr val="tx1"/>
+          </a:fontRef>
+        </p:style>
+      </p:cxnSp>
+    </p:spTree>
+    <p:extLst>
+      <p:ext uri="{BB962C8B-B14F-4D97-AF65-F5344CB8AC3E}">
+        <p14:creationId xmlns:p14="http://schemas.microsoft.com/office/powerpoint/2010/main" val="1124134709"/>
       </p:ext>
     </p:extLst>
   </p:cSld>

</xml_diff>

<commit_message>
Removing out of date files and those which pretain to the FreeCAD geometry generation which was separated into another project. Updated the workflow diagram to reflect the current behaviour.
</commit_message>
<xml_diff>
--- a/Documentation/Workflow_diagram.pptx
+++ b/Documentation/Workflow_diagram.pptx
@@ -305,7 +305,7 @@
           <a:p>
             <a:fld id="{8D11A79C-6258-4161-B717-EE8AC917D205}" type="datetimeFigureOut">
               <a:rPr lang="en-GB" smtClean="0"/>
-              <a:t>17/09/2019</a:t>
+              <a:t>12/09/2022</a:t>
             </a:fld>
             <a:endParaRPr lang="en-GB"/>
           </a:p>
@@ -475,7 +475,7 @@
           <a:p>
             <a:fld id="{8D11A79C-6258-4161-B717-EE8AC917D205}" type="datetimeFigureOut">
               <a:rPr lang="en-GB" smtClean="0"/>
-              <a:t>17/09/2019</a:t>
+              <a:t>12/09/2022</a:t>
             </a:fld>
             <a:endParaRPr lang="en-GB"/>
           </a:p>
@@ -655,7 +655,7 @@
           <a:p>
             <a:fld id="{8D11A79C-6258-4161-B717-EE8AC917D205}" type="datetimeFigureOut">
               <a:rPr lang="en-GB" smtClean="0"/>
-              <a:t>17/09/2019</a:t>
+              <a:t>12/09/2022</a:t>
             </a:fld>
             <a:endParaRPr lang="en-GB"/>
           </a:p>
@@ -825,7 +825,7 @@
           <a:p>
             <a:fld id="{8D11A79C-6258-4161-B717-EE8AC917D205}" type="datetimeFigureOut">
               <a:rPr lang="en-GB" smtClean="0"/>
-              <a:t>17/09/2019</a:t>
+              <a:t>12/09/2022</a:t>
             </a:fld>
             <a:endParaRPr lang="en-GB"/>
           </a:p>
@@ -1071,7 +1071,7 @@
           <a:p>
             <a:fld id="{8D11A79C-6258-4161-B717-EE8AC917D205}" type="datetimeFigureOut">
               <a:rPr lang="en-GB" smtClean="0"/>
-              <a:t>17/09/2019</a:t>
+              <a:t>12/09/2022</a:t>
             </a:fld>
             <a:endParaRPr lang="en-GB"/>
           </a:p>
@@ -1359,7 +1359,7 @@
           <a:p>
             <a:fld id="{8D11A79C-6258-4161-B717-EE8AC917D205}" type="datetimeFigureOut">
               <a:rPr lang="en-GB" smtClean="0"/>
-              <a:t>17/09/2019</a:t>
+              <a:t>12/09/2022</a:t>
             </a:fld>
             <a:endParaRPr lang="en-GB"/>
           </a:p>
@@ -1781,7 +1781,7 @@
           <a:p>
             <a:fld id="{8D11A79C-6258-4161-B717-EE8AC917D205}" type="datetimeFigureOut">
               <a:rPr lang="en-GB" smtClean="0"/>
-              <a:t>17/09/2019</a:t>
+              <a:t>12/09/2022</a:t>
             </a:fld>
             <a:endParaRPr lang="en-GB"/>
           </a:p>
@@ -1899,7 +1899,7 @@
           <a:p>
             <a:fld id="{8D11A79C-6258-4161-B717-EE8AC917D205}" type="datetimeFigureOut">
               <a:rPr lang="en-GB" smtClean="0"/>
-              <a:t>17/09/2019</a:t>
+              <a:t>12/09/2022</a:t>
             </a:fld>
             <a:endParaRPr lang="en-GB"/>
           </a:p>
@@ -1994,7 +1994,7 @@
           <a:p>
             <a:fld id="{8D11A79C-6258-4161-B717-EE8AC917D205}" type="datetimeFigureOut">
               <a:rPr lang="en-GB" smtClean="0"/>
-              <a:t>17/09/2019</a:t>
+              <a:t>12/09/2022</a:t>
             </a:fld>
             <a:endParaRPr lang="en-GB"/>
           </a:p>
@@ -2271,7 +2271,7 @@
           <a:p>
             <a:fld id="{8D11A79C-6258-4161-B717-EE8AC917D205}" type="datetimeFigureOut">
               <a:rPr lang="en-GB" smtClean="0"/>
-              <a:t>17/09/2019</a:t>
+              <a:t>12/09/2022</a:t>
             </a:fld>
             <a:endParaRPr lang="en-GB"/>
           </a:p>
@@ -2524,7 +2524,7 @@
           <a:p>
             <a:fld id="{8D11A79C-6258-4161-B717-EE8AC917D205}" type="datetimeFigureOut">
               <a:rPr lang="en-GB" smtClean="0"/>
-              <a:t>17/09/2019</a:t>
+              <a:t>12/09/2022</a:t>
             </a:fld>
             <a:endParaRPr lang="en-GB"/>
           </a:p>
@@ -2737,7 +2737,7 @@
           <a:p>
             <a:fld id="{8D11A79C-6258-4161-B717-EE8AC917D205}" type="datetimeFigureOut">
               <a:rPr lang="en-GB" smtClean="0"/>
-              <a:t>17/09/2019</a:t>
+              <a:t>12/09/2022</a:t>
             </a:fld>
             <a:endParaRPr lang="en-GB"/>
           </a:p>
@@ -3148,14 +3148,14 @@
       </p:sp>
       <p:sp>
         <p:nvSpPr>
-          <p:cNvPr id="5" name="Rounded Rectangle 4"/>
+          <p:cNvPr id="6" name="Rounded Rectangle 5"/>
           <p:cNvSpPr/>
           <p:nvPr/>
         </p:nvSpPr>
         <p:spPr>
           <a:xfrm>
-            <a:off x="146361" y="3736504"/>
-            <a:ext cx="3142071" cy="1586317"/>
+            <a:off x="4122799" y="208112"/>
+            <a:ext cx="4669400" cy="1238538"/>
           </a:xfrm>
           <a:prstGeom prst="roundRect">
             <a:avLst/>
@@ -3187,81 +3187,40 @@
           <a:bodyPr lIns="128016" tIns="64008" rIns="128016" bIns="64008" spcCol="0" rtlCol="0" anchor="ctr"/>
           <a:lstStyle/>
           <a:p>
-            <a:pPr marL="285750" indent="-285750">
-              <a:buFont typeface="Arial" panose="020B0604020202020204" pitchFamily="34" charset="0"/>
-              <a:buChar char="•"/>
-            </a:pPr>
+            <a:pPr algn="ctr"/>
             <a:r>
               <a:rPr lang="en-GB" sz="1600" dirty="0">
                 <a:solidFill>
                   <a:schemeClr val="tx1"/>
                 </a:solidFill>
               </a:rPr>
-              <a:t>Write geometry description using GdfidL primitives</a:t>
-            </a:r>
-          </a:p>
-          <a:p>
-            <a:pPr marL="285750" indent="-285750">
-              <a:buFont typeface="Arial" panose="020B0604020202020204" pitchFamily="34" charset="0"/>
-              <a:buChar char="•"/>
-            </a:pPr>
-            <a:r>
-              <a:rPr lang="en-GB" sz="1600" dirty="0">
+              <a:t>Generate STL files with  geometry parameter files</a:t>
+            </a:r>
+          </a:p>
+          <a:p>
+            <a:pPr algn="ctr"/>
+            <a:r>
+              <a:rPr lang="en-GB" sz="1200" dirty="0">
+                <a:solidFill>
+                  <a:srgbClr val="00B050"/>
+                </a:solidFill>
+              </a:rPr>
+              <a:t>Get a folder structure containing all the STL files for all values of the defined geometric parameter sweeps</a:t>
+            </a:r>
+          </a:p>
+          <a:p>
+            <a:pPr algn="ctr"/>
+            <a:r>
+              <a:rPr lang="en-GB" sz="1200" dirty="0">
                 <a:solidFill>
                   <a:schemeClr val="tx1"/>
                 </a:solidFill>
               </a:rPr>
-              <a:t>Specify the material mapping</a:t>
-            </a:r>
-          </a:p>
-          <a:p>
-            <a:pPr marL="285750" indent="-285750">
-              <a:buFont typeface="Arial" panose="020B0604020202020204" pitchFamily="34" charset="0"/>
-              <a:buChar char="•"/>
-            </a:pPr>
-            <a:r>
-              <a:rPr lang="en-GB" sz="1600" dirty="0">
-                <a:solidFill>
-                  <a:schemeClr val="tx1"/>
-                </a:solidFill>
-              </a:rPr>
-              <a:t>Specify the port definitions</a:t>
-            </a:r>
-          </a:p>
-          <a:p>
-            <a:pPr marL="285750" indent="-285750">
-              <a:buFont typeface="Arial" panose="020B0604020202020204" pitchFamily="34" charset="0"/>
-              <a:buChar char="•"/>
-            </a:pPr>
-            <a:r>
-              <a:rPr lang="en-GB" sz="1600" dirty="0">
-                <a:solidFill>
-                  <a:schemeClr val="tx1"/>
-                </a:solidFill>
-              </a:rPr>
-              <a:t>Specify the mesh  definitions</a:t>
-            </a:r>
-          </a:p>
-          <a:p>
-            <a:r>
-              <a:rPr lang="en-GB" sz="1700" dirty="0">
-                <a:solidFill>
-                  <a:srgbClr val="FF0000"/>
-                </a:solidFill>
-              </a:rPr>
-              <a:t>&lt;model name&gt;_</a:t>
-            </a:r>
-            <a:r>
-              <a:rPr lang="en-GB" sz="1700" dirty="0" err="1">
-                <a:solidFill>
-                  <a:srgbClr val="FF0000"/>
-                </a:solidFill>
-              </a:rPr>
-              <a:t>model_data</a:t>
-            </a:r>
-            <a:endParaRPr lang="en-GB" sz="1700" dirty="0">
+              <a:t>[EM CAD frontend project]</a:t>
+            </a:r>
+            <a:endParaRPr lang="en-GB" sz="1200" dirty="0">
               <a:solidFill>
-                <a:srgbClr val="FF0000"/>
+                <a:srgbClr val="00B050"/>
               </a:solidFill>
             </a:endParaRPr>
           </a:p>
@@ -3269,14 +3228,14 @@
       </p:sp>
       <p:sp>
         <p:nvSpPr>
-          <p:cNvPr id="6" name="Rounded Rectangle 5"/>
+          <p:cNvPr id="8" name="Rounded Rectangle 7"/>
           <p:cNvSpPr/>
           <p:nvPr/>
         </p:nvSpPr>
         <p:spPr>
           <a:xfrm>
-            <a:off x="4625773" y="1144216"/>
-            <a:ext cx="4166425" cy="1238538"/>
+            <a:off x="2915267" y="11801400"/>
+            <a:ext cx="5026953" cy="738865"/>
           </a:xfrm>
           <a:prstGeom prst="roundRect">
             <a:avLst/>
@@ -3315,88 +3274,31 @@
                   <a:schemeClr val="tx1"/>
                 </a:solidFill>
               </a:rPr>
-              <a:t>Generate STL files with  geometry parameter files</a:t>
+              <a:t>Generate overview reports for each parameter sweep</a:t>
             </a:r>
           </a:p>
           <a:p>
             <a:pPr algn="ctr"/>
             <a:r>
-              <a:rPr lang="en-GB" sz="1200" dirty="0">
-                <a:solidFill>
-                  <a:srgbClr val="00B050"/>
-                </a:solidFill>
+              <a:rPr lang="en-GB" sz="1600" b="0" i="0" dirty="0" err="1">
+                <a:solidFill>
+                  <a:srgbClr val="FF0000"/>
+                </a:solidFill>
+                <a:effectLst/>
+                <a:latin typeface="Menlo"/>
               </a:rPr>
-              <a:t>Get a folder structure containing all the STL files for all values of the defined parameter sweeps</a:t>
-            </a:r>
-          </a:p>
-        </p:txBody>
-      </p:sp>
-      <p:sp>
-        <p:nvSpPr>
-          <p:cNvPr id="8" name="Rounded Rectangle 7"/>
-          <p:cNvSpPr/>
-          <p:nvPr/>
-        </p:nvSpPr>
-        <p:spPr>
-          <a:xfrm>
-            <a:off x="3936504" y="11657384"/>
-            <a:ext cx="2736304" cy="1008112"/>
-          </a:xfrm>
-          <a:prstGeom prst="roundRect">
-            <a:avLst/>
-          </a:prstGeom>
-          <a:noFill/>
-          <a:ln>
-            <a:solidFill>
-              <a:schemeClr val="tx1"/>
-            </a:solidFill>
-          </a:ln>
-        </p:spPr>
-        <p:style>
-          <a:lnRef idx="2">
-            <a:schemeClr val="accent1">
-              <a:shade val="50000"/>
-            </a:schemeClr>
-          </a:lnRef>
-          <a:fillRef idx="1">
-            <a:schemeClr val="accent1"/>
-          </a:fillRef>
-          <a:effectRef idx="0">
-            <a:schemeClr val="accent1"/>
-          </a:effectRef>
-          <a:fontRef idx="minor">
-            <a:schemeClr val="lt1"/>
-          </a:fontRef>
-        </p:style>
-        <p:txBody>
-          <a:bodyPr lIns="128016" tIns="64008" rIns="128016" bIns="64008" spcCol="0" rtlCol="0" anchor="ctr"/>
-          <a:lstStyle/>
-          <a:p>
-            <a:pPr algn="ctr"/>
-            <a:r>
-              <a:rPr lang="en-GB" sz="1600" dirty="0">
-                <a:solidFill>
-                  <a:schemeClr val="tx1"/>
-                </a:solidFill>
+              <a:t>Blend_reports</a:t>
+            </a:r>
+            <a:r>
+              <a:rPr lang="en-GB" sz="1600" b="0" i="0" dirty="0">
+                <a:solidFill>
+                  <a:srgbClr val="FF0000"/>
+                </a:solidFill>
+                <a:effectLst/>
+                <a:latin typeface="Menlo"/>
               </a:rPr>
-              <a:t>Generate overview reports for each parameter sweep</a:t>
-            </a:r>
-          </a:p>
-          <a:p>
-            <a:pPr algn="ctr"/>
-            <a:r>
-              <a:rPr lang="en-GB" sz="1600" dirty="0" err="1">
-                <a:solidFill>
-                  <a:srgbClr val="FF0000"/>
-                </a:solidFill>
-              </a:rPr>
-              <a:t>Blend_reports.m</a:t>
-            </a:r>
-            <a:endParaRPr lang="en-GB" sz="1600" dirty="0">
-              <a:solidFill>
-                <a:srgbClr val="FF0000"/>
-              </a:solidFill>
-            </a:endParaRPr>
+              <a:t>({model})</a:t>
+            </a:r>
           </a:p>
         </p:txBody>
       </p:sp>
@@ -3414,10 +3316,10 @@
         </p:nvGrpSpPr>
         <p:grpSpPr>
           <a:xfrm>
-            <a:off x="5189542" y="7839556"/>
-            <a:ext cx="2995434" cy="1873612"/>
-            <a:chOff x="5160640" y="8110775"/>
-            <a:chExt cx="2995434" cy="1873612"/>
+            <a:off x="2037562" y="5134125"/>
+            <a:ext cx="6101345" cy="1794441"/>
+            <a:chOff x="5160640" y="7955071"/>
+            <a:chExt cx="2995434" cy="1794441"/>
           </a:xfrm>
         </p:grpSpPr>
         <p:sp>
@@ -3428,8 +3330,8 @@
           </p:nvSpPr>
           <p:spPr>
             <a:xfrm>
-              <a:off x="5160640" y="8110775"/>
-              <a:ext cx="2995434" cy="1873612"/>
+              <a:off x="5160640" y="7955071"/>
+              <a:ext cx="2995434" cy="1794441"/>
             </a:xfrm>
             <a:prstGeom prst="roundRect">
               <a:avLst/>
@@ -3529,22 +3431,6 @@
             </a:p>
             <a:p>
               <a:pPr algn="ctr"/>
-              <a:r>
-                <a:rPr lang="en-GB" sz="1600" dirty="0" err="1">
-                  <a:solidFill>
-                    <a:srgbClr val="FF0000"/>
-                  </a:solidFill>
-                </a:rPr>
-                <a:t>run_models.m</a:t>
-              </a:r>
-              <a:endParaRPr lang="en-GB" sz="1600" dirty="0">
-                <a:solidFill>
-                  <a:srgbClr val="FF0000"/>
-                </a:solidFill>
-              </a:endParaRPr>
-            </a:p>
-            <a:p>
-              <a:pPr algn="ctr"/>
               <a:endParaRPr lang="en-GB" dirty="0"/>
             </a:p>
           </p:txBody>
@@ -3557,8 +3443,8 @@
           </p:nvSpPr>
           <p:spPr>
             <a:xfrm>
-              <a:off x="5347762" y="8871261"/>
-              <a:ext cx="2495077" cy="769899"/>
+              <a:off x="5304656" y="8871262"/>
+              <a:ext cx="2754855" cy="712582"/>
             </a:xfrm>
             <a:prstGeom prst="roundRect">
               <a:avLst/>
@@ -3597,7 +3483,7 @@
                     <a:schemeClr val="tx1"/>
                   </a:solidFill>
                 </a:rPr>
-                <a:t>Post process models</a:t>
+                <a:t>postprocess</a:t>
               </a:r>
             </a:p>
             <a:p>
@@ -3624,8 +3510,8 @@
           </p:nvSpPr>
           <p:spPr>
             <a:xfrm>
-              <a:off x="5304656" y="8227989"/>
-              <a:ext cx="2601239" cy="554610"/>
+              <a:off x="5304656" y="8042560"/>
+              <a:ext cx="2754855" cy="740039"/>
             </a:xfrm>
             <a:prstGeom prst="roundRect">
               <a:avLst/>
@@ -3664,7 +3550,7 @@
                     <a:schemeClr val="tx1"/>
                   </a:solidFill>
                 </a:rPr>
-                <a:t>Run models</a:t>
+                <a:t>simulate</a:t>
               </a:r>
             </a:p>
             <a:p>
@@ -3686,279 +3572,48 @@
       </p:grpSp>
       <p:sp>
         <p:nvSpPr>
-          <p:cNvPr id="12" name="Rounded Rectangle 11"/>
-          <p:cNvSpPr/>
+          <p:cNvPr id="16" name="TextBox 15">
+            <a:extLst>
+              <a:ext uri="{FF2B5EF4-FFF2-40B4-BE49-F238E27FC236}">
+                <a16:creationId xmlns:a16="http://schemas.microsoft.com/office/drawing/2014/main" id="{3D080C80-1B36-4D4A-9982-4A3182378F6D}"/>
+              </a:ext>
+            </a:extLst>
+          </p:cNvPr>
+          <p:cNvSpPr txBox="1"/>
           <p:nvPr/>
         </p:nvSpPr>
         <p:spPr>
           <a:xfrm>
-            <a:off x="5304656" y="7265802"/>
-            <a:ext cx="2655197" cy="485092"/>
+            <a:off x="800141" y="5438647"/>
+            <a:ext cx="1292158" cy="830997"/>
           </a:xfrm>
-          <a:prstGeom prst="roundRect">
+          <a:prstGeom prst="rect">
             <a:avLst/>
           </a:prstGeom>
           <a:noFill/>
-          <a:ln>
-            <a:solidFill>
-              <a:schemeClr val="tx1"/>
-            </a:solidFill>
-          </a:ln>
         </p:spPr>
-        <p:style>
-          <a:lnRef idx="2">
-            <a:schemeClr val="accent1">
-              <a:shade val="50000"/>
-            </a:schemeClr>
-          </a:lnRef>
-          <a:fillRef idx="1">
-            <a:schemeClr val="accent1"/>
-          </a:fillRef>
-          <a:effectRef idx="0">
-            <a:schemeClr val="accent1"/>
-          </a:effectRef>
-          <a:fontRef idx="minor">
-            <a:schemeClr val="lt1"/>
-          </a:fontRef>
-        </p:style>
-        <p:txBody>
-          <a:bodyPr lIns="128016" tIns="64008" rIns="128016" bIns="64008" spcCol="0" rtlCol="0" anchor="ctr"/>
+        <p:txBody>
+          <a:bodyPr wrap="square" rtlCol="0">
+            <a:spAutoFit/>
+          </a:bodyPr>
           <a:lstStyle/>
           <a:p>
-            <a:pPr algn="ctr"/>
-            <a:r>
-              <a:rPr lang="en-GB" sz="1600" dirty="0">
-                <a:solidFill>
-                  <a:schemeClr val="tx1"/>
-                </a:solidFill>
-              </a:rPr>
-              <a:t>Make GdfidL input files</a:t>
-            </a:r>
-          </a:p>
-        </p:txBody>
-      </p:sp>
-      <p:sp>
-        <p:nvSpPr>
-          <p:cNvPr id="17" name="Rounded Rectangle 16"/>
-          <p:cNvSpPr/>
-          <p:nvPr/>
-        </p:nvSpPr>
-        <p:spPr>
-          <a:xfrm>
-            <a:off x="4152528" y="181360"/>
-            <a:ext cx="5328592" cy="888808"/>
-          </a:xfrm>
-          <a:prstGeom prst="roundRect">
-            <a:avLst/>
-          </a:prstGeom>
-          <a:noFill/>
-          <a:ln>
-            <a:solidFill>
-              <a:schemeClr val="tx1"/>
-            </a:solidFill>
-          </a:ln>
-        </p:spPr>
-        <p:style>
-          <a:lnRef idx="2">
-            <a:schemeClr val="accent1">
-              <a:shade val="50000"/>
-            </a:schemeClr>
-          </a:lnRef>
-          <a:fillRef idx="1">
-            <a:schemeClr val="accent1"/>
-          </a:fillRef>
-          <a:effectRef idx="0">
-            <a:schemeClr val="accent1"/>
-          </a:effectRef>
-          <a:fontRef idx="minor">
-            <a:schemeClr val="lt1"/>
-          </a:fontRef>
-        </p:style>
-        <p:txBody>
-          <a:bodyPr lIns="128016" tIns="64008" rIns="128016" bIns="64008" spcCol="0" rtlCol="0" anchor="ctr"/>
-          <a:lstStyle/>
-          <a:p>
-            <a:pPr marL="285750" indent="-285750">
-              <a:buFont typeface="Arial" panose="020B0604020202020204" pitchFamily="34" charset="0"/>
-              <a:buChar char="•"/>
-            </a:pPr>
-            <a:r>
-              <a:rPr lang="en-GB" sz="1600" dirty="0">
-                <a:solidFill>
-                  <a:schemeClr val="tx1"/>
-                </a:solidFill>
-              </a:rPr>
-              <a:t>Write geometry description using </a:t>
-            </a:r>
-            <a:r>
-              <a:rPr lang="en-GB" sz="1600" dirty="0" err="1">
-                <a:solidFill>
-                  <a:schemeClr val="tx1"/>
-                </a:solidFill>
-              </a:rPr>
-              <a:t>FreeCAD</a:t>
-            </a:r>
-            <a:r>
-              <a:rPr lang="en-GB" sz="1600" dirty="0">
-                <a:solidFill>
-                  <a:schemeClr val="tx1"/>
-                </a:solidFill>
-              </a:rPr>
-              <a:t> </a:t>
-            </a:r>
-            <a:r>
-              <a:rPr lang="en-GB" sz="1600" dirty="0" err="1">
-                <a:solidFill>
-                  <a:schemeClr val="tx1"/>
-                </a:solidFill>
-              </a:rPr>
-              <a:t>primatives</a:t>
-            </a:r>
-            <a:endParaRPr lang="en-GB" sz="1600" dirty="0">
-              <a:solidFill>
-                <a:schemeClr val="tx1"/>
-              </a:solidFill>
-            </a:endParaRPr>
-          </a:p>
-          <a:p>
-            <a:pPr marL="285750" indent="-285750">
-              <a:buFont typeface="Arial" panose="020B0604020202020204" pitchFamily="34" charset="0"/>
-              <a:buChar char="•"/>
-            </a:pPr>
-            <a:r>
-              <a:rPr lang="en-GB" sz="1600" dirty="0">
-                <a:solidFill>
-                  <a:schemeClr val="tx1"/>
-                </a:solidFill>
-              </a:rPr>
-              <a:t>Specify geometric parameter sweeps</a:t>
-            </a:r>
-          </a:p>
-          <a:p>
-            <a:pPr algn="ctr"/>
-            <a:r>
-              <a:rPr lang="en-GB" sz="1700" dirty="0">
-                <a:solidFill>
-                  <a:srgbClr val="00B0F0"/>
-                </a:solidFill>
-              </a:rPr>
-              <a:t>&lt;</a:t>
-            </a:r>
-            <a:r>
-              <a:rPr lang="en-GB" sz="1700" dirty="0" err="1">
-                <a:solidFill>
-                  <a:srgbClr val="00B0F0"/>
-                </a:solidFill>
-              </a:rPr>
-              <a:t>model_name</a:t>
-            </a:r>
-            <a:r>
-              <a:rPr lang="en-GB" sz="1700" dirty="0">
-                <a:solidFill>
-                  <a:srgbClr val="00B0F0"/>
-                </a:solidFill>
-              </a:rPr>
-              <a:t>&gt;.</a:t>
-            </a:r>
-            <a:r>
-              <a:rPr lang="en-GB" sz="1700" dirty="0" err="1">
-                <a:solidFill>
-                  <a:srgbClr val="00B0F0"/>
-                </a:solidFill>
-              </a:rPr>
-              <a:t>py</a:t>
-            </a:r>
-            <a:endParaRPr lang="en-GB" sz="1700" dirty="0">
-              <a:solidFill>
-                <a:srgbClr val="00B0F0"/>
-              </a:solidFill>
-            </a:endParaRPr>
-          </a:p>
-        </p:txBody>
-      </p:sp>
-      <p:sp>
-        <p:nvSpPr>
-          <p:cNvPr id="21" name="Rounded Rectangle 20"/>
-          <p:cNvSpPr/>
-          <p:nvPr/>
-        </p:nvSpPr>
-        <p:spPr>
-          <a:xfrm>
-            <a:off x="5581424" y="2684680"/>
-            <a:ext cx="2502059" cy="921357"/>
-          </a:xfrm>
-          <a:prstGeom prst="roundRect">
-            <a:avLst/>
-          </a:prstGeom>
-          <a:noFill/>
-          <a:ln>
-            <a:solidFill>
-              <a:schemeClr val="tx1"/>
-            </a:solidFill>
-          </a:ln>
-        </p:spPr>
-        <p:style>
-          <a:lnRef idx="2">
-            <a:schemeClr val="accent1">
-              <a:shade val="50000"/>
-            </a:schemeClr>
-          </a:lnRef>
-          <a:fillRef idx="1">
-            <a:schemeClr val="accent1"/>
-          </a:fillRef>
-          <a:effectRef idx="0">
-            <a:schemeClr val="accent1"/>
-          </a:effectRef>
-          <a:fontRef idx="minor">
-            <a:schemeClr val="lt1"/>
-          </a:fontRef>
-        </p:style>
-        <p:txBody>
-          <a:bodyPr lIns="128016" tIns="64008" rIns="128016" bIns="64008" spcCol="0" rtlCol="0" anchor="ctr"/>
-          <a:lstStyle/>
-          <a:p>
-            <a:pPr algn="ctr"/>
-            <a:endParaRPr lang="en-GB" dirty="0">
-              <a:solidFill>
-                <a:schemeClr val="tx1"/>
-              </a:solidFill>
-            </a:endParaRPr>
-          </a:p>
-          <a:p>
-            <a:pPr algn="ctr"/>
-            <a:r>
-              <a:rPr lang="en-GB" sz="1600" dirty="0">
-                <a:solidFill>
-                  <a:schemeClr val="tx1"/>
-                </a:solidFill>
-              </a:rPr>
-              <a:t>Specify the mesh definitions</a:t>
-            </a:r>
-          </a:p>
-          <a:p>
-            <a:pPr algn="ctr"/>
-            <a:r>
-              <a:rPr lang="en-GB" sz="1700" dirty="0">
-                <a:solidFill>
-                  <a:srgbClr val="00B0F0"/>
-                </a:solidFill>
-              </a:rPr>
-              <a:t>Mesh_definition.txt</a:t>
-            </a:r>
-          </a:p>
-          <a:p>
-            <a:pPr algn="ctr"/>
-            <a:endParaRPr lang="en-GB" dirty="0">
-              <a:solidFill>
-                <a:schemeClr val="tx1"/>
-              </a:solidFill>
-            </a:endParaRPr>
+            <a:r>
+              <a:rPr lang="en-GB" sz="1600" dirty="0"/>
+              <a:t>On the modelling machine</a:t>
+            </a:r>
           </a:p>
         </p:txBody>
       </p:sp>
       <p:cxnSp>
         <p:nvCxnSpPr>
-          <p:cNvPr id="25" name="Straight Connector 24"/>
+          <p:cNvPr id="39" name="Straight Connector 38">
+            <a:extLst>
+              <a:ext uri="{FF2B5EF4-FFF2-40B4-BE49-F238E27FC236}">
+                <a16:creationId xmlns:a16="http://schemas.microsoft.com/office/drawing/2014/main" id="{34A25220-F8CF-4BBC-A67F-C028A5C1FA8D}"/>
+              </a:ext>
+            </a:extLst>
+          </p:cNvPr>
           <p:cNvCxnSpPr>
             <a:cxnSpLocks/>
           </p:cNvCxnSpPr>
@@ -3966,482 +3621,8 @@
         </p:nvCxnSpPr>
         <p:spPr>
           <a:xfrm>
-            <a:off x="2612963" y="2390132"/>
-            <a:ext cx="2187637" cy="4010668"/>
-          </a:xfrm>
-          <a:prstGeom prst="line">
-            <a:avLst/>
-          </a:prstGeom>
-          <a:ln w="25400">
-            <a:prstDash val="dash"/>
-          </a:ln>
-        </p:spPr>
-        <p:style>
-          <a:lnRef idx="1">
-            <a:schemeClr val="accent1"/>
-          </a:lnRef>
-          <a:fillRef idx="0">
-            <a:schemeClr val="accent1"/>
-          </a:fillRef>
-          <a:effectRef idx="0">
-            <a:schemeClr val="accent1"/>
-          </a:effectRef>
-          <a:fontRef idx="minor">
-            <a:schemeClr val="tx1"/>
-          </a:fontRef>
-        </p:style>
-      </p:cxnSp>
-      <p:sp>
-        <p:nvSpPr>
-          <p:cNvPr id="32" name="Rounded Rectangle 31"/>
-          <p:cNvSpPr/>
-          <p:nvPr/>
-        </p:nvSpPr>
-        <p:spPr>
-          <a:xfrm>
-            <a:off x="115499" y="5464696"/>
-            <a:ext cx="3728521" cy="1262393"/>
-          </a:xfrm>
-          <a:prstGeom prst="roundRect">
-            <a:avLst/>
-          </a:prstGeom>
-          <a:noFill/>
-          <a:ln>
-            <a:solidFill>
-              <a:schemeClr val="tx1"/>
-            </a:solidFill>
-          </a:ln>
-        </p:spPr>
-        <p:style>
-          <a:lnRef idx="2">
-            <a:schemeClr val="accent1">
-              <a:shade val="50000"/>
-            </a:schemeClr>
-          </a:lnRef>
-          <a:fillRef idx="1">
-            <a:schemeClr val="accent1"/>
-          </a:fillRef>
-          <a:effectRef idx="0">
-            <a:schemeClr val="accent1"/>
-          </a:effectRef>
-          <a:fontRef idx="minor">
-            <a:schemeClr val="lt1"/>
-          </a:fontRef>
-        </p:style>
-        <p:txBody>
-          <a:bodyPr lIns="128016" tIns="64008" rIns="128016" bIns="64008" spcCol="0" rtlCol="0" anchor="ctr"/>
-          <a:lstStyle/>
-          <a:p>
-            <a:endParaRPr lang="en-GB" dirty="0">
-              <a:solidFill>
-                <a:schemeClr val="tx1"/>
-              </a:solidFill>
-            </a:endParaRPr>
-          </a:p>
-          <a:p>
-            <a:pPr marL="285750" indent="-285750">
-              <a:buFont typeface="Arial" panose="020B0604020202020204" pitchFamily="34" charset="0"/>
-              <a:buChar char="•"/>
-            </a:pPr>
-            <a:r>
-              <a:rPr lang="en-GB" sz="1600" dirty="0">
-                <a:solidFill>
-                  <a:schemeClr val="tx1"/>
-                </a:solidFill>
-              </a:rPr>
-              <a:t>Define the material of parts</a:t>
-            </a:r>
-          </a:p>
-          <a:p>
-            <a:pPr marL="285750" indent="-285750">
-              <a:buFont typeface="Arial" panose="020B0604020202020204" pitchFamily="34" charset="0"/>
-              <a:buChar char="•"/>
-            </a:pPr>
-            <a:r>
-              <a:rPr lang="en-GB" sz="1600" dirty="0">
-                <a:solidFill>
-                  <a:schemeClr val="tx1"/>
-                </a:solidFill>
-              </a:rPr>
-              <a:t>Specify geometric parameter sweeps</a:t>
-            </a:r>
-          </a:p>
-          <a:p>
-            <a:pPr marL="285750" indent="-285750">
-              <a:buFont typeface="Arial" panose="020B0604020202020204" pitchFamily="34" charset="0"/>
-              <a:buChar char="•"/>
-            </a:pPr>
-            <a:r>
-              <a:rPr lang="en-GB" sz="1600" dirty="0">
-                <a:solidFill>
-                  <a:schemeClr val="tx1"/>
-                </a:solidFill>
-              </a:rPr>
-              <a:t>Specify material parameter sweeps</a:t>
-            </a:r>
-          </a:p>
-          <a:p>
-            <a:pPr marL="285750" indent="-285750">
-              <a:buFont typeface="Arial" panose="020B0604020202020204" pitchFamily="34" charset="0"/>
-              <a:buChar char="•"/>
-            </a:pPr>
-            <a:r>
-              <a:rPr lang="en-GB" sz="1600" dirty="0">
-                <a:solidFill>
-                  <a:schemeClr val="tx1"/>
-                </a:solidFill>
-              </a:rPr>
-              <a:t>Specify meshing parameter sweeps</a:t>
-            </a:r>
-          </a:p>
-          <a:p>
-            <a:pPr algn="ctr"/>
-            <a:r>
-              <a:rPr lang="en-GB" sz="1700" dirty="0">
-                <a:solidFill>
-                  <a:srgbClr val="FF0000"/>
-                </a:solidFill>
-              </a:rPr>
-              <a:t>&lt;model name&gt;.m</a:t>
-            </a:r>
-            <a:endParaRPr lang="en-GB" sz="1700" dirty="0">
-              <a:solidFill>
-                <a:srgbClr val="00B0F0"/>
-              </a:solidFill>
-            </a:endParaRPr>
-          </a:p>
-          <a:p>
-            <a:endParaRPr lang="en-GB" dirty="0">
-              <a:solidFill>
-                <a:schemeClr val="tx1"/>
-              </a:solidFill>
-            </a:endParaRPr>
-          </a:p>
-        </p:txBody>
-      </p:sp>
-      <p:sp>
-        <p:nvSpPr>
-          <p:cNvPr id="36" name="TextBox 35"/>
-          <p:cNvSpPr txBox="1"/>
-          <p:nvPr/>
-        </p:nvSpPr>
-        <p:spPr>
-          <a:xfrm rot="16200000">
-            <a:off x="7828209" y="8308386"/>
-            <a:ext cx="1508592" cy="861774"/>
-          </a:xfrm>
-          <a:prstGeom prst="rect">
-            <a:avLst/>
-          </a:prstGeom>
-          <a:noFill/>
-        </p:spPr>
-        <p:txBody>
-          <a:bodyPr wrap="square" rtlCol="0">
-            <a:spAutoFit/>
-          </a:bodyPr>
-          <a:lstStyle/>
-          <a:p>
-            <a:r>
-              <a:rPr lang="en-GB" dirty="0"/>
-              <a:t>For each input file</a:t>
-            </a:r>
-          </a:p>
-        </p:txBody>
-      </p:sp>
-      <p:sp>
-        <p:nvSpPr>
-          <p:cNvPr id="37" name="Right Arrow 36"/>
-          <p:cNvSpPr/>
-          <p:nvPr/>
-        </p:nvSpPr>
-        <p:spPr>
-          <a:xfrm rot="1745682">
-            <a:off x="3900521" y="6348601"/>
-            <a:ext cx="1147916" cy="685620"/>
-          </a:xfrm>
-          <a:prstGeom prst="rightArrow">
-            <a:avLst/>
-          </a:prstGeom>
-          <a:gradFill flip="none" rotWithShape="1">
-            <a:gsLst>
-              <a:gs pos="0">
-                <a:schemeClr val="accent1">
-                  <a:tint val="66000"/>
-                  <a:satMod val="160000"/>
-                </a:schemeClr>
-              </a:gs>
-              <a:gs pos="50000">
-                <a:schemeClr val="accent1">
-                  <a:tint val="44500"/>
-                  <a:satMod val="160000"/>
-                </a:schemeClr>
-              </a:gs>
-              <a:gs pos="100000">
-                <a:schemeClr val="accent1">
-                  <a:tint val="23500"/>
-                  <a:satMod val="160000"/>
-                </a:schemeClr>
-              </a:gs>
-            </a:gsLst>
-            <a:lin ang="13500000" scaled="1"/>
-            <a:tileRect/>
-          </a:gradFill>
-          <a:ln>
-            <a:noFill/>
-          </a:ln>
-        </p:spPr>
-        <p:style>
-          <a:lnRef idx="2">
-            <a:schemeClr val="accent1">
-              <a:shade val="50000"/>
-            </a:schemeClr>
-          </a:lnRef>
-          <a:fillRef idx="1">
-            <a:schemeClr val="accent1"/>
-          </a:fillRef>
-          <a:effectRef idx="0">
-            <a:schemeClr val="accent1"/>
-          </a:effectRef>
-          <a:fontRef idx="minor">
-            <a:schemeClr val="lt1"/>
-          </a:fontRef>
-        </p:style>
-        <p:txBody>
-          <a:bodyPr rtlCol="0" anchor="ctr"/>
-          <a:lstStyle/>
-          <a:p>
-            <a:pPr algn="ctr"/>
-            <a:endParaRPr lang="en-GB"/>
-          </a:p>
-        </p:txBody>
-      </p:sp>
-      <p:sp>
-        <p:nvSpPr>
-          <p:cNvPr id="38" name="Right Arrow 37"/>
-          <p:cNvSpPr/>
-          <p:nvPr/>
-        </p:nvSpPr>
-        <p:spPr>
-          <a:xfrm rot="6298412">
-            <a:off x="6366654" y="6358437"/>
-            <a:ext cx="810411" cy="685620"/>
-          </a:xfrm>
-          <a:prstGeom prst="rightArrow">
-            <a:avLst>
-              <a:gd name="adj1" fmla="val 51844"/>
-              <a:gd name="adj2" fmla="val 50000"/>
-            </a:avLst>
-          </a:prstGeom>
-        </p:spPr>
-        <p:style>
-          <a:lnRef idx="2">
-            <a:schemeClr val="accent1">
-              <a:shade val="50000"/>
-            </a:schemeClr>
-          </a:lnRef>
-          <a:fillRef idx="1">
-            <a:schemeClr val="accent1"/>
-          </a:fillRef>
-          <a:effectRef idx="0">
-            <a:schemeClr val="accent1"/>
-          </a:effectRef>
-          <a:fontRef idx="minor">
-            <a:schemeClr val="lt1"/>
-          </a:fontRef>
-        </p:style>
-        <p:txBody>
-          <a:bodyPr rtlCol="0" anchor="ctr"/>
-          <a:lstStyle/>
-          <a:p>
-            <a:pPr algn="ctr"/>
-            <a:endParaRPr lang="en-GB"/>
-          </a:p>
-        </p:txBody>
-      </p:sp>
-      <p:sp>
-        <p:nvSpPr>
-          <p:cNvPr id="26" name="Rounded Rectangle 25"/>
-          <p:cNvSpPr/>
-          <p:nvPr/>
-        </p:nvSpPr>
-        <p:spPr>
-          <a:xfrm>
-            <a:off x="4656584" y="3853720"/>
-            <a:ext cx="4800601" cy="2330121"/>
-          </a:xfrm>
-          <a:prstGeom prst="roundRect">
-            <a:avLst/>
-          </a:prstGeom>
-          <a:noFill/>
-          <a:ln>
-            <a:solidFill>
-              <a:schemeClr val="tx1"/>
-            </a:solidFill>
-          </a:ln>
-        </p:spPr>
-        <p:style>
-          <a:lnRef idx="2">
-            <a:schemeClr val="accent1">
-              <a:shade val="50000"/>
-            </a:schemeClr>
-          </a:lnRef>
-          <a:fillRef idx="1">
-            <a:schemeClr val="accent1"/>
-          </a:fillRef>
-          <a:effectRef idx="0">
-            <a:schemeClr val="accent1"/>
-          </a:effectRef>
-          <a:fontRef idx="minor">
-            <a:schemeClr val="lt1"/>
-          </a:fontRef>
-        </p:style>
-        <p:txBody>
-          <a:bodyPr lIns="128016" tIns="64008" rIns="128016" bIns="64008" spcCol="0" rtlCol="0" anchor="ctr"/>
-          <a:lstStyle/>
-          <a:p>
-            <a:pPr algn="ctr"/>
-            <a:endParaRPr lang="en-GB" dirty="0">
-              <a:solidFill>
-                <a:schemeClr val="tx1"/>
-              </a:solidFill>
-            </a:endParaRPr>
-          </a:p>
-          <a:p>
-            <a:pPr marL="285750" indent="-285750">
-              <a:buFont typeface="Arial" panose="020B0604020202020204" pitchFamily="34" charset="0"/>
-              <a:buChar char="•"/>
-            </a:pPr>
-            <a:r>
-              <a:rPr lang="en-GB" sz="1600" dirty="0">
-                <a:solidFill>
-                  <a:schemeClr val="tx1"/>
-                </a:solidFill>
-              </a:rPr>
-              <a:t>Define the material mapping of each STL part</a:t>
-            </a:r>
-          </a:p>
-          <a:p>
-            <a:pPr marL="285750" indent="-285750">
-              <a:buFont typeface="Arial" panose="020B0604020202020204" pitchFamily="34" charset="0"/>
-              <a:buChar char="•"/>
-            </a:pPr>
-            <a:r>
-              <a:rPr lang="en-GB" sz="1600" dirty="0">
-                <a:solidFill>
-                  <a:schemeClr val="tx1"/>
-                </a:solidFill>
-              </a:rPr>
-              <a:t>Define the order that the STL are loaded.</a:t>
-            </a:r>
-          </a:p>
-          <a:p>
-            <a:pPr marL="285750" indent="-285750">
-              <a:buFont typeface="Arial" panose="020B0604020202020204" pitchFamily="34" charset="0"/>
-              <a:buChar char="•"/>
-            </a:pPr>
-            <a:r>
-              <a:rPr lang="en-GB" sz="1600" dirty="0">
-                <a:solidFill>
-                  <a:schemeClr val="tx1"/>
-                </a:solidFill>
-              </a:rPr>
-              <a:t>Define the material of parts</a:t>
-            </a:r>
-          </a:p>
-          <a:p>
-            <a:pPr marL="285750" indent="-285750">
-              <a:buFont typeface="Arial" panose="020B0604020202020204" pitchFamily="34" charset="0"/>
-              <a:buChar char="•"/>
-            </a:pPr>
-            <a:r>
-              <a:rPr lang="en-GB" sz="1600" dirty="0">
-                <a:solidFill>
-                  <a:schemeClr val="tx1"/>
-                </a:solidFill>
-              </a:rPr>
-              <a:t>Specify the port definitions</a:t>
-            </a:r>
-          </a:p>
-          <a:p>
-            <a:pPr marL="285750" indent="-285750">
-              <a:buFont typeface="Arial" panose="020B0604020202020204" pitchFamily="34" charset="0"/>
-              <a:buChar char="•"/>
-            </a:pPr>
-            <a:r>
-              <a:rPr lang="en-GB" sz="1600" dirty="0">
-                <a:solidFill>
-                  <a:schemeClr val="tx1"/>
-                </a:solidFill>
-              </a:rPr>
-              <a:t>Specify the geometry fractions to run (1, ½, ¼).</a:t>
-            </a:r>
-          </a:p>
-          <a:p>
-            <a:pPr marL="285750" indent="-285750">
-              <a:buFont typeface="Arial" panose="020B0604020202020204" pitchFamily="34" charset="0"/>
-              <a:buChar char="•"/>
-            </a:pPr>
-            <a:r>
-              <a:rPr lang="en-GB" sz="1600" dirty="0">
-                <a:solidFill>
-                  <a:schemeClr val="tx1"/>
-                </a:solidFill>
-              </a:rPr>
-              <a:t>Specify material parameter sweeps</a:t>
-            </a:r>
-          </a:p>
-          <a:p>
-            <a:pPr marL="285750" indent="-285750">
-              <a:buFont typeface="Arial" panose="020B0604020202020204" pitchFamily="34" charset="0"/>
-              <a:buChar char="•"/>
-            </a:pPr>
-            <a:r>
-              <a:rPr lang="en-GB" sz="1600" dirty="0">
-                <a:solidFill>
-                  <a:schemeClr val="tx1"/>
-                </a:solidFill>
-              </a:rPr>
-              <a:t>Specify meshing parameter sweeps</a:t>
-            </a:r>
-          </a:p>
-          <a:p>
-            <a:pPr algn="ctr"/>
-            <a:r>
-              <a:rPr lang="en-GB" sz="1700" dirty="0">
-                <a:solidFill>
-                  <a:srgbClr val="FF0000"/>
-                </a:solidFill>
-              </a:rPr>
-              <a:t>&lt;model name&gt;.m</a:t>
-            </a:r>
-            <a:endParaRPr lang="en-GB" sz="1700" dirty="0">
-              <a:solidFill>
-                <a:srgbClr val="00B0F0"/>
-              </a:solidFill>
-            </a:endParaRPr>
-          </a:p>
-          <a:p>
-            <a:pPr algn="ctr"/>
-            <a:endParaRPr lang="en-GB" dirty="0">
-              <a:solidFill>
-                <a:schemeClr val="tx1"/>
-              </a:solidFill>
-            </a:endParaRPr>
-          </a:p>
-        </p:txBody>
-      </p:sp>
-      <p:cxnSp>
-        <p:nvCxnSpPr>
-          <p:cNvPr id="29" name="Straight Connector 28"/>
-          <p:cNvCxnSpPr>
-            <a:cxnSpLocks/>
-          </p:cNvCxnSpPr>
-          <p:nvPr/>
-        </p:nvCxnSpPr>
-        <p:spPr>
-          <a:xfrm>
-            <a:off x="2784376" y="2512368"/>
-            <a:ext cx="6984776" cy="0"/>
+            <a:off x="283431" y="7120880"/>
+            <a:ext cx="9152485" cy="0"/>
           </a:xfrm>
           <a:prstGeom prst="line">
             <a:avLst/>
@@ -4470,52 +3651,53 @@
           </a:fontRef>
         </p:style>
       </p:cxnSp>
-      <p:cxnSp>
-        <p:nvCxnSpPr>
-          <p:cNvPr id="27" name="Straight Connector 26"/>
-          <p:cNvCxnSpPr>
-            <a:cxnSpLocks/>
-          </p:cNvCxnSpPr>
+      <p:sp>
+        <p:nvSpPr>
+          <p:cNvPr id="44" name="TextBox 43">
+            <a:extLst>
+              <a:ext uri="{FF2B5EF4-FFF2-40B4-BE49-F238E27FC236}">
+                <a16:creationId xmlns:a16="http://schemas.microsoft.com/office/drawing/2014/main" id="{D6534005-9B6A-4ED2-913A-7BB86113F87E}"/>
+              </a:ext>
+            </a:extLst>
+          </p:cNvPr>
+          <p:cNvSpPr txBox="1"/>
           <p:nvPr/>
-        </p:nvCxnSpPr>
+        </p:nvSpPr>
         <p:spPr>
           <a:xfrm>
-            <a:off x="3419493" y="3736504"/>
-            <a:ext cx="6502059" cy="0"/>
+            <a:off x="105645" y="7197542"/>
+            <a:ext cx="1278839" cy="3416320"/>
           </a:xfrm>
-          <a:prstGeom prst="line">
+          <a:prstGeom prst="rect">
             <a:avLst/>
           </a:prstGeom>
-          <a:ln w="25400">
-            <a:solidFill>
-              <a:schemeClr val="bg1">
-                <a:lumMod val="95000"/>
-              </a:schemeClr>
-            </a:solidFill>
-            <a:prstDash val="dash"/>
-          </a:ln>
+          <a:noFill/>
         </p:spPr>
-        <p:style>
-          <a:lnRef idx="1">
-            <a:schemeClr val="accent1"/>
-          </a:lnRef>
-          <a:fillRef idx="0">
-            <a:schemeClr val="accent1"/>
-          </a:fillRef>
-          <a:effectRef idx="0">
-            <a:schemeClr val="accent1"/>
-          </a:effectRef>
-          <a:fontRef idx="minor">
-            <a:schemeClr val="tx1"/>
-          </a:fontRef>
-        </p:style>
-      </p:cxnSp>
+        <p:txBody>
+          <a:bodyPr wrap="square" rtlCol="0">
+            <a:spAutoFit/>
+          </a:bodyPr>
+          <a:lstStyle/>
+          <a:p>
+            <a:r>
+              <a:rPr lang="en-GB" sz="1200" dirty="0"/>
+              <a:t>These can be run on a separate machine. This has the advantage that you can look at results of earlier simulations before the full set has completed. </a:t>
+            </a:r>
+          </a:p>
+          <a:p>
+            <a:r>
+              <a:rPr lang="en-GB" sz="1200" dirty="0"/>
+              <a:t>Also the modelling machine is only doing the EM simulation thus gets through the models faster.</a:t>
+            </a:r>
+          </a:p>
+        </p:txBody>
+      </p:sp>
       <p:grpSp>
         <p:nvGrpSpPr>
-          <p:cNvPr id="14" name="Group 13">
+          <p:cNvPr id="10" name="Group 9">
             <a:extLst>
               <a:ext uri="{FF2B5EF4-FFF2-40B4-BE49-F238E27FC236}">
-                <a16:creationId xmlns:a16="http://schemas.microsoft.com/office/drawing/2014/main" id="{C8C345A4-6CF6-4824-B3EA-EE2C15013D76}"/>
+                <a16:creationId xmlns:a16="http://schemas.microsoft.com/office/drawing/2014/main" id="{3B7D2500-ED76-1A19-1848-9DC68D6D217E}"/>
               </a:ext>
             </a:extLst>
           </p:cNvPr>
@@ -4524,164 +3706,22 @@
         </p:nvGrpSpPr>
         <p:grpSpPr>
           <a:xfrm>
-            <a:off x="5043875" y="9800657"/>
-            <a:ext cx="3285117" cy="1784719"/>
-            <a:chOff x="5015797" y="9736785"/>
-            <a:chExt cx="3285117" cy="1784719"/>
+            <a:off x="133226" y="1576264"/>
+            <a:ext cx="9302690" cy="2520280"/>
+            <a:chOff x="133226" y="1576264"/>
+            <a:chExt cx="9302690" cy="2520280"/>
           </a:xfrm>
         </p:grpSpPr>
         <p:sp>
           <p:nvSpPr>
-            <p:cNvPr id="30" name="Rounded Rectangle 22">
-              <a:extLst>
-                <a:ext uri="{FF2B5EF4-FFF2-40B4-BE49-F238E27FC236}">
-                  <a16:creationId xmlns:a16="http://schemas.microsoft.com/office/drawing/2014/main" id="{92328487-F7E1-4B5E-881F-D20950C6AADF}"/>
-                </a:ext>
-              </a:extLst>
-            </p:cNvPr>
+            <p:cNvPr id="26" name="Rounded Rectangle 25"/>
             <p:cNvSpPr/>
             <p:nvPr/>
           </p:nvSpPr>
           <p:spPr>
             <a:xfrm>
-              <a:off x="5015797" y="9736785"/>
-              <a:ext cx="3285117" cy="1784719"/>
-            </a:xfrm>
-            <a:prstGeom prst="roundRect">
-              <a:avLst/>
-            </a:prstGeom>
-            <a:solidFill>
-              <a:schemeClr val="accent6">
-                <a:lumMod val="60000"/>
-                <a:lumOff val="40000"/>
-              </a:schemeClr>
-            </a:solidFill>
-            <a:ln>
-              <a:noFill/>
-            </a:ln>
-          </p:spPr>
-          <p:style>
-            <a:lnRef idx="2">
-              <a:schemeClr val="accent1">
-                <a:shade val="50000"/>
-              </a:schemeClr>
-            </a:lnRef>
-            <a:fillRef idx="1">
-              <a:schemeClr val="accent1"/>
-            </a:fillRef>
-            <a:effectRef idx="0">
-              <a:schemeClr val="accent1"/>
-            </a:effectRef>
-            <a:fontRef idx="minor">
-              <a:schemeClr val="lt1"/>
-            </a:fontRef>
-          </p:style>
-          <p:txBody>
-            <a:bodyPr rtlCol="0" anchor="ctr"/>
-            <a:lstStyle/>
-            <a:p>
-              <a:pPr algn="ctr"/>
-              <a:r>
-                <a:rPr lang="en-GB" sz="1400" dirty="0">
-                  <a:solidFill>
-                    <a:schemeClr val="tx2">
-                      <a:lumMod val="60000"/>
-                      <a:lumOff val="40000"/>
-                    </a:schemeClr>
-                  </a:solidFill>
-                </a:rPr>
-                <a:t>Run on report folder data</a:t>
-              </a:r>
-            </a:p>
-            <a:p>
-              <a:pPr algn="ctr"/>
-              <a:endParaRPr lang="en-GB" sz="1400" dirty="0">
-                <a:solidFill>
-                  <a:schemeClr val="tx2">
-                    <a:lumMod val="60000"/>
-                    <a:lumOff val="40000"/>
-                  </a:schemeClr>
-                </a:solidFill>
-              </a:endParaRPr>
-            </a:p>
-            <a:p>
-              <a:pPr algn="ctr"/>
-              <a:endParaRPr lang="en-GB" sz="1400" dirty="0">
-                <a:solidFill>
-                  <a:schemeClr val="tx2">
-                    <a:lumMod val="60000"/>
-                    <a:lumOff val="40000"/>
-                  </a:schemeClr>
-                </a:solidFill>
-              </a:endParaRPr>
-            </a:p>
-            <a:p>
-              <a:pPr algn="ctr"/>
-              <a:endParaRPr lang="en-GB" sz="1400" dirty="0">
-                <a:solidFill>
-                  <a:schemeClr val="tx2">
-                    <a:lumMod val="60000"/>
-                    <a:lumOff val="40000"/>
-                  </a:schemeClr>
-                </a:solidFill>
-              </a:endParaRPr>
-            </a:p>
-            <a:p>
-              <a:pPr algn="ctr"/>
-              <a:endParaRPr lang="en-GB" sz="1400" dirty="0">
-                <a:solidFill>
-                  <a:schemeClr val="tx2">
-                    <a:lumMod val="60000"/>
-                    <a:lumOff val="40000"/>
-                  </a:schemeClr>
-                </a:solidFill>
-              </a:endParaRPr>
-            </a:p>
-            <a:p>
-              <a:pPr algn="ctr"/>
-              <a:endParaRPr lang="en-GB" sz="1400" dirty="0">
-                <a:solidFill>
-                  <a:schemeClr val="tx2">
-                    <a:lumMod val="60000"/>
-                    <a:lumOff val="40000"/>
-                  </a:schemeClr>
-                </a:solidFill>
-              </a:endParaRPr>
-            </a:p>
-            <a:p>
-              <a:pPr algn="ctr"/>
-              <a:endParaRPr lang="en-GB" sz="1400" dirty="0">
-                <a:solidFill>
-                  <a:schemeClr val="tx2">
-                    <a:lumMod val="60000"/>
-                    <a:lumOff val="40000"/>
-                  </a:schemeClr>
-                </a:solidFill>
-              </a:endParaRPr>
-            </a:p>
-            <a:p>
-              <a:pPr algn="ctr"/>
-              <a:endParaRPr lang="en-GB" sz="1400" dirty="0">
-                <a:solidFill>
-                  <a:schemeClr val="tx2">
-                    <a:lumMod val="60000"/>
-                    <a:lumOff val="40000"/>
-                  </a:schemeClr>
-                </a:solidFill>
-              </a:endParaRPr>
-            </a:p>
-          </p:txBody>
-        </p:sp>
-        <p:sp>
-          <p:nvSpPr>
-            <p:cNvPr id="7" name="Rounded Rectangle 6"/>
-            <p:cNvSpPr/>
-            <p:nvPr/>
-          </p:nvSpPr>
-          <p:spPr>
-            <a:xfrm>
-              <a:off x="5277100" y="10786085"/>
-              <a:ext cx="2762712" cy="583267"/>
+              <a:off x="133226" y="1576264"/>
+              <a:ext cx="9302690" cy="2192286"/>
             </a:xfrm>
             <a:prstGeom prst="roundRect">
               <a:avLst/>
@@ -4714,28 +3754,128 @@
             <a:lstStyle/>
             <a:p>
               <a:pPr algn="ctr"/>
+              <a:endParaRPr lang="en-GB" dirty="0">
+                <a:solidFill>
+                  <a:schemeClr val="tx1"/>
+                </a:solidFill>
+              </a:endParaRPr>
+            </a:p>
+            <a:p>
+              <a:pPr marL="285750" indent="-285750">
+                <a:buFont typeface="Arial" panose="020B0604020202020204" pitchFamily="34" charset="0"/>
+                <a:buChar char="•"/>
+              </a:pPr>
+              <a:endParaRPr lang="en-GB" sz="1600" dirty="0">
+                <a:solidFill>
+                  <a:schemeClr val="tx1"/>
+                </a:solidFill>
+              </a:endParaRPr>
+            </a:p>
+            <a:p>
+              <a:pPr marL="285750" indent="-285750">
+                <a:buFont typeface="Arial" panose="020B0604020202020204" pitchFamily="34" charset="0"/>
+                <a:buChar char="•"/>
+              </a:pPr>
               <a:r>
                 <a:rPr lang="en-GB" sz="1600" dirty="0">
                   <a:solidFill>
                     <a:schemeClr val="tx1"/>
                   </a:solidFill>
                 </a:rPr>
-                <a:t>Generate reports</a:t>
+                <a:t>Specify the mesh definitions</a:t>
+              </a:r>
+            </a:p>
+            <a:p>
+              <a:pPr marL="285750" indent="-285750">
+                <a:buFont typeface="Arial" panose="020B0604020202020204" pitchFamily="34" charset="0"/>
+                <a:buChar char="•"/>
+              </a:pPr>
+              <a:r>
+                <a:rPr lang="en-GB" sz="1600" dirty="0">
+                  <a:solidFill>
+                    <a:schemeClr val="tx1"/>
+                  </a:solidFill>
+                </a:rPr>
+                <a:t>Define the material mapping of each STL part</a:t>
+              </a:r>
+            </a:p>
+            <a:p>
+              <a:pPr marL="285750" indent="-285750">
+                <a:buFont typeface="Arial" panose="020B0604020202020204" pitchFamily="34" charset="0"/>
+                <a:buChar char="•"/>
+              </a:pPr>
+              <a:r>
+                <a:rPr lang="en-GB" sz="1600" dirty="0">
+                  <a:solidFill>
+                    <a:schemeClr val="tx1"/>
+                  </a:solidFill>
+                </a:rPr>
+                <a:t>Define the order that the STL are loaded.</a:t>
+              </a:r>
+            </a:p>
+            <a:p>
+              <a:pPr marL="285750" indent="-285750">
+                <a:buFont typeface="Arial" panose="020B0604020202020204" pitchFamily="34" charset="0"/>
+                <a:buChar char="•"/>
+              </a:pPr>
+              <a:r>
+                <a:rPr lang="en-GB" sz="1600" dirty="0">
+                  <a:solidFill>
+                    <a:schemeClr val="tx1"/>
+                  </a:solidFill>
+                </a:rPr>
+                <a:t>Define the base material of parts</a:t>
+              </a:r>
+            </a:p>
+            <a:p>
+              <a:pPr marL="285750" indent="-285750">
+                <a:buFont typeface="Arial" panose="020B0604020202020204" pitchFamily="34" charset="0"/>
+                <a:buChar char="•"/>
+              </a:pPr>
+              <a:r>
+                <a:rPr lang="en-GB" sz="1600" dirty="0">
+                  <a:solidFill>
+                    <a:schemeClr val="tx1"/>
+                  </a:solidFill>
+                </a:rPr>
+                <a:t>Specify the port definitions</a:t>
+              </a:r>
+            </a:p>
+            <a:p>
+              <a:pPr marL="285750" indent="-285750">
+                <a:buFont typeface="Arial" panose="020B0604020202020204" pitchFamily="34" charset="0"/>
+                <a:buChar char="•"/>
+              </a:pPr>
+              <a:r>
+                <a:rPr lang="en-GB" sz="1600" dirty="0">
+                  <a:solidFill>
+                    <a:schemeClr val="tx1"/>
+                  </a:solidFill>
+                </a:rPr>
+                <a:t>Specify the geometry fractions to run (1, ½, ¼).</a:t>
               </a:r>
             </a:p>
             <a:p>
               <a:pPr algn="ctr"/>
               <a:r>
-                <a:rPr lang="en-GB" sz="1600" dirty="0" err="1">
+                <a:rPr lang="en-GB" sz="1700" dirty="0">
                   <a:solidFill>
                     <a:srgbClr val="FF0000"/>
                   </a:solidFill>
                 </a:rPr>
-                <a:t>generate_report.m</a:t>
+                <a:t>&lt;model name&gt;.m</a:t>
               </a:r>
-              <a:endParaRPr lang="en-GB" sz="1600" dirty="0">
-                <a:solidFill>
-                  <a:srgbClr val="FF0000"/>
+              <a:endParaRPr lang="en-GB" sz="1700" dirty="0">
+                <a:solidFill>
+                  <a:srgbClr val="00B0F0"/>
+                </a:solidFill>
+              </a:endParaRPr>
+            </a:p>
+            <a:p>
+              <a:pPr algn="ctr"/>
+              <a:endParaRPr lang="en-GB" dirty="0">
+                <a:solidFill>
+                  <a:schemeClr val="tx1"/>
                 </a:solidFill>
               </a:endParaRPr>
             </a:p>
@@ -4743,86 +3883,138 @@
         </p:sp>
         <p:sp>
           <p:nvSpPr>
-            <p:cNvPr id="28" name="Rounded Rectangle 6">
+            <p:cNvPr id="2" name="TextBox 1">
               <a:extLst>
                 <a:ext uri="{FF2B5EF4-FFF2-40B4-BE49-F238E27FC236}">
-                  <a16:creationId xmlns:a16="http://schemas.microsoft.com/office/drawing/2014/main" id="{706EBA29-97C6-4F34-A22B-8D211DCABCCA}"/>
+                  <a16:creationId xmlns:a16="http://schemas.microsoft.com/office/drawing/2014/main" id="{A57D0101-04B3-E6FB-D168-AD4E944E5338}"/>
                 </a:ext>
               </a:extLst>
             </p:cNvPr>
-            <p:cNvSpPr/>
+            <p:cNvSpPr txBox="1"/>
             <p:nvPr/>
           </p:nvSpPr>
           <p:spPr>
             <a:xfrm>
-              <a:off x="5278248" y="10073208"/>
-              <a:ext cx="2762712" cy="583267"/>
+              <a:off x="4984880" y="1895942"/>
+              <a:ext cx="3920176" cy="2200602"/>
             </a:xfrm>
-            <a:prstGeom prst="roundRect">
+            <a:prstGeom prst="rect">
               <a:avLst/>
             </a:prstGeom>
             <a:noFill/>
-            <a:ln>
-              <a:solidFill>
-                <a:schemeClr val="tx1"/>
-              </a:solidFill>
-            </a:ln>
           </p:spPr>
-          <p:style>
-            <a:lnRef idx="2">
-              <a:schemeClr val="accent1">
-                <a:shade val="50000"/>
-              </a:schemeClr>
-            </a:lnRef>
-            <a:fillRef idx="1">
-              <a:schemeClr val="accent1"/>
-            </a:fillRef>
-            <a:effectRef idx="0">
-              <a:schemeClr val="accent1"/>
-            </a:effectRef>
-            <a:fontRef idx="minor">
-              <a:schemeClr val="lt1"/>
-            </a:fontRef>
-          </p:style>
           <p:txBody>
-            <a:bodyPr lIns="128016" tIns="64008" rIns="128016" bIns="64008" spcCol="0" rtlCol="0" anchor="ctr"/>
+            <a:bodyPr wrap="none" rtlCol="0">
+              <a:spAutoFit/>
+            </a:bodyPr>
             <a:lstStyle/>
             <a:p>
-              <a:pPr algn="ctr"/>
+              <a:pPr marL="285750" indent="-285750">
+                <a:buFont typeface="Arial" panose="020B0604020202020204" pitchFamily="34" charset="0"/>
+                <a:buChar char="•"/>
+              </a:pPr>
               <a:r>
                 <a:rPr lang="en-GB" sz="1600" dirty="0">
                   <a:solidFill>
                     <a:schemeClr val="tx1"/>
                   </a:solidFill>
                 </a:rPr>
-                <a:t>Analyse results</a:t>
+                <a:t>Define voltage monitors</a:t>
               </a:r>
             </a:p>
             <a:p>
-              <a:pPr algn="ctr"/>
+              <a:pPr marL="285750" indent="-285750">
+                <a:buFont typeface="Arial" panose="020B0604020202020204" pitchFamily="34" charset="0"/>
+                <a:buChar char="•"/>
+              </a:pPr>
               <a:r>
-                <a:rPr lang="en-GB" sz="1600" dirty="0" err="1">
+                <a:rPr lang="en-GB" sz="1600" dirty="0">
                   <a:solidFill>
-                    <a:srgbClr val="FF0000"/>
+                    <a:schemeClr val="tx1"/>
                   </a:solidFill>
                 </a:rPr>
-                <a:t>analyse_pp_data.m</a:t>
+                <a:t>Define field capture</a:t>
               </a:r>
+            </a:p>
+            <a:p>
+              <a:pPr marL="285750" indent="-285750">
+                <a:buFont typeface="Arial" panose="020B0604020202020204" pitchFamily="34" charset="0"/>
+                <a:buChar char="•"/>
+              </a:pPr>
+              <a:r>
+                <a:rPr lang="en-GB" sz="1600" dirty="0">
+                  <a:solidFill>
+                    <a:schemeClr val="tx1"/>
+                  </a:solidFill>
+                </a:rPr>
+                <a:t>Define the setup for each simulation type</a:t>
+              </a:r>
+            </a:p>
+            <a:p>
+              <a:pPr marL="285750" indent="-285750">
+                <a:buFont typeface="Arial" panose="020B0604020202020204" pitchFamily="34" charset="0"/>
+                <a:buChar char="•"/>
+              </a:pPr>
+              <a:r>
+                <a:rPr lang="en-GB" sz="1600" dirty="0">
+                  <a:solidFill>
+                    <a:schemeClr val="tx1"/>
+                  </a:solidFill>
+                </a:rPr>
+                <a:t>Specify material parameter sweeps</a:t>
+              </a:r>
+            </a:p>
+            <a:p>
+              <a:pPr marL="285750" indent="-285750">
+                <a:buFont typeface="Arial" panose="020B0604020202020204" pitchFamily="34" charset="0"/>
+                <a:buChar char="•"/>
+              </a:pPr>
+              <a:r>
+                <a:rPr lang="en-GB" sz="1600" dirty="0">
+                  <a:solidFill>
+                    <a:schemeClr val="tx1"/>
+                  </a:solidFill>
+                </a:rPr>
+                <a:t>Specify meshing parameter sweeps</a:t>
+              </a:r>
+            </a:p>
+            <a:p>
+              <a:pPr marL="285750" indent="-285750">
+                <a:buFont typeface="Arial" panose="020B0604020202020204" pitchFamily="34" charset="0"/>
+                <a:buChar char="•"/>
+              </a:pPr>
+              <a:r>
+                <a:rPr lang="en-GB" sz="1600" dirty="0">
+                  <a:solidFill>
+                    <a:schemeClr val="tx1"/>
+                  </a:solidFill>
+                </a:rPr>
+                <a:t>Specify beam position sweeps</a:t>
+              </a:r>
+            </a:p>
+            <a:p>
+              <a:pPr marL="285750" indent="-285750">
+                <a:buFont typeface="Arial" panose="020B0604020202020204" pitchFamily="34" charset="0"/>
+                <a:buChar char="•"/>
+              </a:pPr>
               <a:endParaRPr lang="en-GB" sz="1600" dirty="0">
                 <a:solidFill>
-                  <a:srgbClr val="FF0000"/>
+                  <a:schemeClr val="tx1"/>
                 </a:solidFill>
               </a:endParaRPr>
+            </a:p>
+            <a:p>
+              <a:endParaRPr lang="en-GB" dirty="0"/>
             </a:p>
           </p:txBody>
         </p:sp>
       </p:grpSp>
       <p:sp>
         <p:nvSpPr>
-          <p:cNvPr id="16" name="TextBox 15">
+          <p:cNvPr id="13" name="TextBox 12">
             <a:extLst>
               <a:ext uri="{FF2B5EF4-FFF2-40B4-BE49-F238E27FC236}">
-                <a16:creationId xmlns:a16="http://schemas.microsoft.com/office/drawing/2014/main" id="{3D080C80-1B36-4D4A-9982-4A3182378F6D}"/>
+                <a16:creationId xmlns:a16="http://schemas.microsoft.com/office/drawing/2014/main" id="{546D7E66-AB38-4562-3AB9-727D95F1EA2C}"/>
               </a:ext>
             </a:extLst>
           </p:cNvPr>
@@ -4831,8 +4023,8 @@
         </p:nvSpPr>
         <p:spPr>
           <a:xfrm>
-            <a:off x="4039166" y="8463215"/>
-            <a:ext cx="1292158" cy="830997"/>
+            <a:off x="521142" y="4148348"/>
+            <a:ext cx="8593378" cy="400110"/>
           </a:xfrm>
           <a:prstGeom prst="rect">
             <a:avLst/>
@@ -4840,24 +4032,88 @@
           <a:noFill/>
         </p:spPr>
         <p:txBody>
-          <a:bodyPr wrap="square" rtlCol="0">
+          <a:bodyPr wrap="none" rtlCol="0">
             <a:spAutoFit/>
           </a:bodyPr>
           <a:lstStyle/>
           <a:p>
             <a:r>
-              <a:rPr lang="en-GB" sz="1600" dirty="0"/>
-              <a:t>On the modelling machine</a:t>
-            </a:r>
-          </a:p>
-        </p:txBody>
-      </p:sp>
-      <p:sp>
-        <p:nvSpPr>
-          <p:cNvPr id="31" name="TextBox 30">
+              <a:rPr lang="en-GB" sz="2000" b="1" i="0" dirty="0" err="1">
+                <a:effectLst/>
+                <a:latin typeface="Menlo"/>
+              </a:rPr>
+              <a:t>current_simulation</a:t>
+            </a:r>
+            <a:r>
+              <a:rPr lang="en-GB" sz="2000" b="1" i="0" dirty="0">
+                <a:effectLst/>
+                <a:latin typeface="Menlo"/>
+              </a:rPr>
+              <a:t>({&lt;model name&gt;}, </a:t>
+            </a:r>
+            <a:r>
+              <a:rPr lang="en-GB" sz="2000" b="1" i="0" dirty="0">
+                <a:solidFill>
+                  <a:srgbClr val="A709F5"/>
+                </a:solidFill>
+                <a:effectLst/>
+                <a:latin typeface="Menlo"/>
+              </a:rPr>
+              <a:t>'stages’</a:t>
+            </a:r>
+            <a:r>
+              <a:rPr lang="en-GB" sz="2000" b="1" i="0" dirty="0">
+                <a:effectLst/>
+                <a:latin typeface="Menlo"/>
+              </a:rPr>
+              <a:t>, {&lt;stage&gt;}, </a:t>
+            </a:r>
+            <a:r>
+              <a:rPr lang="en-GB" sz="2000" b="1" i="0" dirty="0">
+                <a:solidFill>
+                  <a:srgbClr val="A709F5"/>
+                </a:solidFill>
+                <a:effectLst/>
+                <a:latin typeface="Menlo"/>
+              </a:rPr>
+              <a:t>'</a:t>
+            </a:r>
+            <a:r>
+              <a:rPr lang="en-GB" sz="2000" b="1" i="0" dirty="0" err="1">
+                <a:solidFill>
+                  <a:srgbClr val="A709F5"/>
+                </a:solidFill>
+                <a:effectLst/>
+                <a:latin typeface="Menlo"/>
+              </a:rPr>
+              <a:t>sim_types</a:t>
+            </a:r>
+            <a:r>
+              <a:rPr lang="en-GB" sz="2000" b="1" i="0" dirty="0">
+                <a:solidFill>
+                  <a:srgbClr val="A709F5"/>
+                </a:solidFill>
+                <a:effectLst/>
+                <a:latin typeface="Menlo"/>
+              </a:rPr>
+              <a:t>’</a:t>
+            </a:r>
+            <a:r>
+              <a:rPr lang="en-GB" sz="2000" b="1" i="0" dirty="0">
+                <a:effectLst/>
+                <a:latin typeface="Menlo"/>
+              </a:rPr>
+              <a:t>, {&lt;types&gt;})</a:t>
+            </a:r>
+          </a:p>
+        </p:txBody>
+      </p:sp>
+      <p:sp>
+        <p:nvSpPr>
+          <p:cNvPr id="19" name="TextBox 18">
             <a:extLst>
               <a:ext uri="{FF2B5EF4-FFF2-40B4-BE49-F238E27FC236}">
-                <a16:creationId xmlns:a16="http://schemas.microsoft.com/office/drawing/2014/main" id="{FCE9BB80-F41F-4801-8FA3-823E552F86D6}"/>
+                <a16:creationId xmlns:a16="http://schemas.microsoft.com/office/drawing/2014/main" id="{87F32E0C-A1CC-9830-AE1D-BF3413E06162}"/>
               </a:ext>
             </a:extLst>
           </p:cNvPr>
@@ -4866,8 +4122,8 @@
         </p:nvSpPr>
         <p:spPr>
           <a:xfrm>
-            <a:off x="4039166" y="10544800"/>
-            <a:ext cx="1292158" cy="338554"/>
+            <a:off x="3037455" y="7245732"/>
+            <a:ext cx="3894849" cy="523220"/>
           </a:xfrm>
           <a:prstGeom prst="rect">
             <a:avLst/>
@@ -4875,24 +4131,31 @@
           <a:noFill/>
         </p:spPr>
         <p:txBody>
-          <a:bodyPr wrap="square" rtlCol="0">
+          <a:bodyPr wrap="none" rtlCol="0">
             <a:spAutoFit/>
           </a:bodyPr>
           <a:lstStyle/>
           <a:p>
             <a:r>
-              <a:rPr lang="en-GB" sz="1600" dirty="0"/>
-              <a:t>Anywhere</a:t>
-            </a:r>
-          </a:p>
-        </p:txBody>
-      </p:sp>
-      <p:sp>
-        <p:nvSpPr>
-          <p:cNvPr id="33" name="TextBox 32">
+              <a:rPr lang="en-GB" sz="2800" dirty="0">
+                <a:solidFill>
+                  <a:schemeClr val="tx2">
+                    <a:lumMod val="60000"/>
+                    <a:lumOff val="40000"/>
+                  </a:schemeClr>
+                </a:solidFill>
+              </a:rPr>
+              <a:t>Run on report folder data</a:t>
+            </a:r>
+          </a:p>
+        </p:txBody>
+      </p:sp>
+      <p:sp>
+        <p:nvSpPr>
+          <p:cNvPr id="24" name="TextBox 23">
             <a:extLst>
               <a:ext uri="{FF2B5EF4-FFF2-40B4-BE49-F238E27FC236}">
-                <a16:creationId xmlns:a16="http://schemas.microsoft.com/office/drawing/2014/main" id="{68B2A829-A507-4BC0-8DD1-A113950487A6}"/>
+                <a16:creationId xmlns:a16="http://schemas.microsoft.com/office/drawing/2014/main" id="{3F81C923-1D7F-C533-8105-983E25C41B3E}"/>
               </a:ext>
             </a:extLst>
           </p:cNvPr>
@@ -4901,8 +4164,8 @@
         </p:nvSpPr>
         <p:spPr>
           <a:xfrm rot="16200000">
-            <a:off x="8005583" y="10232323"/>
-            <a:ext cx="1508592" cy="861774"/>
+            <a:off x="8042099" y="5811789"/>
+            <a:ext cx="897810" cy="477054"/>
           </a:xfrm>
           <a:prstGeom prst="rect">
             <a:avLst/>
@@ -4910,66 +4173,1169 @@
           <a:noFill/>
         </p:spPr>
         <p:txBody>
-          <a:bodyPr wrap="square" rtlCol="0">
+          <a:bodyPr wrap="none" rtlCol="0">
             <a:spAutoFit/>
           </a:bodyPr>
           <a:lstStyle/>
           <a:p>
-            <a:pPr algn="ctr"/>
             <a:r>
               <a:rPr lang="en-GB" dirty="0"/>
-              <a:t>For each model</a:t>
-            </a:r>
-          </a:p>
-        </p:txBody>
-      </p:sp>
-      <p:cxnSp>
-        <p:nvCxnSpPr>
-          <p:cNvPr id="34" name="Straight Connector 33">
+              <a:t>Stage</a:t>
+            </a:r>
+          </a:p>
+        </p:txBody>
+      </p:sp>
+      <p:grpSp>
+        <p:nvGrpSpPr>
+          <p:cNvPr id="64" name="Group 63">
             <a:extLst>
               <a:ext uri="{FF2B5EF4-FFF2-40B4-BE49-F238E27FC236}">
-                <a16:creationId xmlns:a16="http://schemas.microsoft.com/office/drawing/2014/main" id="{8C2997EB-2E1F-45A6-9ADD-B15CC3FC17EC}"/>
+                <a16:creationId xmlns:a16="http://schemas.microsoft.com/office/drawing/2014/main" id="{92001616-4B9E-46B5-A40B-097FAD3FD2AA}"/>
               </a:ext>
             </a:extLst>
           </p:cNvPr>
-          <p:cNvCxnSpPr>
-            <a:cxnSpLocks/>
-          </p:cNvCxnSpPr>
+          <p:cNvGrpSpPr/>
           <p:nvPr/>
-        </p:nvCxnSpPr>
-        <p:spPr>
-          <a:xfrm flipV="1">
-            <a:off x="95325" y="7075624"/>
-            <a:ext cx="3553147" cy="137004"/>
+        </p:nvGrpSpPr>
+        <p:grpSpPr>
+          <a:xfrm>
+            <a:off x="1842659" y="7984976"/>
+            <a:ext cx="7593257" cy="3504887"/>
+            <a:chOff x="1842659" y="8128992"/>
+            <a:chExt cx="7593257" cy="3504887"/>
           </a:xfrm>
-          <a:prstGeom prst="line">
-            <a:avLst/>
-          </a:prstGeom>
-          <a:ln w="25400">
-            <a:prstDash val="dash"/>
-          </a:ln>
-        </p:spPr>
-        <p:style>
-          <a:lnRef idx="1">
-            <a:schemeClr val="accent1"/>
-          </a:lnRef>
-          <a:fillRef idx="0">
-            <a:schemeClr val="accent1"/>
-          </a:fillRef>
-          <a:effectRef idx="0">
-            <a:schemeClr val="accent1"/>
-          </a:effectRef>
-          <a:fontRef idx="minor">
-            <a:schemeClr val="tx1"/>
-          </a:fontRef>
-        </p:style>
-      </p:cxnSp>
-      <p:sp>
-        <p:nvSpPr>
-          <p:cNvPr id="20" name="TextBox 19">
+        </p:grpSpPr>
+        <p:sp>
+          <p:nvSpPr>
+            <p:cNvPr id="35" name="TextBox 34">
+              <a:extLst>
+                <a:ext uri="{FF2B5EF4-FFF2-40B4-BE49-F238E27FC236}">
+                  <a16:creationId xmlns:a16="http://schemas.microsoft.com/office/drawing/2014/main" id="{444003D8-E545-4060-047B-1621B0590FAA}"/>
+                </a:ext>
+              </a:extLst>
+            </p:cNvPr>
+            <p:cNvSpPr txBox="1"/>
+            <p:nvPr/>
+          </p:nvSpPr>
+          <p:spPr>
+            <a:xfrm>
+              <a:off x="2644412" y="8128992"/>
+              <a:ext cx="860044" cy="477054"/>
+            </a:xfrm>
+            <a:prstGeom prst="rect">
+              <a:avLst/>
+            </a:prstGeom>
+            <a:noFill/>
+          </p:spPr>
+          <p:txBody>
+            <a:bodyPr wrap="none" rtlCol="0">
+              <a:spAutoFit/>
+            </a:bodyPr>
+            <a:lstStyle/>
+            <a:p>
+              <a:r>
+                <a:rPr lang="en-GB" dirty="0"/>
+                <a:t>wake</a:t>
+              </a:r>
+            </a:p>
+          </p:txBody>
+        </p:sp>
+        <p:grpSp>
+          <p:nvGrpSpPr>
+            <p:cNvPr id="63" name="Group 62">
+              <a:extLst>
+                <a:ext uri="{FF2B5EF4-FFF2-40B4-BE49-F238E27FC236}">
+                  <a16:creationId xmlns:a16="http://schemas.microsoft.com/office/drawing/2014/main" id="{8297ED41-2E85-D0CE-4821-B42BD4ED5352}"/>
+                </a:ext>
+              </a:extLst>
+            </p:cNvPr>
+            <p:cNvGrpSpPr/>
+            <p:nvPr/>
+          </p:nvGrpSpPr>
+          <p:grpSpPr>
+            <a:xfrm>
+              <a:off x="1842659" y="8489032"/>
+              <a:ext cx="7593257" cy="3144847"/>
+              <a:chOff x="1842659" y="8128992"/>
+              <a:chExt cx="7593257" cy="3144847"/>
+            </a:xfrm>
+          </p:grpSpPr>
+          <p:grpSp>
+            <p:nvGrpSpPr>
+              <p:cNvPr id="14" name="Group 13">
+                <a:extLst>
+                  <a:ext uri="{FF2B5EF4-FFF2-40B4-BE49-F238E27FC236}">
+                    <a16:creationId xmlns:a16="http://schemas.microsoft.com/office/drawing/2014/main" id="{C8C345A4-6CF6-4824-B3EA-EE2C15013D76}"/>
+                  </a:ext>
+                </a:extLst>
+              </p:cNvPr>
+              <p:cNvGrpSpPr/>
+              <p:nvPr/>
+            </p:nvGrpSpPr>
+            <p:grpSpPr>
+              <a:xfrm>
+                <a:off x="4412232" y="8506907"/>
+                <a:ext cx="2477013" cy="1784719"/>
+                <a:chOff x="5015797" y="9736785"/>
+                <a:chExt cx="3285117" cy="1784719"/>
+              </a:xfrm>
+            </p:grpSpPr>
+            <p:sp>
+              <p:nvSpPr>
+                <p:cNvPr id="30" name="Rounded Rectangle 22">
+                  <a:extLst>
+                    <a:ext uri="{FF2B5EF4-FFF2-40B4-BE49-F238E27FC236}">
+                      <a16:creationId xmlns:a16="http://schemas.microsoft.com/office/drawing/2014/main" id="{92328487-F7E1-4B5E-881F-D20950C6AADF}"/>
+                    </a:ext>
+                  </a:extLst>
+                </p:cNvPr>
+                <p:cNvSpPr/>
+                <p:nvPr/>
+              </p:nvSpPr>
+              <p:spPr>
+                <a:xfrm>
+                  <a:off x="5015797" y="9736785"/>
+                  <a:ext cx="3285117" cy="1784719"/>
+                </a:xfrm>
+                <a:prstGeom prst="roundRect">
+                  <a:avLst/>
+                </a:prstGeom>
+                <a:solidFill>
+                  <a:schemeClr val="accent6">
+                    <a:lumMod val="60000"/>
+                    <a:lumOff val="40000"/>
+                  </a:schemeClr>
+                </a:solidFill>
+                <a:ln>
+                  <a:noFill/>
+                </a:ln>
+              </p:spPr>
+              <p:style>
+                <a:lnRef idx="2">
+                  <a:schemeClr val="accent1">
+                    <a:shade val="50000"/>
+                  </a:schemeClr>
+                </a:lnRef>
+                <a:fillRef idx="1">
+                  <a:schemeClr val="accent1"/>
+                </a:fillRef>
+                <a:effectRef idx="0">
+                  <a:schemeClr val="accent1"/>
+                </a:effectRef>
+                <a:fontRef idx="minor">
+                  <a:schemeClr val="lt1"/>
+                </a:fontRef>
+              </p:style>
+              <p:txBody>
+                <a:bodyPr rtlCol="0" anchor="ctr"/>
+                <a:lstStyle/>
+                <a:p>
+                  <a:pPr algn="ctr"/>
+                  <a:endParaRPr lang="en-GB" sz="1400" dirty="0">
+                    <a:solidFill>
+                      <a:schemeClr val="tx2">
+                        <a:lumMod val="60000"/>
+                        <a:lumOff val="40000"/>
+                      </a:schemeClr>
+                    </a:solidFill>
+                  </a:endParaRPr>
+                </a:p>
+                <a:p>
+                  <a:pPr algn="ctr"/>
+                  <a:endParaRPr lang="en-GB" sz="1400" dirty="0">
+                    <a:solidFill>
+                      <a:schemeClr val="tx2">
+                        <a:lumMod val="60000"/>
+                        <a:lumOff val="40000"/>
+                      </a:schemeClr>
+                    </a:solidFill>
+                  </a:endParaRPr>
+                </a:p>
+                <a:p>
+                  <a:pPr algn="ctr"/>
+                  <a:endParaRPr lang="en-GB" sz="1400" dirty="0">
+                    <a:solidFill>
+                      <a:schemeClr val="tx2">
+                        <a:lumMod val="60000"/>
+                        <a:lumOff val="40000"/>
+                      </a:schemeClr>
+                    </a:solidFill>
+                  </a:endParaRPr>
+                </a:p>
+                <a:p>
+                  <a:pPr algn="ctr"/>
+                  <a:endParaRPr lang="en-GB" sz="1400" dirty="0">
+                    <a:solidFill>
+                      <a:schemeClr val="tx2">
+                        <a:lumMod val="60000"/>
+                        <a:lumOff val="40000"/>
+                      </a:schemeClr>
+                    </a:solidFill>
+                  </a:endParaRPr>
+                </a:p>
+                <a:p>
+                  <a:pPr algn="ctr"/>
+                  <a:endParaRPr lang="en-GB" sz="1400" dirty="0">
+                    <a:solidFill>
+                      <a:schemeClr val="tx2">
+                        <a:lumMod val="60000"/>
+                        <a:lumOff val="40000"/>
+                      </a:schemeClr>
+                    </a:solidFill>
+                  </a:endParaRPr>
+                </a:p>
+                <a:p>
+                  <a:pPr algn="ctr"/>
+                  <a:endParaRPr lang="en-GB" sz="1400" dirty="0">
+                    <a:solidFill>
+                      <a:schemeClr val="tx2">
+                        <a:lumMod val="60000"/>
+                        <a:lumOff val="40000"/>
+                      </a:schemeClr>
+                    </a:solidFill>
+                  </a:endParaRPr>
+                </a:p>
+                <a:p>
+                  <a:pPr algn="ctr"/>
+                  <a:endParaRPr lang="en-GB" sz="1400" dirty="0">
+                    <a:solidFill>
+                      <a:schemeClr val="tx2">
+                        <a:lumMod val="60000"/>
+                        <a:lumOff val="40000"/>
+                      </a:schemeClr>
+                    </a:solidFill>
+                  </a:endParaRPr>
+                </a:p>
+              </p:txBody>
+            </p:sp>
+            <p:sp>
+              <p:nvSpPr>
+                <p:cNvPr id="7" name="Rounded Rectangle 6"/>
+                <p:cNvSpPr/>
+                <p:nvPr/>
+              </p:nvSpPr>
+              <p:spPr>
+                <a:xfrm>
+                  <a:off x="5277100" y="10786085"/>
+                  <a:ext cx="2762712" cy="583267"/>
+                </a:xfrm>
+                <a:prstGeom prst="roundRect">
+                  <a:avLst/>
+                </a:prstGeom>
+                <a:noFill/>
+                <a:ln>
+                  <a:solidFill>
+                    <a:schemeClr val="tx1"/>
+                  </a:solidFill>
+                </a:ln>
+              </p:spPr>
+              <p:style>
+                <a:lnRef idx="2">
+                  <a:schemeClr val="accent1">
+                    <a:shade val="50000"/>
+                  </a:schemeClr>
+                </a:lnRef>
+                <a:fillRef idx="1">
+                  <a:schemeClr val="accent1"/>
+                </a:fillRef>
+                <a:effectRef idx="0">
+                  <a:schemeClr val="accent1"/>
+                </a:effectRef>
+                <a:fontRef idx="minor">
+                  <a:schemeClr val="lt1"/>
+                </a:fontRef>
+              </p:style>
+              <p:txBody>
+                <a:bodyPr lIns="128016" tIns="64008" rIns="128016" bIns="64008" spcCol="0" rtlCol="0" anchor="ctr"/>
+                <a:lstStyle/>
+                <a:p>
+                  <a:pPr algn="ctr"/>
+                  <a:r>
+                    <a:rPr lang="en-GB" sz="1600" dirty="0" err="1">
+                      <a:solidFill>
+                        <a:schemeClr val="tx1"/>
+                      </a:solidFill>
+                    </a:rPr>
+                    <a:t>plot_data</a:t>
+                  </a:r>
+                  <a:endParaRPr lang="en-GB" sz="1600" dirty="0">
+                    <a:solidFill>
+                      <a:schemeClr val="tx1"/>
+                    </a:solidFill>
+                  </a:endParaRPr>
+                </a:p>
+              </p:txBody>
+            </p:sp>
+            <p:sp>
+              <p:nvSpPr>
+                <p:cNvPr id="28" name="Rounded Rectangle 6">
+                  <a:extLst>
+                    <a:ext uri="{FF2B5EF4-FFF2-40B4-BE49-F238E27FC236}">
+                      <a16:creationId xmlns:a16="http://schemas.microsoft.com/office/drawing/2014/main" id="{706EBA29-97C6-4F34-A22B-8D211DCABCCA}"/>
+                    </a:ext>
+                  </a:extLst>
+                </p:cNvPr>
+                <p:cNvSpPr/>
+                <p:nvPr/>
+              </p:nvSpPr>
+              <p:spPr>
+                <a:xfrm>
+                  <a:off x="5278248" y="10073208"/>
+                  <a:ext cx="2762712" cy="583267"/>
+                </a:xfrm>
+                <a:prstGeom prst="roundRect">
+                  <a:avLst/>
+                </a:prstGeom>
+                <a:noFill/>
+                <a:ln>
+                  <a:solidFill>
+                    <a:schemeClr val="tx1"/>
+                  </a:solidFill>
+                </a:ln>
+              </p:spPr>
+              <p:style>
+                <a:lnRef idx="2">
+                  <a:schemeClr val="accent1">
+                    <a:shade val="50000"/>
+                  </a:schemeClr>
+                </a:lnRef>
+                <a:fillRef idx="1">
+                  <a:schemeClr val="accent1"/>
+                </a:fillRef>
+                <a:effectRef idx="0">
+                  <a:schemeClr val="accent1"/>
+                </a:effectRef>
+                <a:fontRef idx="minor">
+                  <a:schemeClr val="lt1"/>
+                </a:fontRef>
+              </p:style>
+              <p:txBody>
+                <a:bodyPr lIns="128016" tIns="64008" rIns="128016" bIns="64008" spcCol="0" rtlCol="0" anchor="ctr"/>
+                <a:lstStyle/>
+                <a:p>
+                  <a:pPr algn="ctr"/>
+                  <a:r>
+                    <a:rPr lang="en-GB" sz="1600" dirty="0">
+                      <a:solidFill>
+                        <a:schemeClr val="tx1"/>
+                      </a:solidFill>
+                    </a:rPr>
+                    <a:t>analyse</a:t>
+                  </a:r>
+                </a:p>
+              </p:txBody>
+            </p:sp>
+          </p:grpSp>
+          <p:grpSp>
+            <p:nvGrpSpPr>
+              <p:cNvPr id="48" name="Group 47">
+                <a:extLst>
+                  <a:ext uri="{FF2B5EF4-FFF2-40B4-BE49-F238E27FC236}">
+                    <a16:creationId xmlns:a16="http://schemas.microsoft.com/office/drawing/2014/main" id="{CBFF74EF-BBE1-5224-FB62-6CC1237A994A}"/>
+                  </a:ext>
+                </a:extLst>
+              </p:cNvPr>
+              <p:cNvGrpSpPr/>
+              <p:nvPr/>
+            </p:nvGrpSpPr>
+            <p:grpSpPr>
+              <a:xfrm>
+                <a:off x="6958903" y="8492204"/>
+                <a:ext cx="2477013" cy="1784719"/>
+                <a:chOff x="5015797" y="9736785"/>
+                <a:chExt cx="3285117" cy="1784719"/>
+              </a:xfrm>
+            </p:grpSpPr>
+            <p:sp>
+              <p:nvSpPr>
+                <p:cNvPr id="50" name="Rounded Rectangle 22">
+                  <a:extLst>
+                    <a:ext uri="{FF2B5EF4-FFF2-40B4-BE49-F238E27FC236}">
+                      <a16:creationId xmlns:a16="http://schemas.microsoft.com/office/drawing/2014/main" id="{66ECA12B-2816-CB7C-7985-75F878BD9F82}"/>
+                    </a:ext>
+                  </a:extLst>
+                </p:cNvPr>
+                <p:cNvSpPr/>
+                <p:nvPr/>
+              </p:nvSpPr>
+              <p:spPr>
+                <a:xfrm>
+                  <a:off x="5015797" y="9736785"/>
+                  <a:ext cx="3285117" cy="1784719"/>
+                </a:xfrm>
+                <a:prstGeom prst="roundRect">
+                  <a:avLst/>
+                </a:prstGeom>
+                <a:solidFill>
+                  <a:schemeClr val="accent6">
+                    <a:lumMod val="60000"/>
+                    <a:lumOff val="40000"/>
+                  </a:schemeClr>
+                </a:solidFill>
+                <a:ln>
+                  <a:noFill/>
+                </a:ln>
+              </p:spPr>
+              <p:style>
+                <a:lnRef idx="2">
+                  <a:schemeClr val="accent1">
+                    <a:shade val="50000"/>
+                  </a:schemeClr>
+                </a:lnRef>
+                <a:fillRef idx="1">
+                  <a:schemeClr val="accent1"/>
+                </a:fillRef>
+                <a:effectRef idx="0">
+                  <a:schemeClr val="accent1"/>
+                </a:effectRef>
+                <a:fontRef idx="minor">
+                  <a:schemeClr val="lt1"/>
+                </a:fontRef>
+              </p:style>
+              <p:txBody>
+                <a:bodyPr rtlCol="0" anchor="ctr"/>
+                <a:lstStyle/>
+                <a:p>
+                  <a:pPr algn="ctr"/>
+                  <a:endParaRPr lang="en-GB" sz="1400" dirty="0">
+                    <a:solidFill>
+                      <a:schemeClr val="tx2">
+                        <a:lumMod val="60000"/>
+                        <a:lumOff val="40000"/>
+                      </a:schemeClr>
+                    </a:solidFill>
+                  </a:endParaRPr>
+                </a:p>
+                <a:p>
+                  <a:pPr algn="ctr"/>
+                  <a:endParaRPr lang="en-GB" sz="1400" dirty="0">
+                    <a:solidFill>
+                      <a:schemeClr val="tx2">
+                        <a:lumMod val="60000"/>
+                        <a:lumOff val="40000"/>
+                      </a:schemeClr>
+                    </a:solidFill>
+                  </a:endParaRPr>
+                </a:p>
+                <a:p>
+                  <a:pPr algn="ctr"/>
+                  <a:endParaRPr lang="en-GB" sz="1400" dirty="0">
+                    <a:solidFill>
+                      <a:schemeClr val="tx2">
+                        <a:lumMod val="60000"/>
+                        <a:lumOff val="40000"/>
+                      </a:schemeClr>
+                    </a:solidFill>
+                  </a:endParaRPr>
+                </a:p>
+                <a:p>
+                  <a:pPr algn="ctr"/>
+                  <a:endParaRPr lang="en-GB" sz="1400" dirty="0">
+                    <a:solidFill>
+                      <a:schemeClr val="tx2">
+                        <a:lumMod val="60000"/>
+                        <a:lumOff val="40000"/>
+                      </a:schemeClr>
+                    </a:solidFill>
+                  </a:endParaRPr>
+                </a:p>
+                <a:p>
+                  <a:pPr algn="ctr"/>
+                  <a:endParaRPr lang="en-GB" sz="1400" dirty="0">
+                    <a:solidFill>
+                      <a:schemeClr val="tx2">
+                        <a:lumMod val="60000"/>
+                        <a:lumOff val="40000"/>
+                      </a:schemeClr>
+                    </a:solidFill>
+                  </a:endParaRPr>
+                </a:p>
+                <a:p>
+                  <a:pPr algn="ctr"/>
+                  <a:endParaRPr lang="en-GB" sz="1400" dirty="0">
+                    <a:solidFill>
+                      <a:schemeClr val="tx2">
+                        <a:lumMod val="60000"/>
+                        <a:lumOff val="40000"/>
+                      </a:schemeClr>
+                    </a:solidFill>
+                  </a:endParaRPr>
+                </a:p>
+                <a:p>
+                  <a:pPr algn="ctr"/>
+                  <a:endParaRPr lang="en-GB" sz="1400" dirty="0">
+                    <a:solidFill>
+                      <a:schemeClr val="tx2">
+                        <a:lumMod val="60000"/>
+                        <a:lumOff val="40000"/>
+                      </a:schemeClr>
+                    </a:solidFill>
+                  </a:endParaRPr>
+                </a:p>
+              </p:txBody>
+            </p:sp>
+            <p:sp>
+              <p:nvSpPr>
+                <p:cNvPr id="52" name="Rounded Rectangle 6">
+                  <a:extLst>
+                    <a:ext uri="{FF2B5EF4-FFF2-40B4-BE49-F238E27FC236}">
+                      <a16:creationId xmlns:a16="http://schemas.microsoft.com/office/drawing/2014/main" id="{39ED72B4-AB0C-0A3A-43E7-84A0A4E1D445}"/>
+                    </a:ext>
+                  </a:extLst>
+                </p:cNvPr>
+                <p:cNvSpPr/>
+                <p:nvPr/>
+              </p:nvSpPr>
+              <p:spPr>
+                <a:xfrm>
+                  <a:off x="5277100" y="10786085"/>
+                  <a:ext cx="2762712" cy="583267"/>
+                </a:xfrm>
+                <a:prstGeom prst="roundRect">
+                  <a:avLst/>
+                </a:prstGeom>
+                <a:noFill/>
+                <a:ln>
+                  <a:solidFill>
+                    <a:schemeClr val="tx1"/>
+                  </a:solidFill>
+                </a:ln>
+              </p:spPr>
+              <p:style>
+                <a:lnRef idx="2">
+                  <a:schemeClr val="accent1">
+                    <a:shade val="50000"/>
+                  </a:schemeClr>
+                </a:lnRef>
+                <a:fillRef idx="1">
+                  <a:schemeClr val="accent1"/>
+                </a:fillRef>
+                <a:effectRef idx="0">
+                  <a:schemeClr val="accent1"/>
+                </a:effectRef>
+                <a:fontRef idx="minor">
+                  <a:schemeClr val="lt1"/>
+                </a:fontRef>
+              </p:style>
+              <p:txBody>
+                <a:bodyPr lIns="128016" tIns="64008" rIns="128016" bIns="64008" spcCol="0" rtlCol="0" anchor="ctr"/>
+                <a:lstStyle/>
+                <a:p>
+                  <a:pPr algn="ctr"/>
+                  <a:r>
+                    <a:rPr lang="en-GB" sz="1600" dirty="0" err="1">
+                      <a:solidFill>
+                        <a:schemeClr val="tx1"/>
+                      </a:solidFill>
+                    </a:rPr>
+                    <a:t>plot_data</a:t>
+                  </a:r>
+                  <a:endParaRPr lang="en-GB" sz="1600" dirty="0">
+                    <a:solidFill>
+                      <a:schemeClr val="tx1"/>
+                    </a:solidFill>
+                  </a:endParaRPr>
+                </a:p>
+              </p:txBody>
+            </p:sp>
+            <p:sp>
+              <p:nvSpPr>
+                <p:cNvPr id="53" name="Rounded Rectangle 6">
+                  <a:extLst>
+                    <a:ext uri="{FF2B5EF4-FFF2-40B4-BE49-F238E27FC236}">
+                      <a16:creationId xmlns:a16="http://schemas.microsoft.com/office/drawing/2014/main" id="{BB8D3A7D-682A-2AD6-01D2-4A19EC6B76E0}"/>
+                    </a:ext>
+                  </a:extLst>
+                </p:cNvPr>
+                <p:cNvSpPr/>
+                <p:nvPr/>
+              </p:nvSpPr>
+              <p:spPr>
+                <a:xfrm>
+                  <a:off x="5278248" y="10073208"/>
+                  <a:ext cx="2762712" cy="583267"/>
+                </a:xfrm>
+                <a:prstGeom prst="roundRect">
+                  <a:avLst/>
+                </a:prstGeom>
+                <a:noFill/>
+                <a:ln>
+                  <a:solidFill>
+                    <a:schemeClr val="tx1"/>
+                  </a:solidFill>
+                </a:ln>
+              </p:spPr>
+              <p:style>
+                <a:lnRef idx="2">
+                  <a:schemeClr val="accent1">
+                    <a:shade val="50000"/>
+                  </a:schemeClr>
+                </a:lnRef>
+                <a:fillRef idx="1">
+                  <a:schemeClr val="accent1"/>
+                </a:fillRef>
+                <a:effectRef idx="0">
+                  <a:schemeClr val="accent1"/>
+                </a:effectRef>
+                <a:fontRef idx="minor">
+                  <a:schemeClr val="lt1"/>
+                </a:fontRef>
+              </p:style>
+              <p:txBody>
+                <a:bodyPr lIns="128016" tIns="64008" rIns="128016" bIns="64008" spcCol="0" rtlCol="0" anchor="ctr"/>
+                <a:lstStyle/>
+                <a:p>
+                  <a:pPr algn="ctr"/>
+                  <a:r>
+                    <a:rPr lang="en-GB" sz="1600" dirty="0">
+                      <a:solidFill>
+                        <a:schemeClr val="tx1"/>
+                      </a:solidFill>
+                    </a:rPr>
+                    <a:t>analyse</a:t>
+                  </a:r>
+                </a:p>
+              </p:txBody>
+            </p:sp>
+          </p:grpSp>
+          <p:grpSp>
+            <p:nvGrpSpPr>
+              <p:cNvPr id="54" name="Group 53">
+                <a:extLst>
+                  <a:ext uri="{FF2B5EF4-FFF2-40B4-BE49-F238E27FC236}">
+                    <a16:creationId xmlns:a16="http://schemas.microsoft.com/office/drawing/2014/main" id="{B83BA30B-3DCB-561B-E8EF-8D4A938F8629}"/>
+                  </a:ext>
+                </a:extLst>
+              </p:cNvPr>
+              <p:cNvGrpSpPr/>
+              <p:nvPr/>
+            </p:nvGrpSpPr>
+            <p:grpSpPr>
+              <a:xfrm>
+                <a:off x="1842659" y="8128992"/>
+                <a:ext cx="2477013" cy="3144847"/>
+                <a:chOff x="5015797" y="9493022"/>
+                <a:chExt cx="3285117" cy="2028482"/>
+              </a:xfrm>
+            </p:grpSpPr>
+            <p:sp>
+              <p:nvSpPr>
+                <p:cNvPr id="55" name="Rounded Rectangle 22">
+                  <a:extLst>
+                    <a:ext uri="{FF2B5EF4-FFF2-40B4-BE49-F238E27FC236}">
+                      <a16:creationId xmlns:a16="http://schemas.microsoft.com/office/drawing/2014/main" id="{16929E98-9563-0C8A-FAB3-9D84215E9F9D}"/>
+                    </a:ext>
+                  </a:extLst>
+                </p:cNvPr>
+                <p:cNvSpPr/>
+                <p:nvPr/>
+              </p:nvSpPr>
+              <p:spPr>
+                <a:xfrm>
+                  <a:off x="5015797" y="9493022"/>
+                  <a:ext cx="3285117" cy="2028482"/>
+                </a:xfrm>
+                <a:prstGeom prst="roundRect">
+                  <a:avLst/>
+                </a:prstGeom>
+                <a:solidFill>
+                  <a:schemeClr val="accent6">
+                    <a:lumMod val="60000"/>
+                    <a:lumOff val="40000"/>
+                  </a:schemeClr>
+                </a:solidFill>
+                <a:ln>
+                  <a:noFill/>
+                </a:ln>
+              </p:spPr>
+              <p:style>
+                <a:lnRef idx="2">
+                  <a:schemeClr val="accent1">
+                    <a:shade val="50000"/>
+                  </a:schemeClr>
+                </a:lnRef>
+                <a:fillRef idx="1">
+                  <a:schemeClr val="accent1"/>
+                </a:fillRef>
+                <a:effectRef idx="0">
+                  <a:schemeClr val="accent1"/>
+                </a:effectRef>
+                <a:fontRef idx="minor">
+                  <a:schemeClr val="lt1"/>
+                </a:fontRef>
+              </p:style>
+              <p:txBody>
+                <a:bodyPr rtlCol="0" anchor="ctr"/>
+                <a:lstStyle/>
+                <a:p>
+                  <a:pPr algn="ctr"/>
+                  <a:endParaRPr lang="en-GB" sz="1400" dirty="0">
+                    <a:solidFill>
+                      <a:schemeClr val="tx2">
+                        <a:lumMod val="60000"/>
+                        <a:lumOff val="40000"/>
+                      </a:schemeClr>
+                    </a:solidFill>
+                  </a:endParaRPr>
+                </a:p>
+                <a:p>
+                  <a:pPr algn="ctr"/>
+                  <a:endParaRPr lang="en-GB" sz="1400" dirty="0">
+                    <a:solidFill>
+                      <a:schemeClr val="tx2">
+                        <a:lumMod val="60000"/>
+                        <a:lumOff val="40000"/>
+                      </a:schemeClr>
+                    </a:solidFill>
+                  </a:endParaRPr>
+                </a:p>
+                <a:p>
+                  <a:pPr algn="ctr"/>
+                  <a:endParaRPr lang="en-GB" sz="1400" dirty="0">
+                    <a:solidFill>
+                      <a:schemeClr val="tx2">
+                        <a:lumMod val="60000"/>
+                        <a:lumOff val="40000"/>
+                      </a:schemeClr>
+                    </a:solidFill>
+                  </a:endParaRPr>
+                </a:p>
+                <a:p>
+                  <a:pPr algn="ctr"/>
+                  <a:endParaRPr lang="en-GB" sz="1400" dirty="0">
+                    <a:solidFill>
+                      <a:schemeClr val="tx2">
+                        <a:lumMod val="60000"/>
+                        <a:lumOff val="40000"/>
+                      </a:schemeClr>
+                    </a:solidFill>
+                  </a:endParaRPr>
+                </a:p>
+                <a:p>
+                  <a:pPr algn="ctr"/>
+                  <a:endParaRPr lang="en-GB" sz="1400" dirty="0">
+                    <a:solidFill>
+                      <a:schemeClr val="tx2">
+                        <a:lumMod val="60000"/>
+                        <a:lumOff val="40000"/>
+                      </a:schemeClr>
+                    </a:solidFill>
+                  </a:endParaRPr>
+                </a:p>
+                <a:p>
+                  <a:pPr algn="ctr"/>
+                  <a:endParaRPr lang="en-GB" sz="1400" dirty="0">
+                    <a:solidFill>
+                      <a:schemeClr val="tx2">
+                        <a:lumMod val="60000"/>
+                        <a:lumOff val="40000"/>
+                      </a:schemeClr>
+                    </a:solidFill>
+                  </a:endParaRPr>
+                </a:p>
+                <a:p>
+                  <a:pPr algn="ctr"/>
+                  <a:endParaRPr lang="en-GB" sz="1400" dirty="0">
+                    <a:solidFill>
+                      <a:schemeClr val="tx2">
+                        <a:lumMod val="60000"/>
+                        <a:lumOff val="40000"/>
+                      </a:schemeClr>
+                    </a:solidFill>
+                  </a:endParaRPr>
+                </a:p>
+              </p:txBody>
+            </p:sp>
+            <p:sp>
+              <p:nvSpPr>
+                <p:cNvPr id="56" name="Rounded Rectangle 6">
+                  <a:extLst>
+                    <a:ext uri="{FF2B5EF4-FFF2-40B4-BE49-F238E27FC236}">
+                      <a16:creationId xmlns:a16="http://schemas.microsoft.com/office/drawing/2014/main" id="{339BBFC2-C627-5BA9-C39F-00EF9E412861}"/>
+                    </a:ext>
+                  </a:extLst>
+                </p:cNvPr>
+                <p:cNvSpPr/>
+                <p:nvPr/>
+              </p:nvSpPr>
+              <p:spPr>
+                <a:xfrm>
+                  <a:off x="5274349" y="9904944"/>
+                  <a:ext cx="2762712" cy="315018"/>
+                </a:xfrm>
+                <a:prstGeom prst="roundRect">
+                  <a:avLst/>
+                </a:prstGeom>
+                <a:noFill/>
+                <a:ln>
+                  <a:solidFill>
+                    <a:schemeClr val="tx1"/>
+                  </a:solidFill>
+                </a:ln>
+              </p:spPr>
+              <p:style>
+                <a:lnRef idx="2">
+                  <a:schemeClr val="accent1">
+                    <a:shade val="50000"/>
+                  </a:schemeClr>
+                </a:lnRef>
+                <a:fillRef idx="1">
+                  <a:schemeClr val="accent1"/>
+                </a:fillRef>
+                <a:effectRef idx="0">
+                  <a:schemeClr val="accent1"/>
+                </a:effectRef>
+                <a:fontRef idx="minor">
+                  <a:schemeClr val="lt1"/>
+                </a:fontRef>
+              </p:style>
+              <p:txBody>
+                <a:bodyPr lIns="128016" tIns="64008" rIns="128016" bIns="64008" spcCol="0" rtlCol="0" anchor="ctr"/>
+                <a:lstStyle/>
+                <a:p>
+                  <a:pPr algn="ctr"/>
+                  <a:r>
+                    <a:rPr lang="en-GB" sz="1600" dirty="0">
+                      <a:solidFill>
+                        <a:schemeClr val="tx1"/>
+                      </a:solidFill>
+                    </a:rPr>
+                    <a:t>reconstruct</a:t>
+                  </a:r>
+                </a:p>
+              </p:txBody>
+            </p:sp>
+            <p:sp>
+              <p:nvSpPr>
+                <p:cNvPr id="57" name="Rounded Rectangle 6">
+                  <a:extLst>
+                    <a:ext uri="{FF2B5EF4-FFF2-40B4-BE49-F238E27FC236}">
+                      <a16:creationId xmlns:a16="http://schemas.microsoft.com/office/drawing/2014/main" id="{651E07C6-5065-3619-96B2-86A7287544F5}"/>
+                    </a:ext>
+                  </a:extLst>
+                </p:cNvPr>
+                <p:cNvSpPr/>
+                <p:nvPr/>
+              </p:nvSpPr>
+              <p:spPr>
+                <a:xfrm>
+                  <a:off x="5250617" y="9558633"/>
+                  <a:ext cx="2762712" cy="283165"/>
+                </a:xfrm>
+                <a:prstGeom prst="roundRect">
+                  <a:avLst/>
+                </a:prstGeom>
+                <a:noFill/>
+                <a:ln>
+                  <a:solidFill>
+                    <a:schemeClr val="tx1"/>
+                  </a:solidFill>
+                </a:ln>
+              </p:spPr>
+              <p:style>
+                <a:lnRef idx="2">
+                  <a:schemeClr val="accent1">
+                    <a:shade val="50000"/>
+                  </a:schemeClr>
+                </a:lnRef>
+                <a:fillRef idx="1">
+                  <a:schemeClr val="accent1"/>
+                </a:fillRef>
+                <a:effectRef idx="0">
+                  <a:schemeClr val="accent1"/>
+                </a:effectRef>
+                <a:fontRef idx="minor">
+                  <a:schemeClr val="lt1"/>
+                </a:fontRef>
+              </p:style>
+              <p:txBody>
+                <a:bodyPr lIns="128016" tIns="64008" rIns="128016" bIns="64008" spcCol="0" rtlCol="0" anchor="ctr"/>
+                <a:lstStyle/>
+                <a:p>
+                  <a:pPr algn="ctr"/>
+                  <a:r>
+                    <a:rPr lang="en-GB" sz="1600" dirty="0">
+                      <a:solidFill>
+                        <a:schemeClr val="tx1"/>
+                      </a:solidFill>
+                    </a:rPr>
+                    <a:t>analyse</a:t>
+                  </a:r>
+                </a:p>
+              </p:txBody>
+            </p:sp>
+          </p:grpSp>
+          <p:sp>
+            <p:nvSpPr>
+              <p:cNvPr id="58" name="Rounded Rectangle 6">
+                <a:extLst>
+                  <a:ext uri="{FF2B5EF4-FFF2-40B4-BE49-F238E27FC236}">
+                    <a16:creationId xmlns:a16="http://schemas.microsoft.com/office/drawing/2014/main" id="{C4310B38-AB39-B9D2-414B-9B65571E72F8}"/>
+                  </a:ext>
+                </a:extLst>
+              </p:cNvPr>
+              <p:cNvSpPr/>
+              <p:nvPr/>
+            </p:nvSpPr>
+            <p:spPr>
+              <a:xfrm>
+                <a:off x="2048111" y="9384563"/>
+                <a:ext cx="2083114" cy="488387"/>
+              </a:xfrm>
+              <a:prstGeom prst="roundRect">
+                <a:avLst/>
+              </a:prstGeom>
+              <a:noFill/>
+              <a:ln>
+                <a:solidFill>
+                  <a:schemeClr val="tx1"/>
+                </a:solidFill>
+              </a:ln>
+            </p:spPr>
+            <p:style>
+              <a:lnRef idx="2">
+                <a:schemeClr val="accent1">
+                  <a:shade val="50000"/>
+                </a:schemeClr>
+              </a:lnRef>
+              <a:fillRef idx="1">
+                <a:schemeClr val="accent1"/>
+              </a:fillRef>
+              <a:effectRef idx="0">
+                <a:schemeClr val="accent1"/>
+              </a:effectRef>
+              <a:fontRef idx="minor">
+                <a:schemeClr val="lt1"/>
+              </a:fontRef>
+            </p:style>
+            <p:txBody>
+              <a:bodyPr lIns="128016" tIns="64008" rIns="128016" bIns="64008" spcCol="0" rtlCol="0" anchor="ctr"/>
+              <a:lstStyle/>
+              <a:p>
+                <a:pPr algn="ctr"/>
+                <a:r>
+                  <a:rPr lang="en-GB" sz="1600" dirty="0" err="1">
+                    <a:solidFill>
+                      <a:schemeClr val="tx1"/>
+                    </a:solidFill>
+                  </a:rPr>
+                  <a:t>field_extraction</a:t>
+                </a:r>
+                <a:endParaRPr lang="en-GB" sz="1600" dirty="0">
+                  <a:solidFill>
+                    <a:schemeClr val="tx1"/>
+                  </a:solidFill>
+                </a:endParaRPr>
+              </a:p>
+            </p:txBody>
+          </p:sp>
+          <p:sp>
+            <p:nvSpPr>
+              <p:cNvPr id="59" name="Rounded Rectangle 6">
+                <a:extLst>
+                  <a:ext uri="{FF2B5EF4-FFF2-40B4-BE49-F238E27FC236}">
+                    <a16:creationId xmlns:a16="http://schemas.microsoft.com/office/drawing/2014/main" id="{72C6CB30-C760-E1D6-CE14-89B5D4814ACD}"/>
+                  </a:ext>
+                </a:extLst>
+              </p:cNvPr>
+              <p:cNvSpPr/>
+              <p:nvPr/>
+            </p:nvSpPr>
+            <p:spPr>
+              <a:xfrm>
+                <a:off x="2031400" y="10020726"/>
+                <a:ext cx="2083114" cy="488387"/>
+              </a:xfrm>
+              <a:prstGeom prst="roundRect">
+                <a:avLst/>
+              </a:prstGeom>
+              <a:noFill/>
+              <a:ln>
+                <a:solidFill>
+                  <a:schemeClr val="tx1"/>
+                </a:solidFill>
+              </a:ln>
+            </p:spPr>
+            <p:style>
+              <a:lnRef idx="2">
+                <a:schemeClr val="accent1">
+                  <a:shade val="50000"/>
+                </a:schemeClr>
+              </a:lnRef>
+              <a:fillRef idx="1">
+                <a:schemeClr val="accent1"/>
+              </a:fillRef>
+              <a:effectRef idx="0">
+                <a:schemeClr val="accent1"/>
+              </a:effectRef>
+              <a:fontRef idx="minor">
+                <a:schemeClr val="lt1"/>
+              </a:fontRef>
+            </p:style>
+            <p:txBody>
+              <a:bodyPr lIns="128016" tIns="64008" rIns="128016" bIns="64008" spcCol="0" rtlCol="0" anchor="ctr"/>
+              <a:lstStyle/>
+              <a:p>
+                <a:pPr algn="ctr"/>
+                <a:r>
+                  <a:rPr lang="en-GB" sz="1600" dirty="0" err="1">
+                    <a:solidFill>
+                      <a:schemeClr val="tx1"/>
+                    </a:solidFill>
+                  </a:rPr>
+                  <a:t>plot_data</a:t>
+                </a:r>
+                <a:endParaRPr lang="en-GB" sz="1600" dirty="0">
+                  <a:solidFill>
+                    <a:schemeClr val="tx1"/>
+                  </a:solidFill>
+                </a:endParaRPr>
+              </a:p>
+            </p:txBody>
+          </p:sp>
+          <p:sp>
+            <p:nvSpPr>
+              <p:cNvPr id="60" name="Rounded Rectangle 6">
+                <a:extLst>
+                  <a:ext uri="{FF2B5EF4-FFF2-40B4-BE49-F238E27FC236}">
+                    <a16:creationId xmlns:a16="http://schemas.microsoft.com/office/drawing/2014/main" id="{3934B3B7-5E61-AFFC-BD3B-A58A7BF71D24}"/>
+                  </a:ext>
+                </a:extLst>
+              </p:cNvPr>
+              <p:cNvSpPr/>
+              <p:nvPr/>
+            </p:nvSpPr>
+            <p:spPr>
+              <a:xfrm>
+                <a:off x="2048111" y="10625556"/>
+                <a:ext cx="2083114" cy="488387"/>
+              </a:xfrm>
+              <a:prstGeom prst="roundRect">
+                <a:avLst/>
+              </a:prstGeom>
+              <a:noFill/>
+              <a:ln>
+                <a:solidFill>
+                  <a:schemeClr val="tx1"/>
+                </a:solidFill>
+              </a:ln>
+            </p:spPr>
+            <p:style>
+              <a:lnRef idx="2">
+                <a:schemeClr val="accent1">
+                  <a:shade val="50000"/>
+                </a:schemeClr>
+              </a:lnRef>
+              <a:fillRef idx="1">
+                <a:schemeClr val="accent1"/>
+              </a:fillRef>
+              <a:effectRef idx="0">
+                <a:schemeClr val="accent1"/>
+              </a:effectRef>
+              <a:fontRef idx="minor">
+                <a:schemeClr val="lt1"/>
+              </a:fontRef>
+            </p:style>
+            <p:txBody>
+              <a:bodyPr lIns="128016" tIns="64008" rIns="128016" bIns="64008" spcCol="0" rtlCol="0" anchor="ctr"/>
+              <a:lstStyle/>
+              <a:p>
+                <a:pPr algn="ctr"/>
+                <a:r>
+                  <a:rPr lang="en-GB" sz="1600" dirty="0" err="1">
+                    <a:solidFill>
+                      <a:schemeClr val="tx1"/>
+                    </a:solidFill>
+                  </a:rPr>
+                  <a:t>plot_fields</a:t>
+                </a:r>
+                <a:endParaRPr lang="en-GB" sz="1600" dirty="0">
+                  <a:solidFill>
+                    <a:schemeClr val="tx1"/>
+                  </a:solidFill>
+                </a:endParaRPr>
+              </a:p>
+            </p:txBody>
+          </p:sp>
+          <p:sp>
+            <p:nvSpPr>
+              <p:cNvPr id="61" name="TextBox 60">
+                <a:extLst>
+                  <a:ext uri="{FF2B5EF4-FFF2-40B4-BE49-F238E27FC236}">
+                    <a16:creationId xmlns:a16="http://schemas.microsoft.com/office/drawing/2014/main" id="{104038AA-AE16-A56C-3D5B-CB9BA1B381D8}"/>
+                  </a:ext>
+                </a:extLst>
+              </p:cNvPr>
+              <p:cNvSpPr txBox="1"/>
+              <p:nvPr/>
+            </p:nvSpPr>
+            <p:spPr>
+              <a:xfrm>
+                <a:off x="4817831" y="8151038"/>
+                <a:ext cx="1682897" cy="477054"/>
+              </a:xfrm>
+              <a:prstGeom prst="rect">
+                <a:avLst/>
+              </a:prstGeom>
+              <a:noFill/>
+            </p:spPr>
+            <p:txBody>
+              <a:bodyPr wrap="none" rtlCol="0">
+                <a:spAutoFit/>
+              </a:bodyPr>
+              <a:lstStyle/>
+              <a:p>
+                <a:r>
+                  <a:rPr lang="en-GB" dirty="0" err="1"/>
+                  <a:t>sparameter</a:t>
+                </a:r>
+                <a:endParaRPr lang="en-GB" dirty="0"/>
+              </a:p>
+            </p:txBody>
+          </p:sp>
+          <p:sp>
+            <p:nvSpPr>
+              <p:cNvPr id="62" name="TextBox 61">
+                <a:extLst>
+                  <a:ext uri="{FF2B5EF4-FFF2-40B4-BE49-F238E27FC236}">
+                    <a16:creationId xmlns:a16="http://schemas.microsoft.com/office/drawing/2014/main" id="{C050C4B5-27F4-42A6-4984-E7B07B4CEEBE}"/>
+                  </a:ext>
+                </a:extLst>
+              </p:cNvPr>
+              <p:cNvSpPr txBox="1"/>
+              <p:nvPr/>
+            </p:nvSpPr>
+            <p:spPr>
+              <a:xfrm>
+                <a:off x="7387404" y="8159133"/>
+                <a:ext cx="1648721" cy="477054"/>
+              </a:xfrm>
+              <a:prstGeom prst="rect">
+                <a:avLst/>
+              </a:prstGeom>
+              <a:noFill/>
+            </p:spPr>
+            <p:txBody>
+              <a:bodyPr wrap="none" rtlCol="0">
+                <a:spAutoFit/>
+              </a:bodyPr>
+              <a:lstStyle/>
+              <a:p>
+                <a:r>
+                  <a:rPr lang="en-GB" dirty="0"/>
+                  <a:t>eigenmode</a:t>
+                </a:r>
+              </a:p>
+            </p:txBody>
+          </p:sp>
+        </p:grpSp>
+      </p:grpSp>
+      <p:sp>
+        <p:nvSpPr>
+          <p:cNvPr id="67" name="TextBox 66">
             <a:extLst>
               <a:ext uri="{FF2B5EF4-FFF2-40B4-BE49-F238E27FC236}">
-                <a16:creationId xmlns:a16="http://schemas.microsoft.com/office/drawing/2014/main" id="{B04F7374-DB6C-4E89-B91A-B637BBC4A3DD}"/>
+                <a16:creationId xmlns:a16="http://schemas.microsoft.com/office/drawing/2014/main" id="{403059CF-74D0-1D90-4132-6D426C0A1D5F}"/>
               </a:ext>
             </a:extLst>
           </p:cNvPr>
@@ -4977,9 +5343,9 @@
           <p:nvPr/>
         </p:nvSpPr>
         <p:spPr>
-          <a:xfrm>
-            <a:off x="324123" y="7840960"/>
-            <a:ext cx="2709774" cy="1246495"/>
+          <a:xfrm rot="16200000">
+            <a:off x="1251408" y="9663489"/>
+            <a:ext cx="897810" cy="477054"/>
           </a:xfrm>
           <a:prstGeom prst="rect">
             <a:avLst/>
@@ -4987,190 +5353,24 @@
           <a:noFill/>
         </p:spPr>
         <p:txBody>
-          <a:bodyPr wrap="square" rtlCol="0">
+          <a:bodyPr wrap="none" rtlCol="0">
             <a:spAutoFit/>
           </a:bodyPr>
           <a:lstStyle/>
           <a:p>
             <a:r>
               <a:rPr lang="en-GB" dirty="0"/>
-              <a:t>Running </a:t>
-            </a:r>
-            <a:r>
-              <a:rPr lang="en-GB" dirty="0">
-                <a:solidFill>
-                  <a:srgbClr val="FF0000"/>
-                </a:solidFill>
-              </a:rPr>
-              <a:t>&lt;</a:t>
-            </a:r>
-            <a:r>
-              <a:rPr lang="en-GB" dirty="0" err="1">
-                <a:solidFill>
-                  <a:srgbClr val="FF0000"/>
-                </a:solidFill>
-              </a:rPr>
-              <a:t>model_name</a:t>
-            </a:r>
-            <a:r>
-              <a:rPr lang="en-GB" dirty="0">
-                <a:solidFill>
-                  <a:srgbClr val="FF0000"/>
-                </a:solidFill>
-              </a:rPr>
-              <a:t>&gt;.m </a:t>
-            </a:r>
-            <a:r>
-              <a:rPr lang="en-GB" dirty="0"/>
-              <a:t>makes this happen. </a:t>
-            </a:r>
-          </a:p>
-        </p:txBody>
-      </p:sp>
-      <p:cxnSp>
-        <p:nvCxnSpPr>
-          <p:cNvPr id="39" name="Straight Connector 38">
+              <a:t>Stage</a:t>
+            </a:r>
+          </a:p>
+        </p:txBody>
+      </p:sp>
+      <p:sp>
+        <p:nvSpPr>
+          <p:cNvPr id="68" name="TextBox 67">
             <a:extLst>
               <a:ext uri="{FF2B5EF4-FFF2-40B4-BE49-F238E27FC236}">
-                <a16:creationId xmlns:a16="http://schemas.microsoft.com/office/drawing/2014/main" id="{34A25220-F8CF-4BBC-A67F-C028A5C1FA8D}"/>
-              </a:ext>
-            </a:extLst>
-          </p:cNvPr>
-          <p:cNvCxnSpPr>
-            <a:cxnSpLocks/>
-          </p:cNvCxnSpPr>
-          <p:nvPr/>
-        </p:nvCxnSpPr>
-        <p:spPr>
-          <a:xfrm>
-            <a:off x="3936901" y="7264896"/>
-            <a:ext cx="1295747" cy="0"/>
-          </a:xfrm>
-          <a:prstGeom prst="line">
-            <a:avLst/>
-          </a:prstGeom>
-          <a:ln w="25400">
-            <a:solidFill>
-              <a:schemeClr val="bg1">
-                <a:lumMod val="95000"/>
-              </a:schemeClr>
-            </a:solidFill>
-            <a:prstDash val="dash"/>
-          </a:ln>
-        </p:spPr>
-        <p:style>
-          <a:lnRef idx="1">
-            <a:schemeClr val="accent1"/>
-          </a:lnRef>
-          <a:fillRef idx="0">
-            <a:schemeClr val="accent1"/>
-          </a:fillRef>
-          <a:effectRef idx="0">
-            <a:schemeClr val="accent1"/>
-          </a:effectRef>
-          <a:fontRef idx="minor">
-            <a:schemeClr val="tx1"/>
-          </a:fontRef>
-        </p:style>
-      </p:cxnSp>
-      <p:cxnSp>
-        <p:nvCxnSpPr>
-          <p:cNvPr id="40" name="Straight Connector 39">
-            <a:extLst>
-              <a:ext uri="{FF2B5EF4-FFF2-40B4-BE49-F238E27FC236}">
-                <a16:creationId xmlns:a16="http://schemas.microsoft.com/office/drawing/2014/main" id="{0CD8FB47-F861-485C-BBB4-9DFA18869A8E}"/>
-              </a:ext>
-            </a:extLst>
-          </p:cNvPr>
-          <p:cNvCxnSpPr>
-            <a:cxnSpLocks/>
-          </p:cNvCxnSpPr>
-          <p:nvPr/>
-        </p:nvCxnSpPr>
-        <p:spPr>
-          <a:xfrm>
-            <a:off x="283431" y="9713168"/>
-            <a:ext cx="4949217" cy="0"/>
-          </a:xfrm>
-          <a:prstGeom prst="line">
-            <a:avLst/>
-          </a:prstGeom>
-          <a:ln w="25400">
-            <a:solidFill>
-              <a:schemeClr val="bg1">
-                <a:lumMod val="95000"/>
-              </a:schemeClr>
-            </a:solidFill>
-            <a:prstDash val="dash"/>
-          </a:ln>
-        </p:spPr>
-        <p:style>
-          <a:lnRef idx="1">
-            <a:schemeClr val="accent1"/>
-          </a:lnRef>
-          <a:fillRef idx="0">
-            <a:schemeClr val="accent1"/>
-          </a:fillRef>
-          <a:effectRef idx="0">
-            <a:schemeClr val="accent1"/>
-          </a:effectRef>
-          <a:fontRef idx="minor">
-            <a:schemeClr val="tx1"/>
-          </a:fontRef>
-        </p:style>
-      </p:cxnSp>
-      <p:cxnSp>
-        <p:nvCxnSpPr>
-          <p:cNvPr id="42" name="Straight Connector 41">
-            <a:extLst>
-              <a:ext uri="{FF2B5EF4-FFF2-40B4-BE49-F238E27FC236}">
-                <a16:creationId xmlns:a16="http://schemas.microsoft.com/office/drawing/2014/main" id="{AECE477B-BD62-4C82-9E96-CA8C3F883793}"/>
-              </a:ext>
-            </a:extLst>
-          </p:cNvPr>
-          <p:cNvCxnSpPr>
-            <a:cxnSpLocks/>
-          </p:cNvCxnSpPr>
-          <p:nvPr/>
-        </p:nvCxnSpPr>
-        <p:spPr>
-          <a:xfrm>
-            <a:off x="283431" y="9857184"/>
-            <a:ext cx="4804804" cy="0"/>
-          </a:xfrm>
-          <a:prstGeom prst="line">
-            <a:avLst/>
-          </a:prstGeom>
-          <a:ln w="25400">
-            <a:solidFill>
-              <a:schemeClr val="bg1">
-                <a:lumMod val="95000"/>
-              </a:schemeClr>
-            </a:solidFill>
-            <a:prstDash val="dash"/>
-          </a:ln>
-        </p:spPr>
-        <p:style>
-          <a:lnRef idx="1">
-            <a:schemeClr val="accent1"/>
-          </a:lnRef>
-          <a:fillRef idx="0">
-            <a:schemeClr val="accent1"/>
-          </a:fillRef>
-          <a:effectRef idx="0">
-            <a:schemeClr val="accent1"/>
-          </a:effectRef>
-          <a:fontRef idx="minor">
-            <a:schemeClr val="tx1"/>
-          </a:fontRef>
-        </p:style>
-      </p:cxnSp>
-      <p:sp>
-        <p:nvSpPr>
-          <p:cNvPr id="44" name="TextBox 43">
-            <a:extLst>
-              <a:ext uri="{FF2B5EF4-FFF2-40B4-BE49-F238E27FC236}">
-                <a16:creationId xmlns:a16="http://schemas.microsoft.com/office/drawing/2014/main" id="{D6534005-9B6A-4ED2-913A-7BB86113F87E}"/>
+                <a16:creationId xmlns:a16="http://schemas.microsoft.com/office/drawing/2014/main" id="{E655E293-BABA-4521-D34F-5C82B797D4A0}"/>
               </a:ext>
             </a:extLst>
           </p:cNvPr>
@@ -5179,8 +5379,8 @@
         </p:nvSpPr>
         <p:spPr>
           <a:xfrm>
-            <a:off x="283431" y="10038943"/>
-            <a:ext cx="2553776" cy="2554545"/>
+            <a:off x="3486570" y="1483665"/>
+            <a:ext cx="2245374" cy="477054"/>
           </a:xfrm>
           <a:prstGeom prst="rect">
             <a:avLst/>
@@ -5194,24 +5394,18 @@
           <a:lstStyle/>
           <a:p>
             <a:r>
-              <a:rPr lang="en-GB" sz="1600" dirty="0"/>
-              <a:t>These can be run on a separate machine. This has the advantage that you can look at results of earlier simulations before the full set has completed. </a:t>
-            </a:r>
-          </a:p>
-          <a:p>
-            <a:r>
-              <a:rPr lang="en-GB" sz="1600" dirty="0"/>
-              <a:t>Also the modelling machine is only doing the EM simulation thus gets through the models faster.</a:t>
-            </a:r>
-          </a:p>
-        </p:txBody>
-      </p:sp>
-      <p:sp>
-        <p:nvSpPr>
-          <p:cNvPr id="45" name="TextBox 44">
+              <a:rPr lang="en-GB" dirty="0"/>
+              <a:t>Write input file</a:t>
+            </a:r>
+          </a:p>
+        </p:txBody>
+      </p:sp>
+      <p:sp>
+        <p:nvSpPr>
+          <p:cNvPr id="69" name="TextBox 68">
             <a:extLst>
               <a:ext uri="{FF2B5EF4-FFF2-40B4-BE49-F238E27FC236}">
-                <a16:creationId xmlns:a16="http://schemas.microsoft.com/office/drawing/2014/main" id="{4611F8FC-E13F-47B5-9848-18A9AA330941}"/>
+                <a16:creationId xmlns:a16="http://schemas.microsoft.com/office/drawing/2014/main" id="{490BAABC-758D-8FDF-26A9-88539DE7CF47}"/>
               </a:ext>
             </a:extLst>
           </p:cNvPr>
@@ -5220,8 +5414,8 @@
         </p:nvSpPr>
         <p:spPr>
           <a:xfrm>
-            <a:off x="146361" y="2949986"/>
-            <a:ext cx="2610843" cy="477054"/>
+            <a:off x="2237742" y="4776554"/>
+            <a:ext cx="5700984" cy="400110"/>
           </a:xfrm>
           <a:prstGeom prst="rect">
             <a:avLst/>
@@ -5235,301 +5429,54 @@
           <a:lstStyle/>
           <a:p>
             <a:r>
-              <a:rPr lang="en-GB" dirty="0"/>
-              <a:t>Not currently used</a:t>
-            </a:r>
-          </a:p>
-        </p:txBody>
-      </p:sp>
-      <p:sp>
-        <p:nvSpPr>
-          <p:cNvPr id="46" name="Left Brace 45">
-            <a:extLst>
-              <a:ext uri="{FF2B5EF4-FFF2-40B4-BE49-F238E27FC236}">
-                <a16:creationId xmlns:a16="http://schemas.microsoft.com/office/drawing/2014/main" id="{CEF9C7DB-E6DC-4651-8F62-3D27CF0D51B1}"/>
-              </a:ext>
-            </a:extLst>
-          </p:cNvPr>
-          <p:cNvSpPr/>
-          <p:nvPr/>
-        </p:nvSpPr>
-        <p:spPr>
-          <a:xfrm>
-            <a:off x="3452924" y="158710"/>
-            <a:ext cx="699604" cy="2224043"/>
-          </a:xfrm>
-          <a:prstGeom prst="leftBrace">
-            <a:avLst>
-              <a:gd name="adj1" fmla="val 47135"/>
-              <a:gd name="adj2" fmla="val 50000"/>
-            </a:avLst>
-          </a:prstGeom>
-        </p:spPr>
-        <p:style>
-          <a:lnRef idx="3">
-            <a:schemeClr val="dk1"/>
-          </a:lnRef>
-          <a:fillRef idx="0">
-            <a:schemeClr val="dk1"/>
-          </a:fillRef>
-          <a:effectRef idx="2">
-            <a:schemeClr val="dk1"/>
-          </a:effectRef>
-          <a:fontRef idx="minor">
-            <a:schemeClr val="tx1"/>
-          </a:fontRef>
-        </p:style>
-        <p:txBody>
-          <a:bodyPr rtlCol="0" anchor="ctr"/>
-          <a:lstStyle/>
-          <a:p>
-            <a:pPr algn="ctr"/>
-            <a:endParaRPr lang="en-GB" dirty="0"/>
-          </a:p>
-        </p:txBody>
-      </p:sp>
-      <p:sp>
-        <p:nvSpPr>
-          <p:cNvPr id="47" name="TextBox 46">
-            <a:extLst>
-              <a:ext uri="{FF2B5EF4-FFF2-40B4-BE49-F238E27FC236}">
-                <a16:creationId xmlns:a16="http://schemas.microsoft.com/office/drawing/2014/main" id="{16694101-F40E-494E-9516-0CC7014B8AA1}"/>
-              </a:ext>
-            </a:extLst>
-          </p:cNvPr>
-          <p:cNvSpPr txBox="1"/>
-          <p:nvPr/>
-        </p:nvSpPr>
-        <p:spPr>
-          <a:xfrm>
-            <a:off x="1290244" y="964236"/>
-            <a:ext cx="2553776" cy="584775"/>
-          </a:xfrm>
-          <a:prstGeom prst="rect">
-            <a:avLst/>
-          </a:prstGeom>
-          <a:noFill/>
-        </p:spPr>
-        <p:txBody>
-          <a:bodyPr wrap="square" rtlCol="0">
-            <a:spAutoFit/>
-          </a:bodyPr>
-          <a:lstStyle/>
-          <a:p>
-            <a:r>
-              <a:rPr lang="en-GB" sz="1600" dirty="0"/>
-              <a:t>This is now the EM CAD frontend project</a:t>
-            </a:r>
-          </a:p>
-        </p:txBody>
-      </p:sp>
-      <p:cxnSp>
-        <p:nvCxnSpPr>
-          <p:cNvPr id="49" name="Straight Connector 48">
-            <a:extLst>
-              <a:ext uri="{FF2B5EF4-FFF2-40B4-BE49-F238E27FC236}">
-                <a16:creationId xmlns:a16="http://schemas.microsoft.com/office/drawing/2014/main" id="{4589312D-67B9-4D89-978C-0820AF446336}"/>
-              </a:ext>
-            </a:extLst>
-          </p:cNvPr>
-          <p:cNvCxnSpPr>
-            <a:cxnSpLocks/>
-          </p:cNvCxnSpPr>
-          <p:nvPr/>
-        </p:nvCxnSpPr>
-        <p:spPr>
-          <a:xfrm>
-            <a:off x="43492" y="1971078"/>
-            <a:ext cx="2569471" cy="419054"/>
-          </a:xfrm>
-          <a:prstGeom prst="line">
-            <a:avLst/>
-          </a:prstGeom>
-          <a:ln w="25400">
-            <a:prstDash val="dash"/>
-          </a:ln>
-        </p:spPr>
-        <p:style>
-          <a:lnRef idx="1">
-            <a:schemeClr val="accent1"/>
-          </a:lnRef>
-          <a:fillRef idx="0">
-            <a:schemeClr val="accent1"/>
-          </a:fillRef>
-          <a:effectRef idx="0">
-            <a:schemeClr val="accent1"/>
-          </a:effectRef>
-          <a:fontRef idx="minor">
-            <a:schemeClr val="tx1"/>
-          </a:fontRef>
-        </p:style>
-      </p:cxnSp>
-      <p:sp>
-        <p:nvSpPr>
-          <p:cNvPr id="51" name="Rounded Rectangle 7">
-            <a:extLst>
-              <a:ext uri="{FF2B5EF4-FFF2-40B4-BE49-F238E27FC236}">
-                <a16:creationId xmlns:a16="http://schemas.microsoft.com/office/drawing/2014/main" id="{598435E3-D562-489A-8B24-97249A610A67}"/>
-              </a:ext>
-            </a:extLst>
-          </p:cNvPr>
-          <p:cNvSpPr/>
-          <p:nvPr/>
-        </p:nvSpPr>
-        <p:spPr>
-          <a:xfrm>
-            <a:off x="6744816" y="11657384"/>
-            <a:ext cx="2736304" cy="1008112"/>
-          </a:xfrm>
-          <a:prstGeom prst="roundRect">
-            <a:avLst/>
-          </a:prstGeom>
-          <a:noFill/>
-          <a:ln>
-            <a:solidFill>
-              <a:schemeClr val="tx1"/>
-            </a:solidFill>
-          </a:ln>
-        </p:spPr>
-        <p:style>
-          <a:lnRef idx="2">
-            <a:schemeClr val="accent1">
-              <a:shade val="50000"/>
-            </a:schemeClr>
-          </a:lnRef>
-          <a:fillRef idx="1">
-            <a:schemeClr val="accent1"/>
-          </a:fillRef>
-          <a:effectRef idx="0">
-            <a:schemeClr val="accent1"/>
-          </a:effectRef>
-          <a:fontRef idx="minor">
-            <a:schemeClr val="lt1"/>
-          </a:fontRef>
-        </p:style>
-        <p:txBody>
-          <a:bodyPr lIns="128016" tIns="64008" rIns="128016" bIns="64008" spcCol="0" rtlCol="0" anchor="ctr"/>
-          <a:lstStyle/>
-          <a:p>
-            <a:pPr algn="ctr"/>
-            <a:r>
-              <a:rPr lang="en-GB" sz="1600" dirty="0">
-                <a:solidFill>
-                  <a:schemeClr val="tx1"/>
-                </a:solidFill>
+              <a:rPr lang="en-GB" sz="2000" dirty="0">
+                <a:latin typeface="Menlo"/>
               </a:rPr>
-              <a:t>Extract particular types of data for sets of models</a:t>
-            </a:r>
-          </a:p>
-          <a:p>
-            <a:pPr algn="ctr"/>
-            <a:r>
-              <a:rPr lang="en-GB" sz="1600" dirty="0" err="1">
-                <a:solidFill>
-                  <a:srgbClr val="FF0000"/>
-                </a:solidFill>
+              <a:t>types</a:t>
+            </a:r>
+            <a:r>
+              <a:rPr lang="en-GB" sz="2000" dirty="0">
+                <a:solidFill>
+                  <a:srgbClr val="A709F5"/>
+                </a:solidFill>
+                <a:latin typeface="Menlo"/>
               </a:rPr>
-              <a:t>extract_all_wlf.m</a:t>
-            </a:r>
-            <a:endParaRPr lang="en-GB" sz="1600" dirty="0">
-              <a:solidFill>
-                <a:srgbClr val="FF0000"/>
-              </a:solidFill>
+              <a:t> = </a:t>
+            </a:r>
+            <a:r>
+              <a:rPr lang="en-GB" sz="2000" b="0" i="0" dirty="0">
+                <a:solidFill>
+                  <a:srgbClr val="A709F5"/>
+                </a:solidFill>
+                <a:effectLst/>
+                <a:latin typeface="Menlo"/>
+              </a:rPr>
+              <a:t>'geometry’, 'wake’, '</a:t>
+            </a:r>
+            <a:r>
+              <a:rPr lang="en-GB" sz="2000" b="0" i="0" dirty="0" err="1">
+                <a:solidFill>
+                  <a:srgbClr val="A709F5"/>
+                </a:solidFill>
+                <a:effectLst/>
+                <a:latin typeface="Menlo"/>
+              </a:rPr>
+              <a:t>sparameter</a:t>
+            </a:r>
+            <a:r>
+              <a:rPr lang="en-GB" sz="2000" b="0" i="0" dirty="0">
+                <a:solidFill>
+                  <a:srgbClr val="A709F5"/>
+                </a:solidFill>
+                <a:effectLst/>
+                <a:latin typeface="Menlo"/>
+              </a:rPr>
+              <a:t>’, ‘eigenmode’</a:t>
+            </a:r>
+            <a:endParaRPr lang="en-GB" sz="2000" b="0" i="0" dirty="0">
+              <a:effectLst/>
+              <a:latin typeface="Menlo"/>
             </a:endParaRPr>
-          </a:p>
-        </p:txBody>
-      </p:sp>
-      <p:sp>
-        <p:nvSpPr>
-          <p:cNvPr id="22" name="Left Brace 21">
-            <a:extLst>
-              <a:ext uri="{FF2B5EF4-FFF2-40B4-BE49-F238E27FC236}">
-                <a16:creationId xmlns:a16="http://schemas.microsoft.com/office/drawing/2014/main" id="{110C3E01-5276-4977-80D6-6A67B53DDFDC}"/>
-              </a:ext>
-            </a:extLst>
-          </p:cNvPr>
-          <p:cNvSpPr/>
-          <p:nvPr/>
-        </p:nvSpPr>
-        <p:spPr>
-          <a:xfrm>
-            <a:off x="3144416" y="7264896"/>
-            <a:ext cx="699604" cy="2448270"/>
-          </a:xfrm>
-          <a:prstGeom prst="leftBrace">
-            <a:avLst>
-              <a:gd name="adj1" fmla="val 47135"/>
-              <a:gd name="adj2" fmla="val 50000"/>
-            </a:avLst>
-          </a:prstGeom>
-        </p:spPr>
-        <p:style>
-          <a:lnRef idx="3">
-            <a:schemeClr val="dk1"/>
-          </a:lnRef>
-          <a:fillRef idx="0">
-            <a:schemeClr val="dk1"/>
-          </a:fillRef>
-          <a:effectRef idx="2">
-            <a:schemeClr val="dk1"/>
-          </a:effectRef>
-          <a:fontRef idx="minor">
-            <a:schemeClr val="tx1"/>
-          </a:fontRef>
-        </p:style>
-        <p:txBody>
-          <a:bodyPr rtlCol="0" anchor="ctr"/>
-          <a:lstStyle/>
-          <a:p>
-            <a:pPr algn="ctr"/>
-            <a:endParaRPr lang="en-GB" dirty="0"/>
-          </a:p>
-        </p:txBody>
-      </p:sp>
-      <p:sp>
-        <p:nvSpPr>
-          <p:cNvPr id="41" name="Left Brace 40">
-            <a:extLst>
-              <a:ext uri="{FF2B5EF4-FFF2-40B4-BE49-F238E27FC236}">
-                <a16:creationId xmlns:a16="http://schemas.microsoft.com/office/drawing/2014/main" id="{24A801DD-70DB-4D7F-B32A-60ADD1629FDA}"/>
-              </a:ext>
-            </a:extLst>
-          </p:cNvPr>
-          <p:cNvSpPr/>
-          <p:nvPr/>
-        </p:nvSpPr>
-        <p:spPr>
-          <a:xfrm>
-            <a:off x="3164892" y="9857184"/>
-            <a:ext cx="699604" cy="2808309"/>
-          </a:xfrm>
-          <a:prstGeom prst="leftBrace">
-            <a:avLst>
-              <a:gd name="adj1" fmla="val 47135"/>
-              <a:gd name="adj2" fmla="val 50000"/>
-            </a:avLst>
-          </a:prstGeom>
-        </p:spPr>
-        <p:style>
-          <a:lnRef idx="3">
-            <a:schemeClr val="dk1"/>
-          </a:lnRef>
-          <a:fillRef idx="0">
-            <a:schemeClr val="dk1"/>
-          </a:fillRef>
-          <a:effectRef idx="2">
-            <a:schemeClr val="dk1"/>
-          </a:effectRef>
-          <a:fontRef idx="minor">
-            <a:schemeClr val="tx1"/>
-          </a:fontRef>
-        </p:style>
-        <p:txBody>
-          <a:bodyPr rtlCol="0" anchor="ctr"/>
-          <a:lstStyle/>
-          <a:p>
-            <a:pPr algn="ctr"/>
-            <a:endParaRPr lang="en-GB" dirty="0"/>
           </a:p>
         </p:txBody>
       </p:sp>
@@ -6134,145 +6081,6 @@
           </a:p>
         </p:txBody>
       </p:sp>
-      <p:sp>
-        <p:nvSpPr>
-          <p:cNvPr id="34" name="Rectangle: Rounded Corners 33">
-            <a:extLst>
-              <a:ext uri="{FF2B5EF4-FFF2-40B4-BE49-F238E27FC236}">
-                <a16:creationId xmlns:a16="http://schemas.microsoft.com/office/drawing/2014/main" id="{329CA52F-952B-410F-AD91-32D8A927F346}"/>
-              </a:ext>
-            </a:extLst>
-          </p:cNvPr>
-          <p:cNvSpPr/>
-          <p:nvPr/>
-        </p:nvSpPr>
-        <p:spPr>
-          <a:xfrm>
-            <a:off x="7477507" y="3113290"/>
-            <a:ext cx="1944216" cy="2331299"/>
-          </a:xfrm>
-          <a:prstGeom prst="roundRect">
-            <a:avLst/>
-          </a:prstGeom>
-        </p:spPr>
-        <p:style>
-          <a:lnRef idx="2">
-            <a:schemeClr val="accent1">
-              <a:shade val="50000"/>
-            </a:schemeClr>
-          </a:lnRef>
-          <a:fillRef idx="1">
-            <a:schemeClr val="accent1"/>
-          </a:fillRef>
-          <a:effectRef idx="0">
-            <a:schemeClr val="accent1"/>
-          </a:effectRef>
-          <a:fontRef idx="minor">
-            <a:schemeClr val="lt1"/>
-          </a:fontRef>
-        </p:style>
-        <p:txBody>
-          <a:bodyPr rtlCol="0" anchor="ctr"/>
-          <a:lstStyle/>
-          <a:p>
-            <a:pPr algn="ctr"/>
-            <a:r>
-              <a:rPr lang="en-GB" dirty="0"/>
-              <a:t>Rename the results folder if you wish to keep the results.</a:t>
-            </a:r>
-          </a:p>
-        </p:txBody>
-      </p:sp>
-      <p:cxnSp>
-        <p:nvCxnSpPr>
-          <p:cNvPr id="38" name="Connector: Elbow 37">
-            <a:extLst>
-              <a:ext uri="{FF2B5EF4-FFF2-40B4-BE49-F238E27FC236}">
-                <a16:creationId xmlns:a16="http://schemas.microsoft.com/office/drawing/2014/main" id="{FDD914CA-CAAF-4A0E-901B-5F9BBDDC3ED7}"/>
-              </a:ext>
-            </a:extLst>
-          </p:cNvPr>
-          <p:cNvCxnSpPr>
-            <a:stCxn id="34" idx="1"/>
-          </p:cNvCxnSpPr>
-          <p:nvPr/>
-        </p:nvCxnSpPr>
-        <p:spPr>
-          <a:xfrm rot="10800000">
-            <a:off x="6024737" y="3113290"/>
-            <a:ext cx="1452771" cy="1165650"/>
-          </a:xfrm>
-          <a:prstGeom prst="bentConnector3">
-            <a:avLst/>
-          </a:prstGeom>
-          <a:ln w="41275">
-            <a:solidFill>
-              <a:schemeClr val="tx1"/>
-            </a:solidFill>
-            <a:prstDash val="sysDot"/>
-            <a:tailEnd type="triangle"/>
-          </a:ln>
-        </p:spPr>
-        <p:style>
-          <a:lnRef idx="1">
-            <a:schemeClr val="accent1"/>
-          </a:lnRef>
-          <a:fillRef idx="0">
-            <a:schemeClr val="accent1"/>
-          </a:fillRef>
-          <a:effectRef idx="0">
-            <a:schemeClr val="accent1"/>
-          </a:effectRef>
-          <a:fontRef idx="minor">
-            <a:schemeClr val="tx1"/>
-          </a:fontRef>
-        </p:style>
-      </p:cxnSp>
-      <p:cxnSp>
-        <p:nvCxnSpPr>
-          <p:cNvPr id="40" name="Connector: Elbow 39">
-            <a:extLst>
-              <a:ext uri="{FF2B5EF4-FFF2-40B4-BE49-F238E27FC236}">
-                <a16:creationId xmlns:a16="http://schemas.microsoft.com/office/drawing/2014/main" id="{9CA2E5A7-1896-461A-9661-23F424AAFA95}"/>
-              </a:ext>
-            </a:extLst>
-          </p:cNvPr>
-          <p:cNvCxnSpPr>
-            <a:stCxn id="34" idx="1"/>
-          </p:cNvCxnSpPr>
-          <p:nvPr/>
-        </p:nvCxnSpPr>
-        <p:spPr>
-          <a:xfrm rot="10800000" flipV="1">
-            <a:off x="6143243" y="4278940"/>
-            <a:ext cx="1334265" cy="909066"/>
-          </a:xfrm>
-          <a:prstGeom prst="bentConnector3">
-            <a:avLst/>
-          </a:prstGeom>
-          <a:ln w="41275">
-            <a:solidFill>
-              <a:schemeClr val="tx1"/>
-            </a:solidFill>
-            <a:prstDash val="sysDot"/>
-            <a:tailEnd type="triangle"/>
-          </a:ln>
-        </p:spPr>
-        <p:style>
-          <a:lnRef idx="1">
-            <a:schemeClr val="accent1"/>
-          </a:lnRef>
-          <a:fillRef idx="0">
-            <a:schemeClr val="accent1"/>
-          </a:fillRef>
-          <a:effectRef idx="0">
-            <a:schemeClr val="accent1"/>
-          </a:effectRef>
-          <a:fontRef idx="minor">
-            <a:schemeClr val="tx1"/>
-          </a:fontRef>
-        </p:style>
-      </p:cxnSp>
     </p:spTree>
     <p:extLst>
       <p:ext uri="{BB962C8B-B14F-4D97-AF65-F5344CB8AC3E}">

</xml_diff>